<commit_message>
Add gaussian and bilateral filter
</commit_message>
<xml_diff>
--- a/paper/figures.pptx
+++ b/paper/figures.pptx
@@ -6,6 +6,7 @@
   </p:sldMasterIdLst>
   <p:sldIdLst>
     <p:sldId id="256" r:id="rId2"/>
+    <p:sldId id="257" r:id="rId3"/>
   </p:sldIdLst>
   <p:sldSz cx="12192000" cy="6858000"/>
   <p:notesSz cx="6858000" cy="9144000"/>
@@ -104,6 +105,11 @@
       </a:defRPr>
     </a:lvl9pPr>
   </p:defaultTextStyle>
+  <p:extLst>
+    <p:ext uri="{EFAFB233-063F-42B5-8137-9DF3F51BA10A}">
+      <p15:sldGuideLst xmlns:p15="http://schemas.microsoft.com/office/powerpoint/2012/main"/>
+    </p:ext>
+  </p:extLst>
 </p:presentation>
 </file>
 
@@ -254,7 +260,7 @@
           <a:p>
             <a:fld id="{8A6AE6C4-E2B5-4993-A983-93BFE2454AE7}" type="datetimeFigureOut">
               <a:rPr lang="en-US" smtClean="0"/>
-              <a:t>5/19/2018</a:t>
+              <a:t>5/23/2018</a:t>
             </a:fld>
             <a:endParaRPr lang="en-US"/>
           </a:p>
@@ -452,7 +458,7 @@
           <a:p>
             <a:fld id="{8A6AE6C4-E2B5-4993-A983-93BFE2454AE7}" type="datetimeFigureOut">
               <a:rPr lang="en-US" smtClean="0"/>
-              <a:t>5/19/2018</a:t>
+              <a:t>5/23/2018</a:t>
             </a:fld>
             <a:endParaRPr lang="en-US"/>
           </a:p>
@@ -660,7 +666,7 @@
           <a:p>
             <a:fld id="{8A6AE6C4-E2B5-4993-A983-93BFE2454AE7}" type="datetimeFigureOut">
               <a:rPr lang="en-US" smtClean="0"/>
-              <a:t>5/19/2018</a:t>
+              <a:t>5/23/2018</a:t>
             </a:fld>
             <a:endParaRPr lang="en-US"/>
           </a:p>
@@ -858,7 +864,7 @@
           <a:p>
             <a:fld id="{8A6AE6C4-E2B5-4993-A983-93BFE2454AE7}" type="datetimeFigureOut">
               <a:rPr lang="en-US" smtClean="0"/>
-              <a:t>5/19/2018</a:t>
+              <a:t>5/23/2018</a:t>
             </a:fld>
             <a:endParaRPr lang="en-US"/>
           </a:p>
@@ -1133,7 +1139,7 @@
           <a:p>
             <a:fld id="{8A6AE6C4-E2B5-4993-A983-93BFE2454AE7}" type="datetimeFigureOut">
               <a:rPr lang="en-US" smtClean="0"/>
-              <a:t>5/19/2018</a:t>
+              <a:t>5/23/2018</a:t>
             </a:fld>
             <a:endParaRPr lang="en-US"/>
           </a:p>
@@ -1398,7 +1404,7 @@
           <a:p>
             <a:fld id="{8A6AE6C4-E2B5-4993-A983-93BFE2454AE7}" type="datetimeFigureOut">
               <a:rPr lang="en-US" smtClean="0"/>
-              <a:t>5/19/2018</a:t>
+              <a:t>5/23/2018</a:t>
             </a:fld>
             <a:endParaRPr lang="en-US"/>
           </a:p>
@@ -1810,7 +1816,7 @@
           <a:p>
             <a:fld id="{8A6AE6C4-E2B5-4993-A983-93BFE2454AE7}" type="datetimeFigureOut">
               <a:rPr lang="en-US" smtClean="0"/>
-              <a:t>5/19/2018</a:t>
+              <a:t>5/23/2018</a:t>
             </a:fld>
             <a:endParaRPr lang="en-US"/>
           </a:p>
@@ -1951,7 +1957,7 @@
           <a:p>
             <a:fld id="{8A6AE6C4-E2B5-4993-A983-93BFE2454AE7}" type="datetimeFigureOut">
               <a:rPr lang="en-US" smtClean="0"/>
-              <a:t>5/19/2018</a:t>
+              <a:t>5/23/2018</a:t>
             </a:fld>
             <a:endParaRPr lang="en-US"/>
           </a:p>
@@ -2064,7 +2070,7 @@
           <a:p>
             <a:fld id="{8A6AE6C4-E2B5-4993-A983-93BFE2454AE7}" type="datetimeFigureOut">
               <a:rPr lang="en-US" smtClean="0"/>
-              <a:t>5/19/2018</a:t>
+              <a:t>5/23/2018</a:t>
             </a:fld>
             <a:endParaRPr lang="en-US"/>
           </a:p>
@@ -2375,7 +2381,7 @@
           <a:p>
             <a:fld id="{8A6AE6C4-E2B5-4993-A983-93BFE2454AE7}" type="datetimeFigureOut">
               <a:rPr lang="en-US" smtClean="0"/>
-              <a:t>5/19/2018</a:t>
+              <a:t>5/23/2018</a:t>
             </a:fld>
             <a:endParaRPr lang="en-US"/>
           </a:p>
@@ -2663,7 +2669,7 @@
           <a:p>
             <a:fld id="{8A6AE6C4-E2B5-4993-A983-93BFE2454AE7}" type="datetimeFigureOut">
               <a:rPr lang="en-US" smtClean="0"/>
-              <a:t>5/19/2018</a:t>
+              <a:t>5/23/2018</a:t>
             </a:fld>
             <a:endParaRPr lang="en-US"/>
           </a:p>
@@ -2904,7 +2910,7 @@
           <a:p>
             <a:fld id="{8A6AE6C4-E2B5-4993-A983-93BFE2454AE7}" type="datetimeFigureOut">
               <a:rPr lang="en-US" smtClean="0"/>
-              <a:t>5/19/2018</a:t>
+              <a:t>5/23/2018</a:t>
             </a:fld>
             <a:endParaRPr lang="en-US"/>
           </a:p>
@@ -4421,6 +4427,267 @@
 </p:sld>
 </file>
 
+<file path=ppt/slides/slide2.xml><?xml version="1.0" encoding="utf-8"?>
+<p:sld xmlns:a="http://schemas.openxmlformats.org/drawingml/2006/main" xmlns:r="http://schemas.openxmlformats.org/officeDocument/2006/relationships" xmlns:p="http://schemas.openxmlformats.org/presentationml/2006/main">
+  <p:cSld>
+    <p:spTree>
+      <p:nvGrpSpPr>
+        <p:cNvPr id="1" name=""/>
+        <p:cNvGrpSpPr/>
+        <p:nvPr/>
+      </p:nvGrpSpPr>
+      <p:grpSpPr>
+        <a:xfrm>
+          <a:off x="0" y="0"/>
+          <a:ext cx="0" cy="0"/>
+          <a:chOff x="0" y="0"/>
+          <a:chExt cx="0" cy="0"/>
+        </a:xfrm>
+      </p:grpSpPr>
+      <p:pic>
+        <p:nvPicPr>
+          <p:cNvPr id="4" name="Picture 3">
+            <a:extLst>
+              <a:ext uri="{FF2B5EF4-FFF2-40B4-BE49-F238E27FC236}">
+                <a16:creationId xmlns:a16="http://schemas.microsoft.com/office/drawing/2014/main" id="{E161FA84-FC25-4098-93D5-E77C93FC5E0C}"/>
+              </a:ext>
+            </a:extLst>
+          </p:cNvPr>
+          <p:cNvPicPr>
+            <a:picLocks noChangeAspect="1"/>
+          </p:cNvPicPr>
+          <p:nvPr/>
+        </p:nvPicPr>
+        <p:blipFill rotWithShape="1">
+          <a:blip r:embed="rId2"/>
+          <a:srcRect b="72479"/>
+          <a:stretch/>
+        </p:blipFill>
+        <p:spPr>
+          <a:xfrm>
+            <a:off x="3600498" y="1423073"/>
+            <a:ext cx="4991004" cy="1104087"/>
+          </a:xfrm>
+          <a:prstGeom prst="rect">
+            <a:avLst/>
+          </a:prstGeom>
+        </p:spPr>
+      </p:pic>
+      <p:pic>
+        <p:nvPicPr>
+          <p:cNvPr id="5" name="Picture 4">
+            <a:extLst>
+              <a:ext uri="{FF2B5EF4-FFF2-40B4-BE49-F238E27FC236}">
+                <a16:creationId xmlns:a16="http://schemas.microsoft.com/office/drawing/2014/main" id="{D51CCC5A-3E58-4DF4-9C64-7A7B1EE40464}"/>
+              </a:ext>
+            </a:extLst>
+          </p:cNvPr>
+          <p:cNvPicPr>
+            <a:picLocks noChangeAspect="1"/>
+          </p:cNvPicPr>
+          <p:nvPr/>
+        </p:nvPicPr>
+        <p:blipFill rotWithShape="1">
+          <a:blip r:embed="rId2"/>
+          <a:srcRect t="9157"/>
+          <a:stretch/>
+        </p:blipFill>
+        <p:spPr>
+          <a:xfrm>
+            <a:off x="3600498" y="1530409"/>
+            <a:ext cx="4991004" cy="3644491"/>
+          </a:xfrm>
+          <a:prstGeom prst="rect">
+            <a:avLst/>
+          </a:prstGeom>
+        </p:spPr>
+      </p:pic>
+      <p:sp>
+        <p:nvSpPr>
+          <p:cNvPr id="6" name="Rectangle 5">
+            <a:extLst>
+              <a:ext uri="{FF2B5EF4-FFF2-40B4-BE49-F238E27FC236}">
+                <a16:creationId xmlns:a16="http://schemas.microsoft.com/office/drawing/2014/main" id="{0D5AD0C1-71DF-43B6-BECA-353DCC17922F}"/>
+              </a:ext>
+            </a:extLst>
+          </p:cNvPr>
+          <p:cNvSpPr/>
+          <p:nvPr/>
+        </p:nvSpPr>
+        <p:spPr>
+          <a:xfrm>
+            <a:off x="5887689" y="2527159"/>
+            <a:ext cx="1050006" cy="278957"/>
+          </a:xfrm>
+          <a:prstGeom prst="rect">
+            <a:avLst/>
+          </a:prstGeom>
+        </p:spPr>
+        <p:style>
+          <a:lnRef idx="2">
+            <a:schemeClr val="accent1">
+              <a:shade val="50000"/>
+            </a:schemeClr>
+          </a:lnRef>
+          <a:fillRef idx="1">
+            <a:schemeClr val="accent1"/>
+          </a:fillRef>
+          <a:effectRef idx="0">
+            <a:schemeClr val="accent1"/>
+          </a:effectRef>
+          <a:fontRef idx="minor">
+            <a:schemeClr val="lt1"/>
+          </a:fontRef>
+        </p:style>
+        <p:txBody>
+          <a:bodyPr rtlCol="0" anchor="ctr"/>
+          <a:lstStyle/>
+          <a:p>
+            <a:pPr algn="ctr"/>
+            <a:endParaRPr lang="en-US"/>
+          </a:p>
+        </p:txBody>
+      </p:sp>
+      <p:sp>
+        <p:nvSpPr>
+          <p:cNvPr id="7" name="Rectangle 6">
+            <a:extLst>
+              <a:ext uri="{FF2B5EF4-FFF2-40B4-BE49-F238E27FC236}">
+                <a16:creationId xmlns:a16="http://schemas.microsoft.com/office/drawing/2014/main" id="{0D815927-C90B-4605-BC20-A86934E5A2FE}"/>
+              </a:ext>
+            </a:extLst>
+          </p:cNvPr>
+          <p:cNvSpPr/>
+          <p:nvPr/>
+        </p:nvSpPr>
+        <p:spPr>
+          <a:xfrm>
+            <a:off x="5887689" y="3073697"/>
+            <a:ext cx="1050006" cy="278957"/>
+          </a:xfrm>
+          <a:prstGeom prst="rect">
+            <a:avLst/>
+          </a:prstGeom>
+        </p:spPr>
+        <p:style>
+          <a:lnRef idx="2">
+            <a:schemeClr val="accent1">
+              <a:shade val="50000"/>
+            </a:schemeClr>
+          </a:lnRef>
+          <a:fillRef idx="1">
+            <a:schemeClr val="accent1"/>
+          </a:fillRef>
+          <a:effectRef idx="0">
+            <a:schemeClr val="accent1"/>
+          </a:effectRef>
+          <a:fontRef idx="minor">
+            <a:schemeClr val="lt1"/>
+          </a:fontRef>
+        </p:style>
+        <p:txBody>
+          <a:bodyPr rtlCol="0" anchor="ctr"/>
+          <a:lstStyle/>
+          <a:p>
+            <a:pPr algn="ctr"/>
+            <a:endParaRPr lang="en-US"/>
+          </a:p>
+        </p:txBody>
+      </p:sp>
+      <p:sp>
+        <p:nvSpPr>
+          <p:cNvPr id="8" name="Rectangle 7">
+            <a:extLst>
+              <a:ext uri="{FF2B5EF4-FFF2-40B4-BE49-F238E27FC236}">
+                <a16:creationId xmlns:a16="http://schemas.microsoft.com/office/drawing/2014/main" id="{1DE12FBA-464A-4321-B05A-9CC4ECC7FF05}"/>
+              </a:ext>
+            </a:extLst>
+          </p:cNvPr>
+          <p:cNvSpPr/>
+          <p:nvPr/>
+        </p:nvSpPr>
+        <p:spPr>
+          <a:xfrm>
+            <a:off x="5887689" y="3398072"/>
+            <a:ext cx="1050006" cy="278957"/>
+          </a:xfrm>
+          <a:prstGeom prst="rect">
+            <a:avLst/>
+          </a:prstGeom>
+        </p:spPr>
+        <p:style>
+          <a:lnRef idx="2">
+            <a:schemeClr val="accent1">
+              <a:shade val="50000"/>
+            </a:schemeClr>
+          </a:lnRef>
+          <a:fillRef idx="1">
+            <a:schemeClr val="accent1"/>
+          </a:fillRef>
+          <a:effectRef idx="0">
+            <a:schemeClr val="accent1"/>
+          </a:effectRef>
+          <a:fontRef idx="minor">
+            <a:schemeClr val="lt1"/>
+          </a:fontRef>
+        </p:style>
+        <p:txBody>
+          <a:bodyPr rtlCol="0" anchor="ctr"/>
+          <a:lstStyle/>
+          <a:p>
+            <a:pPr algn="ctr"/>
+            <a:endParaRPr lang="en-US"/>
+          </a:p>
+        </p:txBody>
+      </p:sp>
+      <p:sp>
+        <p:nvSpPr>
+          <p:cNvPr id="9" name="TextBox 8">
+            <a:extLst>
+              <a:ext uri="{FF2B5EF4-FFF2-40B4-BE49-F238E27FC236}">
+                <a16:creationId xmlns:a16="http://schemas.microsoft.com/office/drawing/2014/main" id="{17A371FA-1CAF-403B-AF63-B98CCD3B7A2A}"/>
+              </a:ext>
+            </a:extLst>
+          </p:cNvPr>
+          <p:cNvSpPr txBox="1"/>
+          <p:nvPr/>
+        </p:nvSpPr>
+        <p:spPr>
+          <a:xfrm>
+            <a:off x="3879908" y="5620624"/>
+            <a:ext cx="721608" cy="369332"/>
+          </a:xfrm>
+          <a:prstGeom prst="rect">
+            <a:avLst/>
+          </a:prstGeom>
+          <a:noFill/>
+        </p:spPr>
+        <p:txBody>
+          <a:bodyPr wrap="none" rtlCol="0">
+            <a:spAutoFit/>
+          </a:bodyPr>
+          <a:lstStyle/>
+          <a:p>
+            <a:r>
+              <a:rPr lang="en-US" dirty="0"/>
+              <a:t>for all</a:t>
+            </a:r>
+          </a:p>
+        </p:txBody>
+      </p:sp>
+    </p:spTree>
+    <p:extLst>
+      <p:ext uri="{BB962C8B-B14F-4D97-AF65-F5344CB8AC3E}">
+        <p14:creationId xmlns:p14="http://schemas.microsoft.com/office/powerpoint/2010/main" val="3907386765"/>
+      </p:ext>
+    </p:extLst>
+  </p:cSld>
+  <p:clrMapOvr>
+    <a:masterClrMapping/>
+  </p:clrMapOvr>
+</p:sld>
+</file>
+
 <file path=ppt/theme/theme1.xml><?xml version="1.0" encoding="utf-8"?>
 <a:theme xmlns:a="http://schemas.openxmlformats.org/drawingml/2006/main" name="Office Theme">
   <a:themeElements>

</xml_diff>

<commit_message>
Optimize out unnecessary arithmetics in kernel computation
</commit_message>
<xml_diff>
--- a/paper/figures.pptx
+++ b/paper/figures.pptx
@@ -8,6 +8,7 @@
     <p:sldId id="256" r:id="rId2"/>
     <p:sldId id="257" r:id="rId3"/>
     <p:sldId id="258" r:id="rId4"/>
+    <p:sldId id="259" r:id="rId5"/>
   </p:sldIdLst>
   <p:sldSz cx="12192000" cy="6858000"/>
   <p:notesSz cx="6858000" cy="9144000"/>
@@ -261,7 +262,7 @@
           <a:p>
             <a:fld id="{8A6AE6C4-E2B5-4993-A983-93BFE2454AE7}" type="datetimeFigureOut">
               <a:rPr lang="en-US" smtClean="0"/>
-              <a:t>5/23/2018</a:t>
+              <a:t>5/28/2018</a:t>
             </a:fld>
             <a:endParaRPr lang="en-US"/>
           </a:p>
@@ -459,7 +460,7 @@
           <a:p>
             <a:fld id="{8A6AE6C4-E2B5-4993-A983-93BFE2454AE7}" type="datetimeFigureOut">
               <a:rPr lang="en-US" smtClean="0"/>
-              <a:t>5/23/2018</a:t>
+              <a:t>5/28/2018</a:t>
             </a:fld>
             <a:endParaRPr lang="en-US"/>
           </a:p>
@@ -667,7 +668,7 @@
           <a:p>
             <a:fld id="{8A6AE6C4-E2B5-4993-A983-93BFE2454AE7}" type="datetimeFigureOut">
               <a:rPr lang="en-US" smtClean="0"/>
-              <a:t>5/23/2018</a:t>
+              <a:t>5/28/2018</a:t>
             </a:fld>
             <a:endParaRPr lang="en-US"/>
           </a:p>
@@ -865,7 +866,7 @@
           <a:p>
             <a:fld id="{8A6AE6C4-E2B5-4993-A983-93BFE2454AE7}" type="datetimeFigureOut">
               <a:rPr lang="en-US" smtClean="0"/>
-              <a:t>5/23/2018</a:t>
+              <a:t>5/28/2018</a:t>
             </a:fld>
             <a:endParaRPr lang="en-US"/>
           </a:p>
@@ -1140,7 +1141,7 @@
           <a:p>
             <a:fld id="{8A6AE6C4-E2B5-4993-A983-93BFE2454AE7}" type="datetimeFigureOut">
               <a:rPr lang="en-US" smtClean="0"/>
-              <a:t>5/23/2018</a:t>
+              <a:t>5/28/2018</a:t>
             </a:fld>
             <a:endParaRPr lang="en-US"/>
           </a:p>
@@ -1405,7 +1406,7 @@
           <a:p>
             <a:fld id="{8A6AE6C4-E2B5-4993-A983-93BFE2454AE7}" type="datetimeFigureOut">
               <a:rPr lang="en-US" smtClean="0"/>
-              <a:t>5/23/2018</a:t>
+              <a:t>5/28/2018</a:t>
             </a:fld>
             <a:endParaRPr lang="en-US"/>
           </a:p>
@@ -1817,7 +1818,7 @@
           <a:p>
             <a:fld id="{8A6AE6C4-E2B5-4993-A983-93BFE2454AE7}" type="datetimeFigureOut">
               <a:rPr lang="en-US" smtClean="0"/>
-              <a:t>5/23/2018</a:t>
+              <a:t>5/28/2018</a:t>
             </a:fld>
             <a:endParaRPr lang="en-US"/>
           </a:p>
@@ -1958,7 +1959,7 @@
           <a:p>
             <a:fld id="{8A6AE6C4-E2B5-4993-A983-93BFE2454AE7}" type="datetimeFigureOut">
               <a:rPr lang="en-US" smtClean="0"/>
-              <a:t>5/23/2018</a:t>
+              <a:t>5/28/2018</a:t>
             </a:fld>
             <a:endParaRPr lang="en-US"/>
           </a:p>
@@ -2071,7 +2072,7 @@
           <a:p>
             <a:fld id="{8A6AE6C4-E2B5-4993-A983-93BFE2454AE7}" type="datetimeFigureOut">
               <a:rPr lang="en-US" smtClean="0"/>
-              <a:t>5/23/2018</a:t>
+              <a:t>5/28/2018</a:t>
             </a:fld>
             <a:endParaRPr lang="en-US"/>
           </a:p>
@@ -2382,7 +2383,7 @@
           <a:p>
             <a:fld id="{8A6AE6C4-E2B5-4993-A983-93BFE2454AE7}" type="datetimeFigureOut">
               <a:rPr lang="en-US" smtClean="0"/>
-              <a:t>5/23/2018</a:t>
+              <a:t>5/28/2018</a:t>
             </a:fld>
             <a:endParaRPr lang="en-US"/>
           </a:p>
@@ -2670,7 +2671,7 @@
           <a:p>
             <a:fld id="{8A6AE6C4-E2B5-4993-A983-93BFE2454AE7}" type="datetimeFigureOut">
               <a:rPr lang="en-US" smtClean="0"/>
-              <a:t>5/23/2018</a:t>
+              <a:t>5/28/2018</a:t>
             </a:fld>
             <a:endParaRPr lang="en-US"/>
           </a:p>
@@ -2911,7 +2912,7 @@
           <a:p>
             <a:fld id="{8A6AE6C4-E2B5-4993-A983-93BFE2454AE7}" type="datetimeFigureOut">
               <a:rPr lang="en-US" smtClean="0"/>
-              <a:t>5/23/2018</a:t>
+              <a:t>5/28/2018</a:t>
             </a:fld>
             <a:endParaRPr lang="en-US"/>
           </a:p>
@@ -5543,6 +5544,365 @@
 </p:sld>
 </file>
 
+<file path=ppt/slides/slide4.xml><?xml version="1.0" encoding="utf-8"?>
+<p:sld xmlns:a="http://schemas.openxmlformats.org/drawingml/2006/main" xmlns:r="http://schemas.openxmlformats.org/officeDocument/2006/relationships" xmlns:p="http://schemas.openxmlformats.org/presentationml/2006/main">
+  <p:cSld>
+    <p:spTree>
+      <p:nvGrpSpPr>
+        <p:cNvPr id="1" name=""/>
+        <p:cNvGrpSpPr/>
+        <p:nvPr/>
+      </p:nvGrpSpPr>
+      <p:grpSpPr>
+        <a:xfrm>
+          <a:off x="0" y="0"/>
+          <a:ext cx="0" cy="0"/>
+          <a:chOff x="0" y="0"/>
+          <a:chExt cx="0" cy="0"/>
+        </a:xfrm>
+      </p:grpSpPr>
+      <p:pic>
+        <p:nvPicPr>
+          <p:cNvPr id="13" name="Picture 12" descr="A picture containing sky&#10;&#10;Description generated with very high confidence">
+            <a:extLst>
+              <a:ext uri="{FF2B5EF4-FFF2-40B4-BE49-F238E27FC236}">
+                <a16:creationId xmlns:a16="http://schemas.microsoft.com/office/drawing/2014/main" id="{D2E8C467-DCE1-4694-9C4F-E3530C497DD2}"/>
+              </a:ext>
+            </a:extLst>
+          </p:cNvPr>
+          <p:cNvPicPr>
+            <a:picLocks noChangeAspect="1"/>
+          </p:cNvPicPr>
+          <p:nvPr/>
+        </p:nvPicPr>
+        <p:blipFill>
+          <a:blip r:embed="rId2">
+            <a:duotone>
+              <a:prstClr val="black"/>
+              <a:schemeClr val="tx2">
+                <a:tint val="45000"/>
+                <a:satMod val="400000"/>
+              </a:schemeClr>
+            </a:duotone>
+            <a:extLst>
+              <a:ext uri="{BEBA8EAE-BF5A-486C-A8C5-ECC9F3942E4B}">
+                <a14:imgProps xmlns:a14="http://schemas.microsoft.com/office/drawing/2010/main">
+                  <a14:imgLayer r:embed="rId3">
+                    <a14:imgEffect>
+                      <a14:artisticCutout/>
+                    </a14:imgEffect>
+                    <a14:imgEffect>
+                      <a14:sharpenSoften amount="100000"/>
+                    </a14:imgEffect>
+                    <a14:imgEffect>
+                      <a14:brightnessContrast bright="-100000" contrast="87000"/>
+                    </a14:imgEffect>
+                  </a14:imgLayer>
+                </a14:imgProps>
+              </a:ext>
+              <a:ext uri="{28A0092B-C50C-407E-A947-70E740481C1C}">
+                <a14:useLocalDpi xmlns:a14="http://schemas.microsoft.com/office/drawing/2010/main" val="0"/>
+              </a:ext>
+            </a:extLst>
+          </a:blip>
+          <a:stretch>
+            <a:fillRect/>
+          </a:stretch>
+        </p:blipFill>
+        <p:spPr>
+          <a:xfrm>
+            <a:off x="4145111" y="2382429"/>
+            <a:ext cx="3901778" cy="2093141"/>
+          </a:xfrm>
+          <a:prstGeom prst="rect">
+            <a:avLst/>
+          </a:prstGeom>
+        </p:spPr>
+      </p:pic>
+      <p:sp>
+        <p:nvSpPr>
+          <p:cNvPr id="14" name="TextBox 13">
+            <a:extLst>
+              <a:ext uri="{FF2B5EF4-FFF2-40B4-BE49-F238E27FC236}">
+                <a16:creationId xmlns:a16="http://schemas.microsoft.com/office/drawing/2014/main" id="{B431CC24-48A3-4BFF-BE5D-26661EC61834}"/>
+              </a:ext>
+            </a:extLst>
+          </p:cNvPr>
+          <p:cNvSpPr txBox="1"/>
+          <p:nvPr/>
+        </p:nvSpPr>
+        <p:spPr>
+          <a:xfrm>
+            <a:off x="5994401" y="4399280"/>
+            <a:ext cx="419099" cy="139699"/>
+          </a:xfrm>
+          <a:prstGeom prst="rect">
+            <a:avLst/>
+          </a:prstGeom>
+          <a:solidFill>
+            <a:schemeClr val="bg1"/>
+          </a:solidFill>
+        </p:spPr>
+        <p:txBody>
+          <a:bodyPr wrap="square" rtlCol="0">
+            <a:spAutoFit/>
+          </a:bodyPr>
+          <a:lstStyle/>
+          <a:p>
+            <a:endParaRPr lang="en-US" sz="1050" dirty="0"/>
+          </a:p>
+        </p:txBody>
+      </p:sp>
+      <p:sp>
+        <p:nvSpPr>
+          <p:cNvPr id="15" name="Rectangle 14">
+            <a:extLst>
+              <a:ext uri="{FF2B5EF4-FFF2-40B4-BE49-F238E27FC236}">
+                <a16:creationId xmlns:a16="http://schemas.microsoft.com/office/drawing/2014/main" id="{C6A7F9A0-3310-4AC0-9AB7-8CD301348580}"/>
+              </a:ext>
+            </a:extLst>
+          </p:cNvPr>
+          <p:cNvSpPr/>
+          <p:nvPr/>
+        </p:nvSpPr>
+        <p:spPr>
+          <a:xfrm>
+            <a:off x="5934485" y="4323535"/>
+            <a:ext cx="538930" cy="215444"/>
+          </a:xfrm>
+          <a:prstGeom prst="rect">
+            <a:avLst/>
+          </a:prstGeom>
+        </p:spPr>
+        <p:txBody>
+          <a:bodyPr wrap="none">
+            <a:spAutoFit/>
+          </a:bodyPr>
+          <a:lstStyle/>
+          <a:p>
+            <a:r>
+              <a:rPr lang="en-US" sz="800" dirty="0"/>
+              <a:t>Particles</a:t>
+            </a:r>
+          </a:p>
+        </p:txBody>
+      </p:sp>
+      <p:sp>
+        <p:nvSpPr>
+          <p:cNvPr id="16" name="Rectangle 15">
+            <a:extLst>
+              <a:ext uri="{FF2B5EF4-FFF2-40B4-BE49-F238E27FC236}">
+                <a16:creationId xmlns:a16="http://schemas.microsoft.com/office/drawing/2014/main" id="{1D59E58E-1A52-4DDA-BEA8-99245D66AD8F}"/>
+              </a:ext>
+            </a:extLst>
+          </p:cNvPr>
+          <p:cNvSpPr/>
+          <p:nvPr/>
+        </p:nvSpPr>
+        <p:spPr>
+          <a:xfrm rot="19374929">
+            <a:off x="7058660" y="2151381"/>
+            <a:ext cx="706120" cy="530860"/>
+          </a:xfrm>
+          <a:prstGeom prst="rect">
+            <a:avLst/>
+          </a:prstGeom>
+          <a:solidFill>
+            <a:schemeClr val="bg1"/>
+          </a:solidFill>
+          <a:ln>
+            <a:solidFill>
+              <a:schemeClr val="bg1"/>
+            </a:solidFill>
+          </a:ln>
+        </p:spPr>
+        <p:style>
+          <a:lnRef idx="2">
+            <a:schemeClr val="accent1">
+              <a:shade val="50000"/>
+            </a:schemeClr>
+          </a:lnRef>
+          <a:fillRef idx="1">
+            <a:schemeClr val="accent1"/>
+          </a:fillRef>
+          <a:effectRef idx="0">
+            <a:schemeClr val="accent1"/>
+          </a:effectRef>
+          <a:fontRef idx="minor">
+            <a:schemeClr val="lt1"/>
+          </a:fontRef>
+        </p:style>
+        <p:txBody>
+          <a:bodyPr rtlCol="0" anchor="ctr"/>
+          <a:lstStyle/>
+          <a:p>
+            <a:pPr algn="ctr"/>
+            <a:endParaRPr lang="en-US"/>
+          </a:p>
+        </p:txBody>
+      </p:sp>
+      <mc:AlternateContent xmlns:mc="http://schemas.openxmlformats.org/markup-compatibility/2006">
+        <mc:Choice xmlns:a14="http://schemas.microsoft.com/office/drawing/2010/main" Requires="a14">
+          <p:sp>
+            <p:nvSpPr>
+              <p:cNvPr id="17" name="Rectangle 16">
+                <a:extLst>
+                  <a:ext uri="{FF2B5EF4-FFF2-40B4-BE49-F238E27FC236}">
+                    <a16:creationId xmlns:a16="http://schemas.microsoft.com/office/drawing/2014/main" id="{2175315E-D58D-47C5-82FA-DC324E5E6402}"/>
+                  </a:ext>
+                </a:extLst>
+              </p:cNvPr>
+              <p:cNvSpPr/>
+              <p:nvPr/>
+            </p:nvSpPr>
+            <p:spPr>
+              <a:xfrm>
+                <a:off x="7019356" y="2339569"/>
+                <a:ext cx="677493" cy="338554"/>
+              </a:xfrm>
+              <a:prstGeom prst="rect">
+                <a:avLst/>
+              </a:prstGeom>
+            </p:spPr>
+            <p:txBody>
+              <a:bodyPr wrap="none">
+                <a:spAutoFit/>
+              </a:bodyPr>
+              <a:lstStyle/>
+              <a:p>
+                <a:pPr algn="ctr"/>
+                <a:r>
+                  <a:rPr lang="en-US" sz="800" dirty="0"/>
+                  <a:t>Property </a:t>
+                </a:r>
+                <a14:m>
+                  <m:oMath xmlns:m="http://schemas.openxmlformats.org/officeDocument/2006/math">
+                    <m:r>
+                      <a:rPr lang="en-US" sz="800" i="1" dirty="0">
+                        <a:latin typeface="Cambria Math" panose="02040503050406030204" pitchFamily="18" charset="0"/>
+                      </a:rPr>
+                      <m:t>𝐴</m:t>
+                    </m:r>
+                  </m:oMath>
+                </a14:m>
+                <a:endParaRPr lang="en-US" sz="800" i="1" dirty="0"/>
+              </a:p>
+              <a:p>
+                <a:pPr algn="ctr"/>
+                <a:r>
+                  <a:rPr lang="en-US" sz="800" dirty="0"/>
+                  <a:t>e.g. </a:t>
+                </a:r>
+                <a14:m>
+                  <m:oMath xmlns:m="http://schemas.openxmlformats.org/officeDocument/2006/math">
+                    <m:r>
+                      <a:rPr lang="en-US" sz="800" i="1">
+                        <a:latin typeface="Cambria Math" panose="02040503050406030204" pitchFamily="18" charset="0"/>
+                      </a:rPr>
+                      <m:t>𝜌</m:t>
+                    </m:r>
+                    <m:r>
+                      <a:rPr lang="en-US" sz="800" i="1">
+                        <a:latin typeface="Cambria Math" panose="02040503050406030204" pitchFamily="18" charset="0"/>
+                      </a:rPr>
+                      <m:t>, </m:t>
+                    </m:r>
+                    <m:d>
+                      <m:dPr>
+                        <m:begChr m:val="|"/>
+                        <m:endChr m:val="|"/>
+                        <m:ctrlPr>
+                          <a:rPr lang="en-US" sz="800" i="1">
+                            <a:latin typeface="Cambria Math" panose="02040503050406030204" pitchFamily="18" charset="0"/>
+                          </a:rPr>
+                        </m:ctrlPr>
+                      </m:dPr>
+                      <m:e>
+                        <m:r>
+                          <a:rPr lang="en-US" sz="800" b="1" i="1">
+                            <a:latin typeface="Cambria Math" panose="02040503050406030204" pitchFamily="18" charset="0"/>
+                          </a:rPr>
+                          <m:t>𝒗</m:t>
+                        </m:r>
+                      </m:e>
+                    </m:d>
+                    <m:r>
+                      <a:rPr lang="en-US" sz="800" b="1" i="1">
+                        <a:latin typeface="Cambria Math" panose="02040503050406030204" pitchFamily="18" charset="0"/>
+                      </a:rPr>
+                      <m:t>, </m:t>
+                    </m:r>
+                    <m:r>
+                      <a:rPr lang="en-US" sz="800" i="1">
+                        <a:latin typeface="Cambria Math" panose="02040503050406030204" pitchFamily="18" charset="0"/>
+                      </a:rPr>
+                      <m:t>𝑝</m:t>
+                    </m:r>
+                  </m:oMath>
+                </a14:m>
+                <a:endParaRPr lang="en-US" sz="800" dirty="0"/>
+              </a:p>
+            </p:txBody>
+          </p:sp>
+        </mc:Choice>
+        <mc:Fallback>
+          <p:sp>
+            <p:nvSpPr>
+              <p:cNvPr id="17" name="Rectangle 16">
+                <a:extLst>
+                  <a:ext uri="{FF2B5EF4-FFF2-40B4-BE49-F238E27FC236}">
+                    <a16:creationId xmlns:a16="http://schemas.microsoft.com/office/drawing/2014/main" id="{2175315E-D58D-47C5-82FA-DC324E5E6402}"/>
+                  </a:ext>
+                </a:extLst>
+              </p:cNvPr>
+              <p:cNvSpPr>
+                <a:spLocks noRot="1" noChangeAspect="1" noMove="1" noResize="1" noEditPoints="1" noAdjustHandles="1" noChangeArrowheads="1" noChangeShapeType="1" noTextEdit="1"/>
+              </p:cNvSpPr>
+              <p:nvPr/>
+            </p:nvSpPr>
+            <p:spPr>
+              <a:xfrm>
+                <a:off x="7019356" y="2339569"/>
+                <a:ext cx="677493" cy="338554"/>
+              </a:xfrm>
+              <a:prstGeom prst="rect">
+                <a:avLst/>
+              </a:prstGeom>
+              <a:blipFill>
+                <a:blip r:embed="rId4"/>
+                <a:stretch>
+                  <a:fillRect b="-7273"/>
+                </a:stretch>
+              </a:blipFill>
+            </p:spPr>
+            <p:txBody>
+              <a:bodyPr/>
+              <a:lstStyle/>
+              <a:p>
+                <a:r>
+                  <a:rPr lang="en-US">
+                    <a:noFill/>
+                  </a:rPr>
+                  <a:t> </a:t>
+                </a:r>
+              </a:p>
+            </p:txBody>
+          </p:sp>
+        </mc:Fallback>
+      </mc:AlternateContent>
+    </p:spTree>
+    <p:extLst>
+      <p:ext uri="{BB962C8B-B14F-4D97-AF65-F5344CB8AC3E}">
+        <p14:creationId xmlns:p14="http://schemas.microsoft.com/office/powerpoint/2010/main" val="51491462"/>
+      </p:ext>
+    </p:extLst>
+  </p:cSld>
+  <p:clrMapOvr>
+    <a:masterClrMapping/>
+  </p:clrMapOvr>
+</p:sld>
+</file>
+
 <file path=ppt/theme/theme1.xml><?xml version="1.0" encoding="utf-8"?>
 <a:theme xmlns:a="http://schemas.openxmlformats.org/drawingml/2006/main" name="Office Theme">
   <a:themeElements>

</xml_diff>

<commit_message>
Update thesis on normal restore.
</commit_message>
<xml_diff>
--- a/paper/figures.pptx
+++ b/paper/figures.pptx
@@ -12,6 +12,9 @@
     <p:sldId id="259" r:id="rId6"/>
     <p:sldId id="261" r:id="rId7"/>
     <p:sldId id="262" r:id="rId8"/>
+    <p:sldId id="263" r:id="rId9"/>
+    <p:sldId id="264" r:id="rId10"/>
+    <p:sldId id="265" r:id="rId11"/>
   </p:sldIdLst>
   <p:sldSz cx="12192000" cy="6858000"/>
   <p:notesSz cx="6858000" cy="9144000"/>
@@ -265,7 +268,7 @@
           <a:p>
             <a:fld id="{8A6AE6C4-E2B5-4993-A983-93BFE2454AE7}" type="datetimeFigureOut">
               <a:rPr lang="en-US" smtClean="0"/>
-              <a:t>6/2/2018</a:t>
+              <a:t>6/3/2018</a:t>
             </a:fld>
             <a:endParaRPr lang="en-US"/>
           </a:p>
@@ -463,7 +466,7 @@
           <a:p>
             <a:fld id="{8A6AE6C4-E2B5-4993-A983-93BFE2454AE7}" type="datetimeFigureOut">
               <a:rPr lang="en-US" smtClean="0"/>
-              <a:t>6/2/2018</a:t>
+              <a:t>6/3/2018</a:t>
             </a:fld>
             <a:endParaRPr lang="en-US"/>
           </a:p>
@@ -671,7 +674,7 @@
           <a:p>
             <a:fld id="{8A6AE6C4-E2B5-4993-A983-93BFE2454AE7}" type="datetimeFigureOut">
               <a:rPr lang="en-US" smtClean="0"/>
-              <a:t>6/2/2018</a:t>
+              <a:t>6/3/2018</a:t>
             </a:fld>
             <a:endParaRPr lang="en-US"/>
           </a:p>
@@ -869,7 +872,7 @@
           <a:p>
             <a:fld id="{8A6AE6C4-E2B5-4993-A983-93BFE2454AE7}" type="datetimeFigureOut">
               <a:rPr lang="en-US" smtClean="0"/>
-              <a:t>6/2/2018</a:t>
+              <a:t>6/3/2018</a:t>
             </a:fld>
             <a:endParaRPr lang="en-US"/>
           </a:p>
@@ -1144,7 +1147,7 @@
           <a:p>
             <a:fld id="{8A6AE6C4-E2B5-4993-A983-93BFE2454AE7}" type="datetimeFigureOut">
               <a:rPr lang="en-US" smtClean="0"/>
-              <a:t>6/2/2018</a:t>
+              <a:t>6/3/2018</a:t>
             </a:fld>
             <a:endParaRPr lang="en-US"/>
           </a:p>
@@ -1409,7 +1412,7 @@
           <a:p>
             <a:fld id="{8A6AE6C4-E2B5-4993-A983-93BFE2454AE7}" type="datetimeFigureOut">
               <a:rPr lang="en-US" smtClean="0"/>
-              <a:t>6/2/2018</a:t>
+              <a:t>6/3/2018</a:t>
             </a:fld>
             <a:endParaRPr lang="en-US"/>
           </a:p>
@@ -1821,7 +1824,7 @@
           <a:p>
             <a:fld id="{8A6AE6C4-E2B5-4993-A983-93BFE2454AE7}" type="datetimeFigureOut">
               <a:rPr lang="en-US" smtClean="0"/>
-              <a:t>6/2/2018</a:t>
+              <a:t>6/3/2018</a:t>
             </a:fld>
             <a:endParaRPr lang="en-US"/>
           </a:p>
@@ -1962,7 +1965,7 @@
           <a:p>
             <a:fld id="{8A6AE6C4-E2B5-4993-A983-93BFE2454AE7}" type="datetimeFigureOut">
               <a:rPr lang="en-US" smtClean="0"/>
-              <a:t>6/2/2018</a:t>
+              <a:t>6/3/2018</a:t>
             </a:fld>
             <a:endParaRPr lang="en-US"/>
           </a:p>
@@ -2075,7 +2078,7 @@
           <a:p>
             <a:fld id="{8A6AE6C4-E2B5-4993-A983-93BFE2454AE7}" type="datetimeFigureOut">
               <a:rPr lang="en-US" smtClean="0"/>
-              <a:t>6/2/2018</a:t>
+              <a:t>6/3/2018</a:t>
             </a:fld>
             <a:endParaRPr lang="en-US"/>
           </a:p>
@@ -2386,7 +2389,7 @@
           <a:p>
             <a:fld id="{8A6AE6C4-E2B5-4993-A983-93BFE2454AE7}" type="datetimeFigureOut">
               <a:rPr lang="en-US" smtClean="0"/>
-              <a:t>6/2/2018</a:t>
+              <a:t>6/3/2018</a:t>
             </a:fld>
             <a:endParaRPr lang="en-US"/>
           </a:p>
@@ -2674,7 +2677,7 @@
           <a:p>
             <a:fld id="{8A6AE6C4-E2B5-4993-A983-93BFE2454AE7}" type="datetimeFigureOut">
               <a:rPr lang="en-US" smtClean="0"/>
-              <a:t>6/2/2018</a:t>
+              <a:t>6/3/2018</a:t>
             </a:fld>
             <a:endParaRPr lang="en-US"/>
           </a:p>
@@ -2915,7 +2918,7 @@
           <a:p>
             <a:fld id="{8A6AE6C4-E2B5-4993-A983-93BFE2454AE7}" type="datetimeFigureOut">
               <a:rPr lang="en-US" smtClean="0"/>
-              <a:t>6/2/2018</a:t>
+              <a:t>6/3/2018</a:t>
             </a:fld>
             <a:endParaRPr lang="en-US"/>
           </a:p>
@@ -4432,6 +4435,832 @@
 </p:sld>
 </file>
 
+<file path=ppt/slides/slide10.xml><?xml version="1.0" encoding="utf-8"?>
+<p:sld xmlns:a="http://schemas.openxmlformats.org/drawingml/2006/main" xmlns:r="http://schemas.openxmlformats.org/officeDocument/2006/relationships" xmlns:p="http://schemas.openxmlformats.org/presentationml/2006/main">
+  <p:cSld>
+    <p:spTree>
+      <p:nvGrpSpPr>
+        <p:cNvPr id="1" name=""/>
+        <p:cNvGrpSpPr/>
+        <p:nvPr/>
+      </p:nvGrpSpPr>
+      <p:grpSpPr>
+        <a:xfrm>
+          <a:off x="0" y="0"/>
+          <a:ext cx="0" cy="0"/>
+          <a:chOff x="0" y="0"/>
+          <a:chExt cx="0" cy="0"/>
+        </a:xfrm>
+      </p:grpSpPr>
+      <p:sp>
+        <p:nvSpPr>
+          <p:cNvPr id="4" name="Rectangle 3">
+            <a:extLst>
+              <a:ext uri="{FF2B5EF4-FFF2-40B4-BE49-F238E27FC236}">
+                <a16:creationId xmlns:a16="http://schemas.microsoft.com/office/drawing/2014/main" id="{9A8248F7-A75C-4C46-951E-0AA09B33E793}"/>
+              </a:ext>
+            </a:extLst>
+          </p:cNvPr>
+          <p:cNvSpPr/>
+          <p:nvPr/>
+        </p:nvSpPr>
+        <p:spPr>
+          <a:xfrm>
+            <a:off x="2755781" y="2499878"/>
+            <a:ext cx="1677799" cy="1677799"/>
+          </a:xfrm>
+          <a:prstGeom prst="rect">
+            <a:avLst/>
+          </a:prstGeom>
+        </p:spPr>
+        <p:style>
+          <a:lnRef idx="2">
+            <a:schemeClr val="dk1"/>
+          </a:lnRef>
+          <a:fillRef idx="1">
+            <a:schemeClr val="lt1"/>
+          </a:fillRef>
+          <a:effectRef idx="0">
+            <a:schemeClr val="dk1"/>
+          </a:effectRef>
+          <a:fontRef idx="minor">
+            <a:schemeClr val="dk1"/>
+          </a:fontRef>
+        </p:style>
+        <p:txBody>
+          <a:bodyPr rtlCol="0" anchor="ctr"/>
+          <a:lstStyle/>
+          <a:p>
+            <a:pPr algn="ctr"/>
+            <a:endParaRPr lang="en-US" dirty="0"/>
+          </a:p>
+        </p:txBody>
+      </p:sp>
+      <p:cxnSp>
+        <p:nvCxnSpPr>
+          <p:cNvPr id="6" name="Straight Arrow Connector 5">
+            <a:extLst>
+              <a:ext uri="{FF2B5EF4-FFF2-40B4-BE49-F238E27FC236}">
+                <a16:creationId xmlns:a16="http://schemas.microsoft.com/office/drawing/2014/main" id="{7B3CF85B-700C-408A-BD1D-B44881A653AB}"/>
+              </a:ext>
+            </a:extLst>
+          </p:cNvPr>
+          <p:cNvCxnSpPr/>
+          <p:nvPr/>
+        </p:nvCxnSpPr>
+        <p:spPr>
+          <a:xfrm>
+            <a:off x="2755782" y="2252443"/>
+            <a:ext cx="1677799" cy="0"/>
+          </a:xfrm>
+          <a:prstGeom prst="straightConnector1">
+            <a:avLst/>
+          </a:prstGeom>
+          <a:ln w="19050">
+            <a:tailEnd type="triangle"/>
+          </a:ln>
+        </p:spPr>
+        <p:style>
+          <a:lnRef idx="1">
+            <a:schemeClr val="dk1"/>
+          </a:lnRef>
+          <a:fillRef idx="0">
+            <a:schemeClr val="dk1"/>
+          </a:fillRef>
+          <a:effectRef idx="0">
+            <a:schemeClr val="dk1"/>
+          </a:effectRef>
+          <a:fontRef idx="minor">
+            <a:schemeClr val="tx1"/>
+          </a:fontRef>
+        </p:style>
+      </p:cxnSp>
+      <p:cxnSp>
+        <p:nvCxnSpPr>
+          <p:cNvPr id="8" name="Straight Arrow Connector 7">
+            <a:extLst>
+              <a:ext uri="{FF2B5EF4-FFF2-40B4-BE49-F238E27FC236}">
+                <a16:creationId xmlns:a16="http://schemas.microsoft.com/office/drawing/2014/main" id="{48888519-7078-4A9E-945D-9890E6137B4F}"/>
+              </a:ext>
+            </a:extLst>
+          </p:cNvPr>
+          <p:cNvCxnSpPr/>
+          <p:nvPr/>
+        </p:nvCxnSpPr>
+        <p:spPr>
+          <a:xfrm>
+            <a:off x="2520892" y="2499919"/>
+            <a:ext cx="0" cy="1677799"/>
+          </a:xfrm>
+          <a:prstGeom prst="straightConnector1">
+            <a:avLst/>
+          </a:prstGeom>
+          <a:ln w="19050">
+            <a:tailEnd type="triangle"/>
+          </a:ln>
+        </p:spPr>
+        <p:style>
+          <a:lnRef idx="1">
+            <a:schemeClr val="dk1"/>
+          </a:lnRef>
+          <a:fillRef idx="0">
+            <a:schemeClr val="dk1"/>
+          </a:fillRef>
+          <a:effectRef idx="0">
+            <a:schemeClr val="dk1"/>
+          </a:effectRef>
+          <a:fontRef idx="minor">
+            <a:schemeClr val="tx1"/>
+          </a:fontRef>
+        </p:style>
+      </p:cxnSp>
+      <p:sp>
+        <p:nvSpPr>
+          <p:cNvPr id="9" name="TextBox 8">
+            <a:extLst>
+              <a:ext uri="{FF2B5EF4-FFF2-40B4-BE49-F238E27FC236}">
+                <a16:creationId xmlns:a16="http://schemas.microsoft.com/office/drawing/2014/main" id="{3E517924-78DD-43BE-B544-BA642F791957}"/>
+              </a:ext>
+            </a:extLst>
+          </p:cNvPr>
+          <p:cNvSpPr txBox="1"/>
+          <p:nvPr/>
+        </p:nvSpPr>
+        <p:spPr>
+          <a:xfrm>
+            <a:off x="2370048" y="2059388"/>
+            <a:ext cx="301686" cy="369332"/>
+          </a:xfrm>
+          <a:prstGeom prst="rect">
+            <a:avLst/>
+          </a:prstGeom>
+          <a:noFill/>
+        </p:spPr>
+        <p:txBody>
+          <a:bodyPr wrap="none" rtlCol="0">
+            <a:spAutoFit/>
+          </a:bodyPr>
+          <a:lstStyle/>
+          <a:p>
+            <a:r>
+              <a:rPr lang="en-US" dirty="0"/>
+              <a:t>0</a:t>
+            </a:r>
+          </a:p>
+        </p:txBody>
+      </p:sp>
+      <mc:AlternateContent xmlns:mc="http://schemas.openxmlformats.org/markup-compatibility/2006">
+        <mc:Choice xmlns:a14="http://schemas.microsoft.com/office/drawing/2010/main" Requires="a14">
+          <p:sp>
+            <p:nvSpPr>
+              <p:cNvPr id="10" name="TextBox 9">
+                <a:extLst>
+                  <a:ext uri="{FF2B5EF4-FFF2-40B4-BE49-F238E27FC236}">
+                    <a16:creationId xmlns:a16="http://schemas.microsoft.com/office/drawing/2014/main" id="{BD397D1A-EC87-498D-8138-BE3C59E34535}"/>
+                  </a:ext>
+                </a:extLst>
+              </p:cNvPr>
+              <p:cNvSpPr txBox="1"/>
+              <p:nvPr/>
+            </p:nvSpPr>
+            <p:spPr>
+              <a:xfrm>
+                <a:off x="4517631" y="2059388"/>
+                <a:ext cx="367986" cy="369332"/>
+              </a:xfrm>
+              <a:prstGeom prst="rect">
+                <a:avLst/>
+              </a:prstGeom>
+              <a:noFill/>
+            </p:spPr>
+            <p:txBody>
+              <a:bodyPr wrap="none" rtlCol="0">
+                <a:spAutoFit/>
+              </a:bodyPr>
+              <a:lstStyle/>
+              <a:p>
+                <a14:m>
+                  <m:oMathPara xmlns:m="http://schemas.openxmlformats.org/officeDocument/2006/math">
+                    <m:oMathParaPr>
+                      <m:jc m:val="centerGroup"/>
+                    </m:oMathParaPr>
+                    <m:oMath xmlns:m="http://schemas.openxmlformats.org/officeDocument/2006/math">
+                      <m:r>
+                        <a:rPr lang="en-US" b="0" i="1" smtClean="0">
+                          <a:latin typeface="Cambria Math" panose="02040503050406030204" pitchFamily="18" charset="0"/>
+                        </a:rPr>
+                        <m:t>𝑥</m:t>
+                      </m:r>
+                    </m:oMath>
+                  </m:oMathPara>
+                </a14:m>
+                <a:endParaRPr lang="en-US" dirty="0"/>
+              </a:p>
+            </p:txBody>
+          </p:sp>
+        </mc:Choice>
+        <mc:Fallback>
+          <p:sp>
+            <p:nvSpPr>
+              <p:cNvPr id="10" name="TextBox 9">
+                <a:extLst>
+                  <a:ext uri="{FF2B5EF4-FFF2-40B4-BE49-F238E27FC236}">
+                    <a16:creationId xmlns:a16="http://schemas.microsoft.com/office/drawing/2014/main" id="{BD397D1A-EC87-498D-8138-BE3C59E34535}"/>
+                  </a:ext>
+                </a:extLst>
+              </p:cNvPr>
+              <p:cNvSpPr txBox="1">
+                <a:spLocks noRot="1" noChangeAspect="1" noMove="1" noResize="1" noEditPoints="1" noAdjustHandles="1" noChangeArrowheads="1" noChangeShapeType="1" noTextEdit="1"/>
+              </p:cNvSpPr>
+              <p:nvPr/>
+            </p:nvSpPr>
+            <p:spPr>
+              <a:xfrm>
+                <a:off x="4517631" y="2059388"/>
+                <a:ext cx="367986" cy="369332"/>
+              </a:xfrm>
+              <a:prstGeom prst="rect">
+                <a:avLst/>
+              </a:prstGeom>
+              <a:blipFill>
+                <a:blip r:embed="rId2"/>
+                <a:stretch>
+                  <a:fillRect/>
+                </a:stretch>
+              </a:blipFill>
+            </p:spPr>
+            <p:txBody>
+              <a:bodyPr/>
+              <a:lstStyle/>
+              <a:p>
+                <a:r>
+                  <a:rPr lang="en-US">
+                    <a:noFill/>
+                  </a:rPr>
+                  <a:t> </a:t>
+                </a:r>
+              </a:p>
+            </p:txBody>
+          </p:sp>
+        </mc:Fallback>
+      </mc:AlternateContent>
+      <mc:AlternateContent xmlns:mc="http://schemas.openxmlformats.org/markup-compatibility/2006">
+        <mc:Choice xmlns:a14="http://schemas.microsoft.com/office/drawing/2010/main" Requires="a14">
+          <p:sp>
+            <p:nvSpPr>
+              <p:cNvPr id="11" name="TextBox 10">
+                <a:extLst>
+                  <a:ext uri="{FF2B5EF4-FFF2-40B4-BE49-F238E27FC236}">
+                    <a16:creationId xmlns:a16="http://schemas.microsoft.com/office/drawing/2014/main" id="{3A07F576-DEFF-4028-BB02-2F3B3124BFBF}"/>
+                  </a:ext>
+                </a:extLst>
+              </p:cNvPr>
+              <p:cNvSpPr txBox="1"/>
+              <p:nvPr/>
+            </p:nvSpPr>
+            <p:spPr>
+              <a:xfrm>
+                <a:off x="2335199" y="4244615"/>
+                <a:ext cx="371384" cy="369332"/>
+              </a:xfrm>
+              <a:prstGeom prst="rect">
+                <a:avLst/>
+              </a:prstGeom>
+              <a:noFill/>
+            </p:spPr>
+            <p:txBody>
+              <a:bodyPr wrap="none" rtlCol="0">
+                <a:spAutoFit/>
+              </a:bodyPr>
+              <a:lstStyle/>
+              <a:p>
+                <a14:m>
+                  <m:oMathPara xmlns:m="http://schemas.openxmlformats.org/officeDocument/2006/math">
+                    <m:oMathParaPr>
+                      <m:jc m:val="centerGroup"/>
+                    </m:oMathParaPr>
+                    <m:oMath xmlns:m="http://schemas.openxmlformats.org/officeDocument/2006/math">
+                      <m:r>
+                        <a:rPr lang="en-US" i="1" dirty="0" smtClean="0">
+                          <a:latin typeface="Cambria Math" panose="02040503050406030204" pitchFamily="18" charset="0"/>
+                        </a:rPr>
+                        <m:t>𝑦</m:t>
+                      </m:r>
+                    </m:oMath>
+                  </m:oMathPara>
+                </a14:m>
+                <a:endParaRPr lang="en-US" dirty="0"/>
+              </a:p>
+            </p:txBody>
+          </p:sp>
+        </mc:Choice>
+        <mc:Fallback>
+          <p:sp>
+            <p:nvSpPr>
+              <p:cNvPr id="11" name="TextBox 10">
+                <a:extLst>
+                  <a:ext uri="{FF2B5EF4-FFF2-40B4-BE49-F238E27FC236}">
+                    <a16:creationId xmlns:a16="http://schemas.microsoft.com/office/drawing/2014/main" id="{3A07F576-DEFF-4028-BB02-2F3B3124BFBF}"/>
+                  </a:ext>
+                </a:extLst>
+              </p:cNvPr>
+              <p:cNvSpPr txBox="1">
+                <a:spLocks noRot="1" noChangeAspect="1" noMove="1" noResize="1" noEditPoints="1" noAdjustHandles="1" noChangeArrowheads="1" noChangeShapeType="1" noTextEdit="1"/>
+              </p:cNvSpPr>
+              <p:nvPr/>
+            </p:nvSpPr>
+            <p:spPr>
+              <a:xfrm>
+                <a:off x="2335199" y="4244615"/>
+                <a:ext cx="371384" cy="369332"/>
+              </a:xfrm>
+              <a:prstGeom prst="rect">
+                <a:avLst/>
+              </a:prstGeom>
+              <a:blipFill>
+                <a:blip r:embed="rId3"/>
+                <a:stretch>
+                  <a:fillRect b="-6557"/>
+                </a:stretch>
+              </a:blipFill>
+            </p:spPr>
+            <p:txBody>
+              <a:bodyPr/>
+              <a:lstStyle/>
+              <a:p>
+                <a:r>
+                  <a:rPr lang="en-US">
+                    <a:noFill/>
+                  </a:rPr>
+                  <a:t> </a:t>
+                </a:r>
+              </a:p>
+            </p:txBody>
+          </p:sp>
+        </mc:Fallback>
+      </mc:AlternateContent>
+      <p:sp>
+        <p:nvSpPr>
+          <p:cNvPr id="13" name="Oval 12">
+            <a:extLst>
+              <a:ext uri="{FF2B5EF4-FFF2-40B4-BE49-F238E27FC236}">
+                <a16:creationId xmlns:a16="http://schemas.microsoft.com/office/drawing/2014/main" id="{F7C9EF29-AAB1-42A6-8642-70C95D879163}"/>
+              </a:ext>
+            </a:extLst>
+          </p:cNvPr>
+          <p:cNvSpPr/>
+          <p:nvPr/>
+        </p:nvSpPr>
+        <p:spPr>
+          <a:xfrm>
+            <a:off x="2755782" y="2499919"/>
+            <a:ext cx="1677799" cy="1677758"/>
+          </a:xfrm>
+          <a:prstGeom prst="ellipse">
+            <a:avLst/>
+          </a:prstGeom>
+          <a:solidFill>
+            <a:schemeClr val="bg1">
+              <a:lumMod val="95000"/>
+            </a:schemeClr>
+          </a:solidFill>
+        </p:spPr>
+        <p:style>
+          <a:lnRef idx="2">
+            <a:schemeClr val="dk1"/>
+          </a:lnRef>
+          <a:fillRef idx="1">
+            <a:schemeClr val="lt1"/>
+          </a:fillRef>
+          <a:effectRef idx="0">
+            <a:schemeClr val="dk1"/>
+          </a:effectRef>
+          <a:fontRef idx="minor">
+            <a:schemeClr val="dk1"/>
+          </a:fontRef>
+        </p:style>
+        <p:txBody>
+          <a:bodyPr rtlCol="0" anchor="ctr"/>
+          <a:lstStyle/>
+          <a:p>
+            <a:pPr algn="ctr"/>
+            <a:endParaRPr lang="en-US" dirty="0"/>
+          </a:p>
+        </p:txBody>
+      </p:sp>
+      <p:cxnSp>
+        <p:nvCxnSpPr>
+          <p:cNvPr id="15" name="Straight Connector 14">
+            <a:extLst>
+              <a:ext uri="{FF2B5EF4-FFF2-40B4-BE49-F238E27FC236}">
+                <a16:creationId xmlns:a16="http://schemas.microsoft.com/office/drawing/2014/main" id="{794985A0-4F7E-4781-A3F1-88BA4ECBCFF2}"/>
+              </a:ext>
+            </a:extLst>
+          </p:cNvPr>
+          <p:cNvCxnSpPr>
+            <a:stCxn id="13" idx="2"/>
+            <a:endCxn id="13" idx="6"/>
+          </p:cNvCxnSpPr>
+          <p:nvPr/>
+        </p:nvCxnSpPr>
+        <p:spPr>
+          <a:xfrm>
+            <a:off x="2755782" y="3338798"/>
+            <a:ext cx="1677799" cy="0"/>
+          </a:xfrm>
+          <a:prstGeom prst="line">
+            <a:avLst/>
+          </a:prstGeom>
+          <a:ln w="12700"/>
+        </p:spPr>
+        <p:style>
+          <a:lnRef idx="1">
+            <a:schemeClr val="dk1"/>
+          </a:lnRef>
+          <a:fillRef idx="0">
+            <a:schemeClr val="dk1"/>
+          </a:fillRef>
+          <a:effectRef idx="0">
+            <a:schemeClr val="dk1"/>
+          </a:effectRef>
+          <a:fontRef idx="minor">
+            <a:schemeClr val="tx1"/>
+          </a:fontRef>
+        </p:style>
+      </p:cxnSp>
+      <p:cxnSp>
+        <p:nvCxnSpPr>
+          <p:cNvPr id="17" name="Straight Connector 16">
+            <a:extLst>
+              <a:ext uri="{FF2B5EF4-FFF2-40B4-BE49-F238E27FC236}">
+                <a16:creationId xmlns:a16="http://schemas.microsoft.com/office/drawing/2014/main" id="{00A0EBE9-AE48-40D1-911B-3EC33649ECDC}"/>
+              </a:ext>
+            </a:extLst>
+          </p:cNvPr>
+          <p:cNvCxnSpPr>
+            <a:stCxn id="13" idx="0"/>
+            <a:endCxn id="13" idx="4"/>
+          </p:cNvCxnSpPr>
+          <p:nvPr/>
+        </p:nvCxnSpPr>
+        <p:spPr>
+          <a:xfrm>
+            <a:off x="3594682" y="2499919"/>
+            <a:ext cx="0" cy="1677758"/>
+          </a:xfrm>
+          <a:prstGeom prst="line">
+            <a:avLst/>
+          </a:prstGeom>
+          <a:ln w="12700"/>
+        </p:spPr>
+        <p:style>
+          <a:lnRef idx="1">
+            <a:schemeClr val="dk1"/>
+          </a:lnRef>
+          <a:fillRef idx="0">
+            <a:schemeClr val="dk1"/>
+          </a:fillRef>
+          <a:effectRef idx="0">
+            <a:schemeClr val="dk1"/>
+          </a:effectRef>
+          <a:fontRef idx="minor">
+            <a:schemeClr val="tx1"/>
+          </a:fontRef>
+        </p:style>
+      </p:cxnSp>
+      <p:cxnSp>
+        <p:nvCxnSpPr>
+          <p:cNvPr id="19" name="Straight Arrow Connector 18">
+            <a:extLst>
+              <a:ext uri="{FF2B5EF4-FFF2-40B4-BE49-F238E27FC236}">
+                <a16:creationId xmlns:a16="http://schemas.microsoft.com/office/drawing/2014/main" id="{7E060834-4C73-4628-922A-8909315C4BE7}"/>
+              </a:ext>
+            </a:extLst>
+          </p:cNvPr>
+          <p:cNvCxnSpPr>
+            <a:cxnSpLocks/>
+          </p:cNvCxnSpPr>
+          <p:nvPr/>
+        </p:nvCxnSpPr>
+        <p:spPr>
+          <a:xfrm flipV="1">
+            <a:off x="3594681" y="2919983"/>
+            <a:ext cx="184839" cy="418815"/>
+          </a:xfrm>
+          <a:prstGeom prst="straightConnector1">
+            <a:avLst/>
+          </a:prstGeom>
+          <a:ln w="12700">
+            <a:tailEnd type="triangle"/>
+          </a:ln>
+        </p:spPr>
+        <p:style>
+          <a:lnRef idx="1">
+            <a:schemeClr val="dk1"/>
+          </a:lnRef>
+          <a:fillRef idx="0">
+            <a:schemeClr val="dk1"/>
+          </a:fillRef>
+          <a:effectRef idx="0">
+            <a:schemeClr val="dk1"/>
+          </a:effectRef>
+          <a:fontRef idx="minor">
+            <a:schemeClr val="tx1"/>
+          </a:fontRef>
+        </p:style>
+      </p:cxnSp>
+      <p:sp>
+        <p:nvSpPr>
+          <p:cNvPr id="20" name="Oval 19">
+            <a:extLst>
+              <a:ext uri="{FF2B5EF4-FFF2-40B4-BE49-F238E27FC236}">
+                <a16:creationId xmlns:a16="http://schemas.microsoft.com/office/drawing/2014/main" id="{B7E63BDC-7102-4DD7-8991-3DFF9CE63ACC}"/>
+              </a:ext>
+            </a:extLst>
+          </p:cNvPr>
+          <p:cNvSpPr/>
+          <p:nvPr/>
+        </p:nvSpPr>
+        <p:spPr>
+          <a:xfrm>
+            <a:off x="3766266" y="2816353"/>
+            <a:ext cx="51815" cy="51815"/>
+          </a:xfrm>
+          <a:prstGeom prst="ellipse">
+            <a:avLst/>
+          </a:prstGeom>
+          <a:solidFill>
+            <a:srgbClr val="C00000"/>
+          </a:solidFill>
+          <a:ln>
+            <a:solidFill>
+              <a:srgbClr val="C00000"/>
+            </a:solidFill>
+          </a:ln>
+        </p:spPr>
+        <p:style>
+          <a:lnRef idx="2">
+            <a:schemeClr val="accent1">
+              <a:shade val="50000"/>
+            </a:schemeClr>
+          </a:lnRef>
+          <a:fillRef idx="1">
+            <a:schemeClr val="accent1"/>
+          </a:fillRef>
+          <a:effectRef idx="0">
+            <a:schemeClr val="accent1"/>
+          </a:effectRef>
+          <a:fontRef idx="minor">
+            <a:schemeClr val="lt1"/>
+          </a:fontRef>
+        </p:style>
+        <p:txBody>
+          <a:bodyPr rtlCol="0" anchor="ctr"/>
+          <a:lstStyle/>
+          <a:p>
+            <a:pPr algn="ctr"/>
+            <a:endParaRPr lang="en-US"/>
+          </a:p>
+        </p:txBody>
+      </p:sp>
+      <mc:AlternateContent xmlns:mc="http://schemas.openxmlformats.org/markup-compatibility/2006">
+        <mc:Choice xmlns:a14="http://schemas.microsoft.com/office/drawing/2010/main" Requires="a14">
+          <p:sp>
+            <p:nvSpPr>
+              <p:cNvPr id="22" name="TextBox 21">
+                <a:extLst>
+                  <a:ext uri="{FF2B5EF4-FFF2-40B4-BE49-F238E27FC236}">
+                    <a16:creationId xmlns:a16="http://schemas.microsoft.com/office/drawing/2014/main" id="{6CE49FAC-BBC9-4D79-B6D1-6E9ED0354988}"/>
+                  </a:ext>
+                </a:extLst>
+              </p:cNvPr>
+              <p:cNvSpPr txBox="1"/>
+              <p:nvPr/>
+            </p:nvSpPr>
+            <p:spPr>
+              <a:xfrm>
+                <a:off x="3687100" y="2822646"/>
+                <a:ext cx="672107" cy="261610"/>
+              </a:xfrm>
+              <a:prstGeom prst="rect">
+                <a:avLst/>
+              </a:prstGeom>
+              <a:noFill/>
+            </p:spPr>
+            <p:txBody>
+              <a:bodyPr wrap="none" rtlCol="0">
+                <a:spAutoFit/>
+              </a:bodyPr>
+              <a:lstStyle/>
+              <a:p>
+                <a14:m>
+                  <m:oMathPara xmlns:m="http://schemas.openxmlformats.org/officeDocument/2006/math">
+                    <m:oMathParaPr>
+                      <m:jc m:val="centerGroup"/>
+                    </m:oMathParaPr>
+                    <m:oMath xmlns:m="http://schemas.openxmlformats.org/officeDocument/2006/math">
+                      <m:r>
+                        <a:rPr lang="en-US" sz="1050" i="1" dirty="0" smtClean="0">
+                          <a:latin typeface="Cambria Math" panose="02040503050406030204" pitchFamily="18" charset="0"/>
+                        </a:rPr>
+                        <m:t>(</m:t>
+                      </m:r>
+                      <m:r>
+                        <a:rPr lang="en-US" sz="1050" i="1" dirty="0" err="1" smtClean="0">
+                          <a:latin typeface="Cambria Math" panose="02040503050406030204" pitchFamily="18" charset="0"/>
+                        </a:rPr>
+                        <m:t>𝑥</m:t>
+                      </m:r>
+                      <m:r>
+                        <a:rPr lang="en-US" sz="1050" i="1" dirty="0" err="1" smtClean="0">
+                          <a:latin typeface="Cambria Math" panose="02040503050406030204" pitchFamily="18" charset="0"/>
+                        </a:rPr>
+                        <m:t>,</m:t>
+                      </m:r>
+                      <m:r>
+                        <a:rPr lang="en-US" sz="1050" i="1" dirty="0" err="1" smtClean="0">
+                          <a:latin typeface="Cambria Math" panose="02040503050406030204" pitchFamily="18" charset="0"/>
+                        </a:rPr>
+                        <m:t>𝑦</m:t>
+                      </m:r>
+                      <m:r>
+                        <a:rPr lang="en-US" sz="1050" i="1" dirty="0" err="1" smtClean="0">
+                          <a:latin typeface="Cambria Math" panose="02040503050406030204" pitchFamily="18" charset="0"/>
+                        </a:rPr>
+                        <m:t>,</m:t>
+                      </m:r>
+                      <m:r>
+                        <a:rPr lang="en-US" sz="1050" i="1" dirty="0" err="1" smtClean="0">
+                          <a:latin typeface="Cambria Math" panose="02040503050406030204" pitchFamily="18" charset="0"/>
+                        </a:rPr>
+                        <m:t>𝑧</m:t>
+                      </m:r>
+                      <m:r>
+                        <a:rPr lang="en-US" sz="1050" i="1" dirty="0" smtClean="0">
+                          <a:latin typeface="Cambria Math" panose="02040503050406030204" pitchFamily="18" charset="0"/>
+                        </a:rPr>
+                        <m:t>)</m:t>
+                      </m:r>
+                    </m:oMath>
+                  </m:oMathPara>
+                </a14:m>
+                <a:endParaRPr lang="en-US" sz="1050" dirty="0"/>
+              </a:p>
+            </p:txBody>
+          </p:sp>
+        </mc:Choice>
+        <mc:Fallback>
+          <p:sp>
+            <p:nvSpPr>
+              <p:cNvPr id="22" name="TextBox 21">
+                <a:extLst>
+                  <a:ext uri="{FF2B5EF4-FFF2-40B4-BE49-F238E27FC236}">
+                    <a16:creationId xmlns:a16="http://schemas.microsoft.com/office/drawing/2014/main" id="{6CE49FAC-BBC9-4D79-B6D1-6E9ED0354988}"/>
+                  </a:ext>
+                </a:extLst>
+              </p:cNvPr>
+              <p:cNvSpPr txBox="1">
+                <a:spLocks noRot="1" noChangeAspect="1" noMove="1" noResize="1" noEditPoints="1" noAdjustHandles="1" noChangeArrowheads="1" noChangeShapeType="1" noTextEdit="1"/>
+              </p:cNvSpPr>
+              <p:nvPr/>
+            </p:nvSpPr>
+            <p:spPr>
+              <a:xfrm>
+                <a:off x="3687100" y="2822646"/>
+                <a:ext cx="672107" cy="261610"/>
+              </a:xfrm>
+              <a:prstGeom prst="rect">
+                <a:avLst/>
+              </a:prstGeom>
+              <a:blipFill>
+                <a:blip r:embed="rId4"/>
+                <a:stretch>
+                  <a:fillRect b="-4651"/>
+                </a:stretch>
+              </a:blipFill>
+            </p:spPr>
+            <p:txBody>
+              <a:bodyPr/>
+              <a:lstStyle/>
+              <a:p>
+                <a:r>
+                  <a:rPr lang="en-US">
+                    <a:noFill/>
+                  </a:rPr>
+                  <a:t> </a:t>
+                </a:r>
+              </a:p>
+            </p:txBody>
+          </p:sp>
+        </mc:Fallback>
+      </mc:AlternateContent>
+      <mc:AlternateContent xmlns:mc="http://schemas.openxmlformats.org/markup-compatibility/2006">
+        <mc:Choice xmlns:a14="http://schemas.microsoft.com/office/drawing/2010/main" Requires="a14">
+          <p:sp>
+            <p:nvSpPr>
+              <p:cNvPr id="27" name="Rectangle 26">
+                <a:extLst>
+                  <a:ext uri="{FF2B5EF4-FFF2-40B4-BE49-F238E27FC236}">
+                    <a16:creationId xmlns:a16="http://schemas.microsoft.com/office/drawing/2014/main" id="{24F64966-518C-4A9D-B4A7-ACBEFC65BF05}"/>
+                  </a:ext>
+                </a:extLst>
+              </p:cNvPr>
+              <p:cNvSpPr/>
+              <p:nvPr/>
+            </p:nvSpPr>
+            <p:spPr>
+              <a:xfrm>
+                <a:off x="3606832" y="3010607"/>
+                <a:ext cx="308354" cy="276999"/>
+              </a:xfrm>
+              <a:prstGeom prst="rect">
+                <a:avLst/>
+              </a:prstGeom>
+            </p:spPr>
+            <p:txBody>
+              <a:bodyPr wrap="none">
+                <a:spAutoFit/>
+              </a:bodyPr>
+              <a:lstStyle/>
+              <a:p>
+                <a14:m>
+                  <m:oMathPara xmlns:m="http://schemas.openxmlformats.org/officeDocument/2006/math">
+                    <m:oMathParaPr>
+                      <m:jc m:val="centerGroup"/>
+                    </m:oMathParaPr>
+                    <m:oMath xmlns:m="http://schemas.openxmlformats.org/officeDocument/2006/math">
+                      <m:r>
+                        <a:rPr lang="en-US" sz="1200" b="0" i="1" dirty="0" smtClean="0">
+                          <a:latin typeface="Cambria Math" panose="02040503050406030204" pitchFamily="18" charset="0"/>
+                        </a:rPr>
+                        <m:t>𝜌</m:t>
+                      </m:r>
+                    </m:oMath>
+                  </m:oMathPara>
+                </a14:m>
+                <a:endParaRPr lang="en-US" sz="1200" dirty="0"/>
+              </a:p>
+            </p:txBody>
+          </p:sp>
+        </mc:Choice>
+        <mc:Fallback>
+          <p:sp>
+            <p:nvSpPr>
+              <p:cNvPr id="27" name="Rectangle 26">
+                <a:extLst>
+                  <a:ext uri="{FF2B5EF4-FFF2-40B4-BE49-F238E27FC236}">
+                    <a16:creationId xmlns:a16="http://schemas.microsoft.com/office/drawing/2014/main" id="{24F64966-518C-4A9D-B4A7-ACBEFC65BF05}"/>
+                  </a:ext>
+                </a:extLst>
+              </p:cNvPr>
+              <p:cNvSpPr>
+                <a:spLocks noRot="1" noChangeAspect="1" noMove="1" noResize="1" noEditPoints="1" noAdjustHandles="1" noChangeArrowheads="1" noChangeShapeType="1" noTextEdit="1"/>
+              </p:cNvSpPr>
+              <p:nvPr/>
+            </p:nvSpPr>
+            <p:spPr>
+              <a:xfrm>
+                <a:off x="3606832" y="3010607"/>
+                <a:ext cx="308354" cy="276999"/>
+              </a:xfrm>
+              <a:prstGeom prst="rect">
+                <a:avLst/>
+              </a:prstGeom>
+              <a:blipFill>
+                <a:blip r:embed="rId5"/>
+                <a:stretch>
+                  <a:fillRect/>
+                </a:stretch>
+              </a:blipFill>
+            </p:spPr>
+            <p:txBody>
+              <a:bodyPr/>
+              <a:lstStyle/>
+              <a:p>
+                <a:r>
+                  <a:rPr lang="en-US">
+                    <a:noFill/>
+                  </a:rPr>
+                  <a:t> </a:t>
+                </a:r>
+              </a:p>
+            </p:txBody>
+          </p:sp>
+        </mc:Fallback>
+      </mc:AlternateContent>
+    </p:spTree>
+    <p:extLst>
+      <p:ext uri="{BB962C8B-B14F-4D97-AF65-F5344CB8AC3E}">
+        <p14:creationId xmlns:p14="http://schemas.microsoft.com/office/powerpoint/2010/main" val="869085950"/>
+      </p:ext>
+    </p:extLst>
+  </p:cSld>
+  <p:clrMapOvr>
+    <a:masterClrMapping/>
+  </p:clrMapOvr>
+</p:sld>
+</file>
+
 <file path=ppt/slides/slide2.xml><?xml version="1.0" encoding="utf-8"?>
 <p:sld xmlns:a="http://schemas.openxmlformats.org/drawingml/2006/main" xmlns:r="http://schemas.openxmlformats.org/officeDocument/2006/relationships" xmlns:p="http://schemas.openxmlformats.org/presentationml/2006/main">
   <p:cSld>
@@ -4559,8 +5388,8 @@
           </a:p>
         </p:txBody>
       </p:sp>
-      <mc:AlternateContent xmlns:mc="http://schemas.openxmlformats.org/markup-compatibility/2006">
-        <mc:Choice xmlns:a14="http://schemas.microsoft.com/office/drawing/2010/main" Requires="a14">
+      <mc:AlternateContent xmlns:mc="http://schemas.openxmlformats.org/markup-compatibility/2006" xmlns:a14="http://schemas.microsoft.com/office/drawing/2010/main">
+        <mc:Choice Requires="a14">
           <p:sp>
             <p:nvSpPr>
               <p:cNvPr id="9" name="TextBox 8">
@@ -5895,7 +6724,7 @@
             </p:txBody>
           </p:sp>
         </mc:Choice>
-        <mc:Fallback>
+        <mc:Fallback xmlns="">
           <p:sp>
             <p:nvSpPr>
               <p:cNvPr id="9" name="TextBox 8">
@@ -6292,7 +7121,7 @@
                 <a:latin typeface="Sitka Subheading" panose="02000505000000020004" pitchFamily="2" charset="0"/>
                 <a:cs typeface="Times New Roman" panose="02020603050405020304" pitchFamily="18" charset="0"/>
               </a:rPr>
-              <a:t>SortByGridId</a:t>
+              <a:t>sortByGridId</a:t>
             </a:r>
             <a:endParaRPr lang="en-US" sz="1600" dirty="0">
               <a:solidFill>
@@ -6523,9 +7352,9 @@
           <p:nvPr/>
         </p:nvCxnSpPr>
         <p:spPr>
-          <a:xfrm flipV="1">
-            <a:off x="5276362" y="3015412"/>
-            <a:ext cx="2866801" cy="1"/>
+          <a:xfrm>
+            <a:off x="5545123" y="3015412"/>
+            <a:ext cx="2598040" cy="1"/>
           </a:xfrm>
           <a:prstGeom prst="line">
             <a:avLst/>
@@ -6565,8 +7394,8 @@
         </p:nvCxnSpPr>
         <p:spPr>
           <a:xfrm>
-            <a:off x="6937695" y="2253316"/>
-            <a:ext cx="1423138" cy="0"/>
+            <a:off x="7323589" y="2253316"/>
+            <a:ext cx="1037244" cy="0"/>
           </a:xfrm>
           <a:prstGeom prst="line">
             <a:avLst/>
@@ -6924,10 +7753,10 @@
       </p:cxnSp>
       <p:sp>
         <p:nvSpPr>
-          <p:cNvPr id="54" name="Rectangle 53">
+          <p:cNvPr id="30" name="Rectangle 29">
             <a:extLst>
               <a:ext uri="{FF2B5EF4-FFF2-40B4-BE49-F238E27FC236}">
-                <a16:creationId xmlns:a16="http://schemas.microsoft.com/office/drawing/2014/main" id="{BA1EF14E-2652-435A-988D-3702FE3F291A}"/>
+                <a16:creationId xmlns:a16="http://schemas.microsoft.com/office/drawing/2014/main" id="{C44B0F4A-CAED-4235-8256-E10579A92BC7}"/>
               </a:ext>
             </a:extLst>
           </p:cNvPr>
@@ -6936,8 +7765,8 @@
         </p:nvSpPr>
         <p:spPr>
           <a:xfrm>
-            <a:off x="8765545" y="5500611"/>
-            <a:ext cx="907621" cy="338554"/>
+            <a:off x="8733271" y="529707"/>
+            <a:ext cx="915636" cy="338554"/>
           </a:xfrm>
           <a:prstGeom prst="rect">
             <a:avLst/>
@@ -6951,7 +7780,7 @@
           <a:p>
             <a:pPr algn="r"/>
             <a:r>
-              <a:rPr lang="en-US" sz="1600" dirty="0" err="1">
+              <a:rPr lang="en-US" altLang="zh-CN" sz="1600" b="1" dirty="0">
                 <a:solidFill>
                   <a:schemeClr val="accent5">
                     <a:lumMod val="50000"/>
@@ -6960,62 +7789,11 @@
                 <a:latin typeface="Sitka Subheading" panose="02000505000000020004" pitchFamily="2" charset="0"/>
                 <a:cs typeface="Times New Roman" panose="02020603050405020304" pitchFamily="18" charset="0"/>
               </a:rPr>
-              <a:t>copyPos</a:t>
+              <a:t>Kernels</a:t>
             </a:r>
-            <a:endParaRPr lang="en-US" sz="1600" dirty="0">
-              <a:solidFill>
-                <a:schemeClr val="accent5">
-                  <a:lumMod val="50000"/>
-                </a:schemeClr>
-              </a:solidFill>
-              <a:latin typeface="Sitka Subheading" panose="02000505000000020004" pitchFamily="2" charset="0"/>
-              <a:cs typeface="Times New Roman" panose="02020603050405020304" pitchFamily="18" charset="0"/>
-            </a:endParaRPr>
           </a:p>
         </p:txBody>
       </p:sp>
-      <p:cxnSp>
-        <p:nvCxnSpPr>
-          <p:cNvPr id="55" name="Straight Connector 54">
-            <a:extLst>
-              <a:ext uri="{FF2B5EF4-FFF2-40B4-BE49-F238E27FC236}">
-                <a16:creationId xmlns:a16="http://schemas.microsoft.com/office/drawing/2014/main" id="{847966E4-9B86-4064-B05D-909F7E3C95D9}"/>
-              </a:ext>
-            </a:extLst>
-          </p:cNvPr>
-          <p:cNvCxnSpPr>
-            <a:cxnSpLocks/>
-            <a:endCxn id="54" idx="1"/>
-          </p:cNvCxnSpPr>
-          <p:nvPr/>
-        </p:nvCxnSpPr>
-        <p:spPr>
-          <a:xfrm>
-            <a:off x="6652470" y="5669888"/>
-            <a:ext cx="2113075" cy="0"/>
-          </a:xfrm>
-          <a:prstGeom prst="line">
-            <a:avLst/>
-          </a:prstGeom>
-          <a:ln w="12700">
-            <a:prstDash val="sysDot"/>
-          </a:ln>
-        </p:spPr>
-        <p:style>
-          <a:lnRef idx="1">
-            <a:schemeClr val="dk1"/>
-          </a:lnRef>
-          <a:fillRef idx="0">
-            <a:schemeClr val="dk1"/>
-          </a:fillRef>
-          <a:effectRef idx="0">
-            <a:schemeClr val="dk1"/>
-          </a:effectRef>
-          <a:fontRef idx="minor">
-            <a:schemeClr val="tx1"/>
-          </a:fontRef>
-        </p:style>
-      </p:cxnSp>
     </p:spTree>
     <p:extLst>
       <p:ext uri="{BB962C8B-B14F-4D97-AF65-F5344CB8AC3E}">
@@ -11306,8 +12084,8 @@
           </a:fontRef>
         </p:style>
       </p:cxnSp>
-      <mc:AlternateContent xmlns:mc="http://schemas.openxmlformats.org/markup-compatibility/2006">
-        <mc:Choice xmlns:a14="http://schemas.microsoft.com/office/drawing/2010/main" Requires="a14">
+      <mc:AlternateContent xmlns:mc="http://schemas.openxmlformats.org/markup-compatibility/2006" xmlns:a14="http://schemas.microsoft.com/office/drawing/2010/main">
+        <mc:Choice Requires="a14">
           <p:sp>
             <p:nvSpPr>
               <p:cNvPr id="8" name="Rectangle 7">
@@ -11377,7 +12155,7 @@
             </p:txBody>
           </p:sp>
         </mc:Choice>
-        <mc:Fallback>
+        <mc:Fallback xmlns="">
           <p:sp>
             <p:nvSpPr>
               <p:cNvPr id="8" name="Rectangle 7">
@@ -12084,8 +12862,8 @@
           </p:txBody>
         </p:sp>
       </p:grpSp>
-      <mc:AlternateContent xmlns:mc="http://schemas.openxmlformats.org/markup-compatibility/2006">
-        <mc:Choice xmlns:a14="http://schemas.microsoft.com/office/drawing/2010/main" Requires="a14">
+      <mc:AlternateContent xmlns:mc="http://schemas.openxmlformats.org/markup-compatibility/2006" xmlns:a14="http://schemas.microsoft.com/office/drawing/2010/main">
+        <mc:Choice Requires="a14">
           <p:graphicFrame>
             <p:nvGraphicFramePr>
               <p:cNvPr id="41" name="Table 40">
@@ -13645,7 +14423,7 @@
             </a:graphic>
           </p:graphicFrame>
         </mc:Choice>
-        <mc:Fallback>
+        <mc:Fallback xmlns="">
           <p:graphicFrame>
             <p:nvGraphicFramePr>
               <p:cNvPr id="41" name="Table 40">
@@ -16791,8 +17569,8 @@
           </a:fontRef>
         </p:style>
       </p:cxnSp>
-      <mc:AlternateContent xmlns:mc="http://schemas.openxmlformats.org/markup-compatibility/2006">
-        <mc:Choice xmlns:a14="http://schemas.microsoft.com/office/drawing/2010/main" Requires="a14">
+      <mc:AlternateContent xmlns:mc="http://schemas.openxmlformats.org/markup-compatibility/2006" xmlns:a14="http://schemas.microsoft.com/office/drawing/2010/main">
+        <mc:Choice Requires="a14">
           <p:sp>
             <p:nvSpPr>
               <p:cNvPr id="8" name="Rectangle 7">
@@ -16862,7 +17640,7 @@
             </p:txBody>
           </p:sp>
         </mc:Choice>
-        <mc:Fallback>
+        <mc:Fallback xmlns="">
           <p:sp>
             <p:nvSpPr>
               <p:cNvPr id="8" name="Rectangle 7">
@@ -17569,8 +18347,8 @@
           </p:txBody>
         </p:sp>
       </p:grpSp>
-      <mc:AlternateContent xmlns:mc="http://schemas.openxmlformats.org/markup-compatibility/2006">
-        <mc:Choice xmlns:a14="http://schemas.microsoft.com/office/drawing/2010/main" Requires="a14">
+      <mc:AlternateContent xmlns:mc="http://schemas.openxmlformats.org/markup-compatibility/2006" xmlns:a14="http://schemas.microsoft.com/office/drawing/2010/main">
+        <mc:Choice Requires="a14">
           <p:graphicFrame>
             <p:nvGraphicFramePr>
               <p:cNvPr id="41" name="Table 40">
@@ -19903,7 +20681,7 @@
             </a:graphic>
           </p:graphicFrame>
         </mc:Choice>
-        <mc:Fallback>
+        <mc:Fallback xmlns="">
           <p:graphicFrame>
             <p:nvGraphicFramePr>
               <p:cNvPr id="41" name="Table 40">
@@ -22780,6 +23558,3624 @@
 </p:sld>
 </file>
 
+<file path=ppt/slides/slide8.xml><?xml version="1.0" encoding="utf-8"?>
+<p:sld xmlns:a="http://schemas.openxmlformats.org/drawingml/2006/main" xmlns:r="http://schemas.openxmlformats.org/officeDocument/2006/relationships" xmlns:p="http://schemas.openxmlformats.org/presentationml/2006/main">
+  <p:cSld>
+    <p:spTree>
+      <p:nvGrpSpPr>
+        <p:cNvPr id="1" name=""/>
+        <p:cNvGrpSpPr/>
+        <p:nvPr/>
+      </p:nvGrpSpPr>
+      <p:grpSpPr>
+        <a:xfrm>
+          <a:off x="0" y="0"/>
+          <a:ext cx="0" cy="0"/>
+          <a:chOff x="0" y="0"/>
+          <a:chExt cx="0" cy="0"/>
+        </a:xfrm>
+      </p:grpSpPr>
+      <mc:AlternateContent xmlns:mc="http://schemas.openxmlformats.org/markup-compatibility/2006">
+        <mc:Choice xmlns:a14="http://schemas.microsoft.com/office/drawing/2010/main" Requires="a14">
+          <p:sp>
+            <p:nvSpPr>
+              <p:cNvPr id="4" name="Rectangle 3">
+                <a:extLst>
+                  <a:ext uri="{FF2B5EF4-FFF2-40B4-BE49-F238E27FC236}">
+                    <a16:creationId xmlns:a16="http://schemas.microsoft.com/office/drawing/2014/main" id="{04BDE4A7-26E2-4CCC-A178-EDD451843A05}"/>
+                  </a:ext>
+                </a:extLst>
+              </p:cNvPr>
+              <p:cNvSpPr/>
+              <p:nvPr/>
+            </p:nvSpPr>
+            <p:spPr>
+              <a:xfrm>
+                <a:off x="4282579" y="1184946"/>
+                <a:ext cx="1212209" cy="398477"/>
+              </a:xfrm>
+              <a:prstGeom prst="rect">
+                <a:avLst/>
+              </a:prstGeom>
+              <a:solidFill>
+                <a:schemeClr val="accent5">
+                  <a:lumMod val="20000"/>
+                  <a:lumOff val="80000"/>
+                </a:schemeClr>
+              </a:solidFill>
+            </p:spPr>
+            <p:style>
+              <a:lnRef idx="2">
+                <a:schemeClr val="dk1"/>
+              </a:lnRef>
+              <a:fillRef idx="1">
+                <a:schemeClr val="lt1"/>
+              </a:fillRef>
+              <a:effectRef idx="0">
+                <a:schemeClr val="dk1"/>
+              </a:effectRef>
+              <a:fontRef idx="minor">
+                <a:schemeClr val="dk1"/>
+              </a:fontRef>
+            </p:style>
+            <p:txBody>
+              <a:bodyPr rtlCol="0" anchor="ctr"/>
+              <a:lstStyle/>
+              <a:p>
+                <a:pPr algn="ctr"/>
+                <a:r>
+                  <a:rPr lang="en-US" sz="1600" dirty="0"/>
+                  <a:t>Particle </a:t>
+                </a:r>
+                <a14:m>
+                  <m:oMath xmlns:m="http://schemas.openxmlformats.org/officeDocument/2006/math">
+                    <m:sSub>
+                      <m:sSubPr>
+                        <m:ctrlPr>
+                          <a:rPr lang="en-US" sz="1600"/>
+                        </m:ctrlPr>
+                      </m:sSubPr>
+                      <m:e>
+                        <m:r>
+                          <a:rPr lang="en-US" sz="1600"/>
+                          <m:t>𝒑</m:t>
+                        </m:r>
+                      </m:e>
+                      <m:sub>
+                        <m:r>
+                          <a:rPr lang="en-US" sz="1600"/>
+                          <m:t>𝑖</m:t>
+                        </m:r>
+                      </m:sub>
+                    </m:sSub>
+                  </m:oMath>
+                </a14:m>
+                <a:endParaRPr lang="en-US" sz="1600" dirty="0"/>
+              </a:p>
+            </p:txBody>
+          </p:sp>
+        </mc:Choice>
+        <mc:Fallback>
+          <p:sp>
+            <p:nvSpPr>
+              <p:cNvPr id="4" name="Rectangle 3">
+                <a:extLst>
+                  <a:ext uri="{FF2B5EF4-FFF2-40B4-BE49-F238E27FC236}">
+                    <a16:creationId xmlns:a16="http://schemas.microsoft.com/office/drawing/2014/main" id="{04BDE4A7-26E2-4CCC-A178-EDD451843A05}"/>
+                  </a:ext>
+                </a:extLst>
+              </p:cNvPr>
+              <p:cNvSpPr>
+                <a:spLocks noRot="1" noChangeAspect="1" noMove="1" noResize="1" noEditPoints="1" noAdjustHandles="1" noChangeArrowheads="1" noChangeShapeType="1" noTextEdit="1"/>
+              </p:cNvSpPr>
+              <p:nvPr/>
+            </p:nvSpPr>
+            <p:spPr>
+              <a:xfrm>
+                <a:off x="4282579" y="1184946"/>
+                <a:ext cx="1212209" cy="398477"/>
+              </a:xfrm>
+              <a:prstGeom prst="rect">
+                <a:avLst/>
+              </a:prstGeom>
+              <a:blipFill>
+                <a:blip r:embed="rId2"/>
+                <a:stretch>
+                  <a:fillRect b="-10294"/>
+                </a:stretch>
+              </a:blipFill>
+            </p:spPr>
+            <p:txBody>
+              <a:bodyPr/>
+              <a:lstStyle/>
+              <a:p>
+                <a:r>
+                  <a:rPr lang="en-US">
+                    <a:noFill/>
+                  </a:rPr>
+                  <a:t> </a:t>
+                </a:r>
+              </a:p>
+            </p:txBody>
+          </p:sp>
+        </mc:Fallback>
+      </mc:AlternateContent>
+      <p:sp>
+        <p:nvSpPr>
+          <p:cNvPr id="5" name="Rectangle 4">
+            <a:extLst>
+              <a:ext uri="{FF2B5EF4-FFF2-40B4-BE49-F238E27FC236}">
+                <a16:creationId xmlns:a16="http://schemas.microsoft.com/office/drawing/2014/main" id="{7558B738-F6A8-4C08-BAE6-B94F47895261}"/>
+              </a:ext>
+            </a:extLst>
+          </p:cNvPr>
+          <p:cNvSpPr/>
+          <p:nvPr/>
+        </p:nvSpPr>
+        <p:spPr>
+          <a:xfrm>
+            <a:off x="3141677" y="2016153"/>
+            <a:ext cx="1454097" cy="640359"/>
+          </a:xfrm>
+          <a:prstGeom prst="rect">
+            <a:avLst/>
+          </a:prstGeom>
+          <a:solidFill>
+            <a:schemeClr val="accent6">
+              <a:lumMod val="20000"/>
+              <a:lumOff val="80000"/>
+            </a:schemeClr>
+          </a:solidFill>
+        </p:spPr>
+        <p:style>
+          <a:lnRef idx="2">
+            <a:schemeClr val="dk1"/>
+          </a:lnRef>
+          <a:fillRef idx="1">
+            <a:schemeClr val="lt1"/>
+          </a:fillRef>
+          <a:effectRef idx="0">
+            <a:schemeClr val="dk1"/>
+          </a:effectRef>
+          <a:fontRef idx="minor">
+            <a:schemeClr val="dk1"/>
+          </a:fontRef>
+        </p:style>
+        <p:txBody>
+          <a:bodyPr rtlCol="0" anchor="ctr"/>
+          <a:lstStyle/>
+          <a:p>
+            <a:pPr algn="ctr"/>
+            <a:r>
+              <a:rPr lang="en-US" sz="1400" dirty="0"/>
+              <a:t>Depth texture</a:t>
+            </a:r>
+          </a:p>
+          <a:p>
+            <a:pPr algn="ctr"/>
+            <a:r>
+              <a:rPr lang="en-US" sz="1200" dirty="0" err="1">
+                <a:solidFill>
+                  <a:schemeClr val="bg2">
+                    <a:lumMod val="50000"/>
+                  </a:schemeClr>
+                </a:solidFill>
+                <a:latin typeface="Consolas" panose="020B0609020204030204" pitchFamily="49" charset="0"/>
+              </a:rPr>
+              <a:t>d_depth_a</a:t>
+            </a:r>
+            <a:endParaRPr lang="en-US" sz="1200" dirty="0">
+              <a:solidFill>
+                <a:schemeClr val="bg2">
+                  <a:lumMod val="50000"/>
+                </a:schemeClr>
+              </a:solidFill>
+              <a:latin typeface="Consolas" panose="020B0609020204030204" pitchFamily="49" charset="0"/>
+            </a:endParaRPr>
+          </a:p>
+        </p:txBody>
+      </p:sp>
+      <p:sp>
+        <p:nvSpPr>
+          <p:cNvPr id="7" name="Rectangle 6">
+            <a:extLst>
+              <a:ext uri="{FF2B5EF4-FFF2-40B4-BE49-F238E27FC236}">
+                <a16:creationId xmlns:a16="http://schemas.microsoft.com/office/drawing/2014/main" id="{23D26139-0027-4925-BF67-05056B124229}"/>
+              </a:ext>
+            </a:extLst>
+          </p:cNvPr>
+          <p:cNvSpPr/>
+          <p:nvPr/>
+        </p:nvSpPr>
+        <p:spPr>
+          <a:xfrm>
+            <a:off x="5079534" y="2011258"/>
+            <a:ext cx="1493240" cy="640359"/>
+          </a:xfrm>
+          <a:prstGeom prst="rect">
+            <a:avLst/>
+          </a:prstGeom>
+          <a:solidFill>
+            <a:schemeClr val="accent6">
+              <a:lumMod val="20000"/>
+              <a:lumOff val="80000"/>
+            </a:schemeClr>
+          </a:solidFill>
+        </p:spPr>
+        <p:style>
+          <a:lnRef idx="2">
+            <a:schemeClr val="dk1"/>
+          </a:lnRef>
+          <a:fillRef idx="1">
+            <a:schemeClr val="lt1"/>
+          </a:fillRef>
+          <a:effectRef idx="0">
+            <a:schemeClr val="dk1"/>
+          </a:effectRef>
+          <a:fontRef idx="minor">
+            <a:schemeClr val="dk1"/>
+          </a:fontRef>
+        </p:style>
+        <p:txBody>
+          <a:bodyPr rtlCol="0" anchor="ctr"/>
+          <a:lstStyle/>
+          <a:p>
+            <a:pPr algn="ctr"/>
+            <a:r>
+              <a:rPr lang="en-US" sz="1400" dirty="0"/>
+              <a:t>Thickness texture</a:t>
+            </a:r>
+          </a:p>
+          <a:p>
+            <a:pPr algn="ctr"/>
+            <a:r>
+              <a:rPr lang="en-US" sz="1200" dirty="0" err="1">
+                <a:solidFill>
+                  <a:schemeClr val="bg2">
+                    <a:lumMod val="50000"/>
+                  </a:schemeClr>
+                </a:solidFill>
+                <a:latin typeface="Consolas" panose="020B0609020204030204" pitchFamily="49" charset="0"/>
+              </a:rPr>
+              <a:t>d_thick</a:t>
+            </a:r>
+            <a:endParaRPr lang="en-US" sz="1200" dirty="0">
+              <a:solidFill>
+                <a:schemeClr val="bg2">
+                  <a:lumMod val="50000"/>
+                </a:schemeClr>
+              </a:solidFill>
+              <a:latin typeface="Consolas" panose="020B0609020204030204" pitchFamily="49" charset="0"/>
+            </a:endParaRPr>
+          </a:p>
+        </p:txBody>
+      </p:sp>
+      <p:sp>
+        <p:nvSpPr>
+          <p:cNvPr id="8" name="Rectangle 7">
+            <a:extLst>
+              <a:ext uri="{FF2B5EF4-FFF2-40B4-BE49-F238E27FC236}">
+                <a16:creationId xmlns:a16="http://schemas.microsoft.com/office/drawing/2014/main" id="{38E1A640-2D16-4CB8-88EA-09BC6985BFC1}"/>
+              </a:ext>
+            </a:extLst>
+          </p:cNvPr>
+          <p:cNvSpPr/>
+          <p:nvPr/>
+        </p:nvSpPr>
+        <p:spPr>
+          <a:xfrm>
+            <a:off x="3141677" y="3108811"/>
+            <a:ext cx="1454097" cy="640359"/>
+          </a:xfrm>
+          <a:prstGeom prst="rect">
+            <a:avLst/>
+          </a:prstGeom>
+          <a:solidFill>
+            <a:schemeClr val="accent6">
+              <a:lumMod val="20000"/>
+              <a:lumOff val="80000"/>
+            </a:schemeClr>
+          </a:solidFill>
+        </p:spPr>
+        <p:style>
+          <a:lnRef idx="2">
+            <a:schemeClr val="dk1"/>
+          </a:lnRef>
+          <a:fillRef idx="1">
+            <a:schemeClr val="lt1"/>
+          </a:fillRef>
+          <a:effectRef idx="0">
+            <a:schemeClr val="dk1"/>
+          </a:effectRef>
+          <a:fontRef idx="minor">
+            <a:schemeClr val="dk1"/>
+          </a:fontRef>
+        </p:style>
+        <p:txBody>
+          <a:bodyPr rtlCol="0" anchor="ctr"/>
+          <a:lstStyle/>
+          <a:p>
+            <a:pPr algn="ctr"/>
+            <a:r>
+              <a:rPr lang="en-US" sz="1400" dirty="0"/>
+              <a:t>Smoothed Depth</a:t>
+            </a:r>
+          </a:p>
+          <a:p>
+            <a:pPr algn="ctr"/>
+            <a:r>
+              <a:rPr lang="en-US" sz="1200" dirty="0" err="1">
+                <a:solidFill>
+                  <a:schemeClr val="bg2">
+                    <a:lumMod val="50000"/>
+                  </a:schemeClr>
+                </a:solidFill>
+                <a:latin typeface="Consolas" panose="020B0609020204030204" pitchFamily="49" charset="0"/>
+              </a:rPr>
+              <a:t>d_depth_b</a:t>
+            </a:r>
+            <a:endParaRPr lang="en-US" sz="1200" dirty="0">
+              <a:solidFill>
+                <a:schemeClr val="bg2">
+                  <a:lumMod val="50000"/>
+                </a:schemeClr>
+              </a:solidFill>
+              <a:latin typeface="Consolas" panose="020B0609020204030204" pitchFamily="49" charset="0"/>
+            </a:endParaRPr>
+          </a:p>
+        </p:txBody>
+      </p:sp>
+      <p:sp>
+        <p:nvSpPr>
+          <p:cNvPr id="9" name="Rectangle 8">
+            <a:extLst>
+              <a:ext uri="{FF2B5EF4-FFF2-40B4-BE49-F238E27FC236}">
+                <a16:creationId xmlns:a16="http://schemas.microsoft.com/office/drawing/2014/main" id="{2CC56CC7-818F-481D-8466-92B088449DE9}"/>
+              </a:ext>
+            </a:extLst>
+          </p:cNvPr>
+          <p:cNvSpPr/>
+          <p:nvPr/>
+        </p:nvSpPr>
+        <p:spPr>
+          <a:xfrm>
+            <a:off x="5079534" y="3108811"/>
+            <a:ext cx="1493240" cy="640359"/>
+          </a:xfrm>
+          <a:prstGeom prst="rect">
+            <a:avLst/>
+          </a:prstGeom>
+          <a:solidFill>
+            <a:schemeClr val="accent6">
+              <a:lumMod val="20000"/>
+              <a:lumOff val="80000"/>
+            </a:schemeClr>
+          </a:solidFill>
+        </p:spPr>
+        <p:style>
+          <a:lnRef idx="2">
+            <a:schemeClr val="dk1"/>
+          </a:lnRef>
+          <a:fillRef idx="1">
+            <a:schemeClr val="lt1"/>
+          </a:fillRef>
+          <a:effectRef idx="0">
+            <a:schemeClr val="dk1"/>
+          </a:effectRef>
+          <a:fontRef idx="minor">
+            <a:schemeClr val="dk1"/>
+          </a:fontRef>
+        </p:style>
+        <p:txBody>
+          <a:bodyPr rtlCol="0" anchor="ctr"/>
+          <a:lstStyle/>
+          <a:p>
+            <a:pPr algn="ctr"/>
+            <a:r>
+              <a:rPr lang="en-US" sz="1400" dirty="0"/>
+              <a:t>Restored normal</a:t>
+            </a:r>
+          </a:p>
+          <a:p>
+            <a:pPr algn="ctr"/>
+            <a:r>
+              <a:rPr lang="en-US" sz="1200" dirty="0" err="1">
+                <a:solidFill>
+                  <a:schemeClr val="bg2">
+                    <a:lumMod val="50000"/>
+                  </a:schemeClr>
+                </a:solidFill>
+                <a:latin typeface="Consolas" panose="020B0609020204030204" pitchFamily="49" charset="0"/>
+              </a:rPr>
+              <a:t>d_normal</a:t>
+            </a:r>
+            <a:endParaRPr lang="en-US" sz="1200" dirty="0">
+              <a:solidFill>
+                <a:schemeClr val="bg2">
+                  <a:lumMod val="50000"/>
+                </a:schemeClr>
+              </a:solidFill>
+              <a:latin typeface="Consolas" panose="020B0609020204030204" pitchFamily="49" charset="0"/>
+            </a:endParaRPr>
+          </a:p>
+        </p:txBody>
+      </p:sp>
+      <p:sp>
+        <p:nvSpPr>
+          <p:cNvPr id="14" name="Rectangle 13">
+            <a:extLst>
+              <a:ext uri="{FF2B5EF4-FFF2-40B4-BE49-F238E27FC236}">
+                <a16:creationId xmlns:a16="http://schemas.microsoft.com/office/drawing/2014/main" id="{A9B6EB4E-902D-4B3F-A13A-AC476DC1BFFA}"/>
+              </a:ext>
+            </a:extLst>
+          </p:cNvPr>
+          <p:cNvSpPr/>
+          <p:nvPr/>
+        </p:nvSpPr>
+        <p:spPr>
+          <a:xfrm>
+            <a:off x="7056534" y="943064"/>
+            <a:ext cx="1638650" cy="640359"/>
+          </a:xfrm>
+          <a:prstGeom prst="rect">
+            <a:avLst/>
+          </a:prstGeom>
+          <a:solidFill>
+            <a:schemeClr val="accent6">
+              <a:lumMod val="20000"/>
+              <a:lumOff val="80000"/>
+            </a:schemeClr>
+          </a:solidFill>
+        </p:spPr>
+        <p:style>
+          <a:lnRef idx="2">
+            <a:schemeClr val="dk1"/>
+          </a:lnRef>
+          <a:fillRef idx="1">
+            <a:schemeClr val="lt1"/>
+          </a:fillRef>
+          <a:effectRef idx="0">
+            <a:schemeClr val="dk1"/>
+          </a:effectRef>
+          <a:fontRef idx="minor">
+            <a:schemeClr val="dk1"/>
+          </a:fontRef>
+        </p:style>
+        <p:txBody>
+          <a:bodyPr rtlCol="0" anchor="ctr"/>
+          <a:lstStyle/>
+          <a:p>
+            <a:pPr algn="ctr"/>
+            <a:r>
+              <a:rPr lang="en-US" sz="1400" dirty="0"/>
+              <a:t>Sky </a:t>
+            </a:r>
+            <a:r>
+              <a:rPr lang="en-US" sz="1400" dirty="0" err="1"/>
+              <a:t>cubemap</a:t>
+            </a:r>
+            <a:endParaRPr lang="en-US" sz="1400" dirty="0"/>
+          </a:p>
+          <a:p>
+            <a:pPr algn="ctr"/>
+            <a:r>
+              <a:rPr lang="en-US" sz="1200" dirty="0" err="1">
+                <a:solidFill>
+                  <a:schemeClr val="bg2">
+                    <a:lumMod val="50000"/>
+                  </a:schemeClr>
+                </a:solidFill>
+                <a:latin typeface="Consolas" panose="020B0609020204030204" pitchFamily="49" charset="0"/>
+              </a:rPr>
+              <a:t>d_sky</a:t>
+            </a:r>
+            <a:endParaRPr lang="en-US" sz="1200" dirty="0">
+              <a:solidFill>
+                <a:schemeClr val="bg2">
+                  <a:lumMod val="50000"/>
+                </a:schemeClr>
+              </a:solidFill>
+              <a:latin typeface="Consolas" panose="020B0609020204030204" pitchFamily="49" charset="0"/>
+            </a:endParaRPr>
+          </a:p>
+        </p:txBody>
+      </p:sp>
+      <p:sp>
+        <p:nvSpPr>
+          <p:cNvPr id="15" name="Rectangle 14">
+            <a:extLst>
+              <a:ext uri="{FF2B5EF4-FFF2-40B4-BE49-F238E27FC236}">
+                <a16:creationId xmlns:a16="http://schemas.microsoft.com/office/drawing/2014/main" id="{48C429D9-2579-48F0-9ECD-572F38550AB3}"/>
+              </a:ext>
+            </a:extLst>
+          </p:cNvPr>
+          <p:cNvSpPr/>
+          <p:nvPr/>
+        </p:nvSpPr>
+        <p:spPr>
+          <a:xfrm>
+            <a:off x="7056534" y="2011255"/>
+            <a:ext cx="1638650" cy="640359"/>
+          </a:xfrm>
+          <a:prstGeom prst="rect">
+            <a:avLst/>
+          </a:prstGeom>
+          <a:solidFill>
+            <a:schemeClr val="accent2">
+              <a:lumMod val="20000"/>
+              <a:lumOff val="80000"/>
+            </a:schemeClr>
+          </a:solidFill>
+        </p:spPr>
+        <p:style>
+          <a:lnRef idx="2">
+            <a:schemeClr val="dk1"/>
+          </a:lnRef>
+          <a:fillRef idx="1">
+            <a:schemeClr val="lt1"/>
+          </a:fillRef>
+          <a:effectRef idx="0">
+            <a:schemeClr val="dk1"/>
+          </a:effectRef>
+          <a:fontRef idx="minor">
+            <a:schemeClr val="dk1"/>
+          </a:fontRef>
+        </p:style>
+        <p:txBody>
+          <a:bodyPr rtlCol="0" anchor="ctr"/>
+          <a:lstStyle/>
+          <a:p>
+            <a:pPr algn="ctr"/>
+            <a:r>
+              <a:rPr lang="en-US" sz="1600" dirty="0"/>
+              <a:t>Surface Shader</a:t>
+            </a:r>
+            <a:endParaRPr lang="en-US" sz="1400" dirty="0">
+              <a:latin typeface="Consolas" panose="020B0609020204030204" pitchFamily="49" charset="0"/>
+            </a:endParaRPr>
+          </a:p>
+        </p:txBody>
+      </p:sp>
+      <p:sp>
+        <p:nvSpPr>
+          <p:cNvPr id="16" name="Rectangle 15">
+            <a:extLst>
+              <a:ext uri="{FF2B5EF4-FFF2-40B4-BE49-F238E27FC236}">
+                <a16:creationId xmlns:a16="http://schemas.microsoft.com/office/drawing/2014/main" id="{EF7422BA-101B-4016-9F5C-34BD789AAEFD}"/>
+              </a:ext>
+            </a:extLst>
+          </p:cNvPr>
+          <p:cNvSpPr/>
+          <p:nvPr/>
+        </p:nvSpPr>
+        <p:spPr>
+          <a:xfrm>
+            <a:off x="7056534" y="3075249"/>
+            <a:ext cx="1638650" cy="640359"/>
+          </a:xfrm>
+          <a:prstGeom prst="rect">
+            <a:avLst/>
+          </a:prstGeom>
+          <a:solidFill>
+            <a:schemeClr val="accent1">
+              <a:lumMod val="40000"/>
+              <a:lumOff val="60000"/>
+            </a:schemeClr>
+          </a:solidFill>
+        </p:spPr>
+        <p:style>
+          <a:lnRef idx="2">
+            <a:schemeClr val="dk1"/>
+          </a:lnRef>
+          <a:fillRef idx="1">
+            <a:schemeClr val="lt1"/>
+          </a:fillRef>
+          <a:effectRef idx="0">
+            <a:schemeClr val="dk1"/>
+          </a:effectRef>
+          <a:fontRef idx="minor">
+            <a:schemeClr val="dk1"/>
+          </a:fontRef>
+        </p:style>
+        <p:txBody>
+          <a:bodyPr rtlCol="0" anchor="ctr"/>
+          <a:lstStyle/>
+          <a:p>
+            <a:pPr algn="ctr"/>
+            <a:r>
+              <a:rPr lang="en-US" sz="1600" dirty="0"/>
+              <a:t>Final Image</a:t>
+            </a:r>
+            <a:endParaRPr lang="en-US" sz="1400" dirty="0">
+              <a:latin typeface="Consolas" panose="020B0609020204030204" pitchFamily="49" charset="0"/>
+            </a:endParaRPr>
+          </a:p>
+        </p:txBody>
+      </p:sp>
+      <p:cxnSp>
+        <p:nvCxnSpPr>
+          <p:cNvPr id="18" name="Straight Arrow Connector 17">
+            <a:extLst>
+              <a:ext uri="{FF2B5EF4-FFF2-40B4-BE49-F238E27FC236}">
+                <a16:creationId xmlns:a16="http://schemas.microsoft.com/office/drawing/2014/main" id="{0D559085-08E0-451C-843D-5DD7D1DA67F9}"/>
+              </a:ext>
+            </a:extLst>
+          </p:cNvPr>
+          <p:cNvCxnSpPr>
+            <a:cxnSpLocks/>
+            <a:stCxn id="4" idx="2"/>
+            <a:endCxn id="5" idx="0"/>
+          </p:cNvCxnSpPr>
+          <p:nvPr/>
+        </p:nvCxnSpPr>
+        <p:spPr>
+          <a:xfrm flipH="1">
+            <a:off x="3868726" y="1583423"/>
+            <a:ext cx="1019958" cy="432730"/>
+          </a:xfrm>
+          <a:prstGeom prst="straightConnector1">
+            <a:avLst/>
+          </a:prstGeom>
+          <a:ln w="12700">
+            <a:tailEnd type="triangle"/>
+          </a:ln>
+        </p:spPr>
+        <p:style>
+          <a:lnRef idx="1">
+            <a:schemeClr val="dk1"/>
+          </a:lnRef>
+          <a:fillRef idx="0">
+            <a:schemeClr val="dk1"/>
+          </a:fillRef>
+          <a:effectRef idx="0">
+            <a:schemeClr val="dk1"/>
+          </a:effectRef>
+          <a:fontRef idx="minor">
+            <a:schemeClr val="tx1"/>
+          </a:fontRef>
+        </p:style>
+      </p:cxnSp>
+      <p:cxnSp>
+        <p:nvCxnSpPr>
+          <p:cNvPr id="20" name="Straight Arrow Connector 19">
+            <a:extLst>
+              <a:ext uri="{FF2B5EF4-FFF2-40B4-BE49-F238E27FC236}">
+                <a16:creationId xmlns:a16="http://schemas.microsoft.com/office/drawing/2014/main" id="{D3D8B9FF-55FD-45B7-96FC-6395FD5FB64F}"/>
+              </a:ext>
+            </a:extLst>
+          </p:cNvPr>
+          <p:cNvCxnSpPr>
+            <a:cxnSpLocks/>
+            <a:stCxn id="4" idx="2"/>
+            <a:endCxn id="7" idx="0"/>
+          </p:cNvCxnSpPr>
+          <p:nvPr/>
+        </p:nvCxnSpPr>
+        <p:spPr>
+          <a:xfrm>
+            <a:off x="4888684" y="1583423"/>
+            <a:ext cx="937470" cy="427835"/>
+          </a:xfrm>
+          <a:prstGeom prst="straightConnector1">
+            <a:avLst/>
+          </a:prstGeom>
+          <a:ln w="12700">
+            <a:tailEnd type="triangle"/>
+          </a:ln>
+        </p:spPr>
+        <p:style>
+          <a:lnRef idx="1">
+            <a:schemeClr val="dk1"/>
+          </a:lnRef>
+          <a:fillRef idx="0">
+            <a:schemeClr val="dk1"/>
+          </a:fillRef>
+          <a:effectRef idx="0">
+            <a:schemeClr val="dk1"/>
+          </a:effectRef>
+          <a:fontRef idx="minor">
+            <a:schemeClr val="tx1"/>
+          </a:fontRef>
+        </p:style>
+      </p:cxnSp>
+      <p:cxnSp>
+        <p:nvCxnSpPr>
+          <p:cNvPr id="22" name="Straight Arrow Connector 21">
+            <a:extLst>
+              <a:ext uri="{FF2B5EF4-FFF2-40B4-BE49-F238E27FC236}">
+                <a16:creationId xmlns:a16="http://schemas.microsoft.com/office/drawing/2014/main" id="{0F0FB722-5619-4092-9652-E5654759DAD6}"/>
+              </a:ext>
+            </a:extLst>
+          </p:cNvPr>
+          <p:cNvCxnSpPr>
+            <a:cxnSpLocks/>
+            <a:stCxn id="5" idx="2"/>
+            <a:endCxn id="8" idx="0"/>
+          </p:cNvCxnSpPr>
+          <p:nvPr/>
+        </p:nvCxnSpPr>
+        <p:spPr>
+          <a:xfrm>
+            <a:off x="3868726" y="2656512"/>
+            <a:ext cx="0" cy="452299"/>
+          </a:xfrm>
+          <a:prstGeom prst="straightConnector1">
+            <a:avLst/>
+          </a:prstGeom>
+          <a:ln w="12700">
+            <a:tailEnd type="triangle"/>
+          </a:ln>
+        </p:spPr>
+        <p:style>
+          <a:lnRef idx="1">
+            <a:schemeClr val="dk1"/>
+          </a:lnRef>
+          <a:fillRef idx="0">
+            <a:schemeClr val="dk1"/>
+          </a:fillRef>
+          <a:effectRef idx="0">
+            <a:schemeClr val="dk1"/>
+          </a:effectRef>
+          <a:fontRef idx="minor">
+            <a:schemeClr val="tx1"/>
+          </a:fontRef>
+        </p:style>
+      </p:cxnSp>
+      <p:cxnSp>
+        <p:nvCxnSpPr>
+          <p:cNvPr id="24" name="Straight Arrow Connector 23">
+            <a:extLst>
+              <a:ext uri="{FF2B5EF4-FFF2-40B4-BE49-F238E27FC236}">
+                <a16:creationId xmlns:a16="http://schemas.microsoft.com/office/drawing/2014/main" id="{2AB1B690-8FBD-4730-B47B-D88191B646D1}"/>
+              </a:ext>
+            </a:extLst>
+          </p:cNvPr>
+          <p:cNvCxnSpPr>
+            <a:cxnSpLocks/>
+            <a:stCxn id="8" idx="3"/>
+            <a:endCxn id="9" idx="1"/>
+          </p:cNvCxnSpPr>
+          <p:nvPr/>
+        </p:nvCxnSpPr>
+        <p:spPr>
+          <a:xfrm>
+            <a:off x="4595774" y="3428991"/>
+            <a:ext cx="483760" cy="0"/>
+          </a:xfrm>
+          <a:prstGeom prst="straightConnector1">
+            <a:avLst/>
+          </a:prstGeom>
+          <a:ln w="12700">
+            <a:tailEnd type="triangle"/>
+          </a:ln>
+        </p:spPr>
+        <p:style>
+          <a:lnRef idx="1">
+            <a:schemeClr val="dk1"/>
+          </a:lnRef>
+          <a:fillRef idx="0">
+            <a:schemeClr val="dk1"/>
+          </a:fillRef>
+          <a:effectRef idx="0">
+            <a:schemeClr val="dk1"/>
+          </a:effectRef>
+          <a:fontRef idx="minor">
+            <a:schemeClr val="tx1"/>
+          </a:fontRef>
+        </p:style>
+      </p:cxnSp>
+      <p:cxnSp>
+        <p:nvCxnSpPr>
+          <p:cNvPr id="26" name="Straight Arrow Connector 25">
+            <a:extLst>
+              <a:ext uri="{FF2B5EF4-FFF2-40B4-BE49-F238E27FC236}">
+                <a16:creationId xmlns:a16="http://schemas.microsoft.com/office/drawing/2014/main" id="{1EF9E953-C35D-4A35-9FD7-5475066F0832}"/>
+              </a:ext>
+            </a:extLst>
+          </p:cNvPr>
+          <p:cNvCxnSpPr>
+            <a:cxnSpLocks/>
+            <a:stCxn id="7" idx="3"/>
+            <a:endCxn id="15" idx="1"/>
+          </p:cNvCxnSpPr>
+          <p:nvPr/>
+        </p:nvCxnSpPr>
+        <p:spPr>
+          <a:xfrm flipV="1">
+            <a:off x="6572774" y="2331435"/>
+            <a:ext cx="483760" cy="3"/>
+          </a:xfrm>
+          <a:prstGeom prst="straightConnector1">
+            <a:avLst/>
+          </a:prstGeom>
+          <a:ln w="12700">
+            <a:tailEnd type="triangle"/>
+          </a:ln>
+        </p:spPr>
+        <p:style>
+          <a:lnRef idx="1">
+            <a:schemeClr val="dk1"/>
+          </a:lnRef>
+          <a:fillRef idx="0">
+            <a:schemeClr val="dk1"/>
+          </a:fillRef>
+          <a:effectRef idx="0">
+            <a:schemeClr val="dk1"/>
+          </a:effectRef>
+          <a:fontRef idx="minor">
+            <a:schemeClr val="tx1"/>
+          </a:fontRef>
+        </p:style>
+      </p:cxnSp>
+      <p:cxnSp>
+        <p:nvCxnSpPr>
+          <p:cNvPr id="28" name="Connector: Elbow 27">
+            <a:extLst>
+              <a:ext uri="{FF2B5EF4-FFF2-40B4-BE49-F238E27FC236}">
+                <a16:creationId xmlns:a16="http://schemas.microsoft.com/office/drawing/2014/main" id="{3A061F32-6AC5-40C2-991A-27898F8BE724}"/>
+              </a:ext>
+            </a:extLst>
+          </p:cNvPr>
+          <p:cNvCxnSpPr>
+            <a:cxnSpLocks/>
+            <a:stCxn id="9" idx="3"/>
+            <a:endCxn id="15" idx="1"/>
+          </p:cNvCxnSpPr>
+          <p:nvPr/>
+        </p:nvCxnSpPr>
+        <p:spPr>
+          <a:xfrm flipV="1">
+            <a:off x="6572774" y="2331435"/>
+            <a:ext cx="483760" cy="1097556"/>
+          </a:xfrm>
+          <a:prstGeom prst="bentConnector3">
+            <a:avLst/>
+          </a:prstGeom>
+          <a:ln w="12700">
+            <a:tailEnd type="triangle"/>
+          </a:ln>
+        </p:spPr>
+        <p:style>
+          <a:lnRef idx="1">
+            <a:schemeClr val="dk1"/>
+          </a:lnRef>
+          <a:fillRef idx="0">
+            <a:schemeClr val="dk1"/>
+          </a:fillRef>
+          <a:effectRef idx="0">
+            <a:schemeClr val="dk1"/>
+          </a:effectRef>
+          <a:fontRef idx="minor">
+            <a:schemeClr val="tx1"/>
+          </a:fontRef>
+        </p:style>
+      </p:cxnSp>
+      <p:cxnSp>
+        <p:nvCxnSpPr>
+          <p:cNvPr id="31" name="Straight Arrow Connector 30">
+            <a:extLst>
+              <a:ext uri="{FF2B5EF4-FFF2-40B4-BE49-F238E27FC236}">
+                <a16:creationId xmlns:a16="http://schemas.microsoft.com/office/drawing/2014/main" id="{F0F09BB6-0E30-44D8-97DD-5F64690B3FB4}"/>
+              </a:ext>
+            </a:extLst>
+          </p:cNvPr>
+          <p:cNvCxnSpPr>
+            <a:stCxn id="14" idx="2"/>
+            <a:endCxn id="15" idx="0"/>
+          </p:cNvCxnSpPr>
+          <p:nvPr/>
+        </p:nvCxnSpPr>
+        <p:spPr>
+          <a:xfrm>
+            <a:off x="7875859" y="1583423"/>
+            <a:ext cx="0" cy="427832"/>
+          </a:xfrm>
+          <a:prstGeom prst="straightConnector1">
+            <a:avLst/>
+          </a:prstGeom>
+          <a:ln w="12700">
+            <a:tailEnd type="triangle"/>
+          </a:ln>
+        </p:spPr>
+        <p:style>
+          <a:lnRef idx="1">
+            <a:schemeClr val="dk1"/>
+          </a:lnRef>
+          <a:fillRef idx="0">
+            <a:schemeClr val="dk1"/>
+          </a:fillRef>
+          <a:effectRef idx="0">
+            <a:schemeClr val="dk1"/>
+          </a:effectRef>
+          <a:fontRef idx="minor">
+            <a:schemeClr val="tx1"/>
+          </a:fontRef>
+        </p:style>
+      </p:cxnSp>
+      <p:cxnSp>
+        <p:nvCxnSpPr>
+          <p:cNvPr id="33" name="Straight Arrow Connector 32">
+            <a:extLst>
+              <a:ext uri="{FF2B5EF4-FFF2-40B4-BE49-F238E27FC236}">
+                <a16:creationId xmlns:a16="http://schemas.microsoft.com/office/drawing/2014/main" id="{FA861941-BD5F-4728-AEF0-28EA21A23284}"/>
+              </a:ext>
+            </a:extLst>
+          </p:cNvPr>
+          <p:cNvCxnSpPr>
+            <a:stCxn id="15" idx="2"/>
+            <a:endCxn id="16" idx="0"/>
+          </p:cNvCxnSpPr>
+          <p:nvPr/>
+        </p:nvCxnSpPr>
+        <p:spPr>
+          <a:xfrm>
+            <a:off x="7875859" y="2651614"/>
+            <a:ext cx="0" cy="423635"/>
+          </a:xfrm>
+          <a:prstGeom prst="straightConnector1">
+            <a:avLst/>
+          </a:prstGeom>
+          <a:ln w="12700">
+            <a:tailEnd type="triangle"/>
+          </a:ln>
+        </p:spPr>
+        <p:style>
+          <a:lnRef idx="1">
+            <a:schemeClr val="dk1"/>
+          </a:lnRef>
+          <a:fillRef idx="0">
+            <a:schemeClr val="dk1"/>
+          </a:fillRef>
+          <a:effectRef idx="0">
+            <a:schemeClr val="dk1"/>
+          </a:effectRef>
+          <a:fontRef idx="minor">
+            <a:schemeClr val="tx1"/>
+          </a:fontRef>
+        </p:style>
+      </p:cxnSp>
+      <p:sp>
+        <p:nvSpPr>
+          <p:cNvPr id="48" name="Rectangle 47">
+            <a:extLst>
+              <a:ext uri="{FF2B5EF4-FFF2-40B4-BE49-F238E27FC236}">
+                <a16:creationId xmlns:a16="http://schemas.microsoft.com/office/drawing/2014/main" id="{61D7F1BE-4911-407D-B3B0-6D3ECD867B5B}"/>
+              </a:ext>
+            </a:extLst>
+          </p:cNvPr>
+          <p:cNvSpPr/>
+          <p:nvPr/>
+        </p:nvSpPr>
+        <p:spPr>
+          <a:xfrm>
+            <a:off x="3290558" y="712358"/>
+            <a:ext cx="146807" cy="146807"/>
+          </a:xfrm>
+          <a:prstGeom prst="rect">
+            <a:avLst/>
+          </a:prstGeom>
+          <a:solidFill>
+            <a:schemeClr val="accent1">
+              <a:lumMod val="40000"/>
+              <a:lumOff val="60000"/>
+            </a:schemeClr>
+          </a:solidFill>
+        </p:spPr>
+        <p:style>
+          <a:lnRef idx="2">
+            <a:schemeClr val="accent1">
+              <a:shade val="50000"/>
+            </a:schemeClr>
+          </a:lnRef>
+          <a:fillRef idx="1">
+            <a:schemeClr val="accent1"/>
+          </a:fillRef>
+          <a:effectRef idx="0">
+            <a:schemeClr val="accent1"/>
+          </a:effectRef>
+          <a:fontRef idx="minor">
+            <a:schemeClr val="lt1"/>
+          </a:fontRef>
+        </p:style>
+        <p:txBody>
+          <a:bodyPr rtlCol="0" anchor="ctr"/>
+          <a:lstStyle/>
+          <a:p>
+            <a:pPr algn="ctr"/>
+            <a:endParaRPr lang="en-US"/>
+          </a:p>
+        </p:txBody>
+      </p:sp>
+      <p:sp>
+        <p:nvSpPr>
+          <p:cNvPr id="49" name="TextBox 48">
+            <a:extLst>
+              <a:ext uri="{FF2B5EF4-FFF2-40B4-BE49-F238E27FC236}">
+                <a16:creationId xmlns:a16="http://schemas.microsoft.com/office/drawing/2014/main" id="{488DE1D4-56C3-44B5-A528-D59A0BEFA6F1}"/>
+              </a:ext>
+            </a:extLst>
+          </p:cNvPr>
+          <p:cNvSpPr txBox="1"/>
+          <p:nvPr/>
+        </p:nvSpPr>
+        <p:spPr>
+          <a:xfrm>
+            <a:off x="3424071" y="633978"/>
+            <a:ext cx="1142750" cy="307777"/>
+          </a:xfrm>
+          <a:prstGeom prst="rect">
+            <a:avLst/>
+          </a:prstGeom>
+          <a:noFill/>
+        </p:spPr>
+        <p:txBody>
+          <a:bodyPr wrap="none" rtlCol="0">
+            <a:spAutoFit/>
+          </a:bodyPr>
+          <a:lstStyle/>
+          <a:p>
+            <a:pPr algn="ctr"/>
+            <a:r>
+              <a:rPr lang="en-US" sz="1400" dirty="0">
+                <a:solidFill>
+                  <a:schemeClr val="dk1"/>
+                </a:solidFill>
+              </a:rPr>
+              <a:t>Vertex Buffer</a:t>
+            </a:r>
+          </a:p>
+        </p:txBody>
+      </p:sp>
+      <p:sp>
+        <p:nvSpPr>
+          <p:cNvPr id="50" name="Rectangle 49">
+            <a:extLst>
+              <a:ext uri="{FF2B5EF4-FFF2-40B4-BE49-F238E27FC236}">
+                <a16:creationId xmlns:a16="http://schemas.microsoft.com/office/drawing/2014/main" id="{D9C085F1-4784-4EC5-A2E7-3DD93A3F1E03}"/>
+              </a:ext>
+            </a:extLst>
+          </p:cNvPr>
+          <p:cNvSpPr/>
+          <p:nvPr/>
+        </p:nvSpPr>
+        <p:spPr>
+          <a:xfrm>
+            <a:off x="4698772" y="713319"/>
+            <a:ext cx="146807" cy="146807"/>
+          </a:xfrm>
+          <a:prstGeom prst="rect">
+            <a:avLst/>
+          </a:prstGeom>
+          <a:solidFill>
+            <a:schemeClr val="accent6">
+              <a:lumMod val="20000"/>
+              <a:lumOff val="80000"/>
+            </a:schemeClr>
+          </a:solidFill>
+        </p:spPr>
+        <p:style>
+          <a:lnRef idx="2">
+            <a:schemeClr val="accent1">
+              <a:shade val="50000"/>
+            </a:schemeClr>
+          </a:lnRef>
+          <a:fillRef idx="1">
+            <a:schemeClr val="accent1"/>
+          </a:fillRef>
+          <a:effectRef idx="0">
+            <a:schemeClr val="accent1"/>
+          </a:effectRef>
+          <a:fontRef idx="minor">
+            <a:schemeClr val="lt1"/>
+          </a:fontRef>
+        </p:style>
+        <p:txBody>
+          <a:bodyPr rtlCol="0" anchor="ctr"/>
+          <a:lstStyle/>
+          <a:p>
+            <a:pPr algn="ctr"/>
+            <a:endParaRPr lang="en-US"/>
+          </a:p>
+        </p:txBody>
+      </p:sp>
+      <p:sp>
+        <p:nvSpPr>
+          <p:cNvPr id="51" name="TextBox 50">
+            <a:extLst>
+              <a:ext uri="{FF2B5EF4-FFF2-40B4-BE49-F238E27FC236}">
+                <a16:creationId xmlns:a16="http://schemas.microsoft.com/office/drawing/2014/main" id="{E9E71DA5-40B1-4C97-8AC7-2D355482B02F}"/>
+              </a:ext>
+            </a:extLst>
+          </p:cNvPr>
+          <p:cNvSpPr txBox="1"/>
+          <p:nvPr/>
+        </p:nvSpPr>
+        <p:spPr>
+          <a:xfrm>
+            <a:off x="4832285" y="634939"/>
+            <a:ext cx="728405" cy="307777"/>
+          </a:xfrm>
+          <a:prstGeom prst="rect">
+            <a:avLst/>
+          </a:prstGeom>
+          <a:noFill/>
+        </p:spPr>
+        <p:txBody>
+          <a:bodyPr wrap="none" rtlCol="0">
+            <a:spAutoFit/>
+          </a:bodyPr>
+          <a:lstStyle/>
+          <a:p>
+            <a:r>
+              <a:rPr lang="en-US" sz="1400" dirty="0">
+                <a:solidFill>
+                  <a:schemeClr val="dk1"/>
+                </a:solidFill>
+              </a:rPr>
+              <a:t>Texture</a:t>
+            </a:r>
+          </a:p>
+        </p:txBody>
+      </p:sp>
+      <p:sp>
+        <p:nvSpPr>
+          <p:cNvPr id="52" name="Rectangle 51">
+            <a:extLst>
+              <a:ext uri="{FF2B5EF4-FFF2-40B4-BE49-F238E27FC236}">
+                <a16:creationId xmlns:a16="http://schemas.microsoft.com/office/drawing/2014/main" id="{BC61E300-1DAF-40C0-B288-6BC9C2FAAB0C}"/>
+              </a:ext>
+            </a:extLst>
+          </p:cNvPr>
+          <p:cNvSpPr/>
+          <p:nvPr/>
+        </p:nvSpPr>
+        <p:spPr>
+          <a:xfrm>
+            <a:off x="5692641" y="713667"/>
+            <a:ext cx="146807" cy="146807"/>
+          </a:xfrm>
+          <a:prstGeom prst="rect">
+            <a:avLst/>
+          </a:prstGeom>
+          <a:solidFill>
+            <a:schemeClr val="accent2">
+              <a:lumMod val="20000"/>
+              <a:lumOff val="80000"/>
+            </a:schemeClr>
+          </a:solidFill>
+        </p:spPr>
+        <p:style>
+          <a:lnRef idx="2">
+            <a:schemeClr val="accent1">
+              <a:shade val="50000"/>
+            </a:schemeClr>
+          </a:lnRef>
+          <a:fillRef idx="1">
+            <a:schemeClr val="accent1"/>
+          </a:fillRef>
+          <a:effectRef idx="0">
+            <a:schemeClr val="accent1"/>
+          </a:effectRef>
+          <a:fontRef idx="minor">
+            <a:schemeClr val="lt1"/>
+          </a:fontRef>
+        </p:style>
+        <p:txBody>
+          <a:bodyPr rtlCol="0" anchor="ctr"/>
+          <a:lstStyle/>
+          <a:p>
+            <a:pPr algn="ctr"/>
+            <a:endParaRPr lang="en-US"/>
+          </a:p>
+        </p:txBody>
+      </p:sp>
+      <p:sp>
+        <p:nvSpPr>
+          <p:cNvPr id="53" name="TextBox 52">
+            <a:extLst>
+              <a:ext uri="{FF2B5EF4-FFF2-40B4-BE49-F238E27FC236}">
+                <a16:creationId xmlns:a16="http://schemas.microsoft.com/office/drawing/2014/main" id="{0AE5A220-D41F-4B4A-AB55-E64F3C69B8AC}"/>
+              </a:ext>
+            </a:extLst>
+          </p:cNvPr>
+          <p:cNvSpPr txBox="1"/>
+          <p:nvPr/>
+        </p:nvSpPr>
+        <p:spPr>
+          <a:xfrm>
+            <a:off x="5826154" y="635287"/>
+            <a:ext cx="694421" cy="307777"/>
+          </a:xfrm>
+          <a:prstGeom prst="rect">
+            <a:avLst/>
+          </a:prstGeom>
+          <a:noFill/>
+        </p:spPr>
+        <p:txBody>
+          <a:bodyPr wrap="none" rtlCol="0">
+            <a:spAutoFit/>
+          </a:bodyPr>
+          <a:lstStyle/>
+          <a:p>
+            <a:r>
+              <a:rPr lang="en-US" sz="1400" dirty="0">
+                <a:solidFill>
+                  <a:schemeClr val="dk1"/>
+                </a:solidFill>
+              </a:rPr>
+              <a:t>Shader</a:t>
+            </a:r>
+          </a:p>
+        </p:txBody>
+      </p:sp>
+    </p:spTree>
+    <p:extLst>
+      <p:ext uri="{BB962C8B-B14F-4D97-AF65-F5344CB8AC3E}">
+        <p14:creationId xmlns:p14="http://schemas.microsoft.com/office/powerpoint/2010/main" val="3236654580"/>
+      </p:ext>
+    </p:extLst>
+  </p:cSld>
+  <p:clrMapOvr>
+    <a:masterClrMapping/>
+  </p:clrMapOvr>
+</p:sld>
+</file>
+
+<file path=ppt/slides/slide9.xml><?xml version="1.0" encoding="utf-8"?>
+<p:sld xmlns:a="http://schemas.openxmlformats.org/drawingml/2006/main" xmlns:r="http://schemas.openxmlformats.org/officeDocument/2006/relationships" xmlns:p="http://schemas.openxmlformats.org/presentationml/2006/main">
+  <p:cSld>
+    <p:spTree>
+      <p:nvGrpSpPr>
+        <p:cNvPr id="1" name=""/>
+        <p:cNvGrpSpPr/>
+        <p:nvPr/>
+      </p:nvGrpSpPr>
+      <p:grpSpPr>
+        <a:xfrm>
+          <a:off x="0" y="0"/>
+          <a:ext cx="0" cy="0"/>
+          <a:chOff x="0" y="0"/>
+          <a:chExt cx="0" cy="0"/>
+        </a:xfrm>
+      </p:grpSpPr>
+      <p:grpSp>
+        <p:nvGrpSpPr>
+          <p:cNvPr id="9" name="Group 8">
+            <a:extLst>
+              <a:ext uri="{FF2B5EF4-FFF2-40B4-BE49-F238E27FC236}">
+                <a16:creationId xmlns:a16="http://schemas.microsoft.com/office/drawing/2014/main" id="{FBDFDEBB-A111-4FD0-BE2C-2796E86ABF02}"/>
+              </a:ext>
+            </a:extLst>
+          </p:cNvPr>
+          <p:cNvGrpSpPr/>
+          <p:nvPr/>
+        </p:nvGrpSpPr>
+        <p:grpSpPr>
+          <a:xfrm>
+            <a:off x="1929467" y="2389823"/>
+            <a:ext cx="1610687" cy="1419811"/>
+            <a:chOff x="2000774" y="2902237"/>
+            <a:chExt cx="1023457" cy="902171"/>
+          </a:xfrm>
+        </p:grpSpPr>
+        <p:cxnSp>
+          <p:nvCxnSpPr>
+            <p:cNvPr id="5" name="Straight Arrow Connector 4">
+              <a:extLst>
+                <a:ext uri="{FF2B5EF4-FFF2-40B4-BE49-F238E27FC236}">
+                  <a16:creationId xmlns:a16="http://schemas.microsoft.com/office/drawing/2014/main" id="{D7DFD59F-6925-4C95-A1C9-2768F35CCF54}"/>
+                </a:ext>
+              </a:extLst>
+            </p:cNvPr>
+            <p:cNvCxnSpPr/>
+            <p:nvPr/>
+          </p:nvCxnSpPr>
+          <p:spPr>
+            <a:xfrm>
+              <a:off x="2000774" y="3326235"/>
+              <a:ext cx="1023457" cy="0"/>
+            </a:xfrm>
+            <a:prstGeom prst="straightConnector1">
+              <a:avLst/>
+            </a:prstGeom>
+            <a:ln w="12700">
+              <a:solidFill>
+                <a:schemeClr val="bg2">
+                  <a:lumMod val="75000"/>
+                </a:schemeClr>
+              </a:solidFill>
+              <a:headEnd type="none" w="med" len="med"/>
+              <a:tailEnd type="triangle" w="med" len="med"/>
+            </a:ln>
+          </p:spPr>
+          <p:style>
+            <a:lnRef idx="1">
+              <a:schemeClr val="dk1"/>
+            </a:lnRef>
+            <a:fillRef idx="0">
+              <a:schemeClr val="dk1"/>
+            </a:fillRef>
+            <a:effectRef idx="0">
+              <a:schemeClr val="dk1"/>
+            </a:effectRef>
+            <a:fontRef idx="minor">
+              <a:schemeClr val="tx1"/>
+            </a:fontRef>
+          </p:style>
+        </p:cxnSp>
+        <p:cxnSp>
+          <p:nvCxnSpPr>
+            <p:cNvPr id="7" name="Straight Arrow Connector 6">
+              <a:extLst>
+                <a:ext uri="{FF2B5EF4-FFF2-40B4-BE49-F238E27FC236}">
+                  <a16:creationId xmlns:a16="http://schemas.microsoft.com/office/drawing/2014/main" id="{D76C4C20-E53F-4A41-9845-809CB9F0B3E1}"/>
+                </a:ext>
+              </a:extLst>
+            </p:cNvPr>
+            <p:cNvCxnSpPr>
+              <a:cxnSpLocks/>
+            </p:cNvCxnSpPr>
+            <p:nvPr/>
+          </p:nvCxnSpPr>
+          <p:spPr>
+            <a:xfrm flipV="1">
+              <a:off x="2516697" y="2902237"/>
+              <a:ext cx="0" cy="902171"/>
+            </a:xfrm>
+            <a:prstGeom prst="straightConnector1">
+              <a:avLst/>
+            </a:prstGeom>
+            <a:ln w="12700">
+              <a:solidFill>
+                <a:schemeClr val="bg2">
+                  <a:lumMod val="75000"/>
+                </a:schemeClr>
+              </a:solidFill>
+              <a:headEnd type="none" w="med" len="med"/>
+              <a:tailEnd type="triangle" w="med" len="med"/>
+            </a:ln>
+          </p:spPr>
+          <p:style>
+            <a:lnRef idx="1">
+              <a:schemeClr val="dk1"/>
+            </a:lnRef>
+            <a:fillRef idx="0">
+              <a:schemeClr val="dk1"/>
+            </a:fillRef>
+            <a:effectRef idx="0">
+              <a:schemeClr val="dk1"/>
+            </a:effectRef>
+            <a:fontRef idx="minor">
+              <a:schemeClr val="tx1"/>
+            </a:fontRef>
+          </p:style>
+        </p:cxnSp>
+      </p:grpSp>
+      <p:sp>
+        <p:nvSpPr>
+          <p:cNvPr id="10" name="Rectangle 9">
+            <a:extLst>
+              <a:ext uri="{FF2B5EF4-FFF2-40B4-BE49-F238E27FC236}">
+                <a16:creationId xmlns:a16="http://schemas.microsoft.com/office/drawing/2014/main" id="{282C2F76-C322-4E1C-A4FC-05161AB2172F}"/>
+              </a:ext>
+            </a:extLst>
+          </p:cNvPr>
+          <p:cNvSpPr/>
+          <p:nvPr/>
+        </p:nvSpPr>
+        <p:spPr>
+          <a:xfrm>
+            <a:off x="2290504" y="2776073"/>
+            <a:ext cx="901815" cy="562053"/>
+          </a:xfrm>
+          <a:prstGeom prst="rect">
+            <a:avLst/>
+          </a:prstGeom>
+          <a:solidFill>
+            <a:srgbClr val="000000">
+              <a:alpha val="3137"/>
+            </a:srgbClr>
+          </a:solidFill>
+        </p:spPr>
+        <p:style>
+          <a:lnRef idx="2">
+            <a:schemeClr val="dk1"/>
+          </a:lnRef>
+          <a:fillRef idx="1">
+            <a:schemeClr val="lt1"/>
+          </a:fillRef>
+          <a:effectRef idx="0">
+            <a:schemeClr val="dk1"/>
+          </a:effectRef>
+          <a:fontRef idx="minor">
+            <a:schemeClr val="dk1"/>
+          </a:fontRef>
+        </p:style>
+        <p:txBody>
+          <a:bodyPr rtlCol="0" anchor="ctr"/>
+          <a:lstStyle/>
+          <a:p>
+            <a:pPr algn="ctr"/>
+            <a:endParaRPr lang="en-US"/>
+          </a:p>
+        </p:txBody>
+      </p:sp>
+      <mc:AlternateContent xmlns:mc="http://schemas.openxmlformats.org/markup-compatibility/2006">
+        <mc:Choice xmlns:a14="http://schemas.microsoft.com/office/drawing/2010/main" Requires="a14">
+          <p:sp>
+            <p:nvSpPr>
+              <p:cNvPr id="11" name="TextBox 10">
+                <a:extLst>
+                  <a:ext uri="{FF2B5EF4-FFF2-40B4-BE49-F238E27FC236}">
+                    <a16:creationId xmlns:a16="http://schemas.microsoft.com/office/drawing/2014/main" id="{D4332DC8-ECFB-4541-A766-BA3F69255185}"/>
+                  </a:ext>
+                </a:extLst>
+              </p:cNvPr>
+              <p:cNvSpPr txBox="1"/>
+              <p:nvPr/>
+            </p:nvSpPr>
+            <p:spPr>
+              <a:xfrm>
+                <a:off x="3141676" y="2999065"/>
+                <a:ext cx="313676" cy="307777"/>
+              </a:xfrm>
+              <a:prstGeom prst="rect">
+                <a:avLst/>
+              </a:prstGeom>
+              <a:noFill/>
+            </p:spPr>
+            <p:txBody>
+              <a:bodyPr wrap="none" rtlCol="0">
+                <a:spAutoFit/>
+              </a:bodyPr>
+              <a:lstStyle/>
+              <a:p>
+                <a14:m>
+                  <m:oMathPara xmlns:m="http://schemas.openxmlformats.org/officeDocument/2006/math">
+                    <m:oMathParaPr>
+                      <m:jc m:val="centerGroup"/>
+                    </m:oMathParaPr>
+                    <m:oMath xmlns:m="http://schemas.openxmlformats.org/officeDocument/2006/math">
+                      <m:r>
+                        <a:rPr lang="en-US" sz="1400" b="0" i="1" smtClean="0">
+                          <a:latin typeface="Cambria Math" panose="02040503050406030204" pitchFamily="18" charset="0"/>
+                        </a:rPr>
+                        <m:t>𝑟</m:t>
+                      </m:r>
+                    </m:oMath>
+                  </m:oMathPara>
+                </a14:m>
+                <a:endParaRPr lang="en-US" sz="1400" dirty="0"/>
+              </a:p>
+            </p:txBody>
+          </p:sp>
+        </mc:Choice>
+        <mc:Fallback>
+          <p:sp>
+            <p:nvSpPr>
+              <p:cNvPr id="11" name="TextBox 10">
+                <a:extLst>
+                  <a:ext uri="{FF2B5EF4-FFF2-40B4-BE49-F238E27FC236}">
+                    <a16:creationId xmlns:a16="http://schemas.microsoft.com/office/drawing/2014/main" id="{D4332DC8-ECFB-4541-A766-BA3F69255185}"/>
+                  </a:ext>
+                </a:extLst>
+              </p:cNvPr>
+              <p:cNvSpPr txBox="1">
+                <a:spLocks noRot="1" noChangeAspect="1" noMove="1" noResize="1" noEditPoints="1" noAdjustHandles="1" noChangeArrowheads="1" noChangeShapeType="1" noTextEdit="1"/>
+              </p:cNvSpPr>
+              <p:nvPr/>
+            </p:nvSpPr>
+            <p:spPr>
+              <a:xfrm>
+                <a:off x="3141676" y="2999065"/>
+                <a:ext cx="313676" cy="307777"/>
+              </a:xfrm>
+              <a:prstGeom prst="rect">
+                <a:avLst/>
+              </a:prstGeom>
+              <a:blipFill>
+                <a:blip r:embed="rId2"/>
+                <a:stretch>
+                  <a:fillRect/>
+                </a:stretch>
+              </a:blipFill>
+            </p:spPr>
+            <p:txBody>
+              <a:bodyPr/>
+              <a:lstStyle/>
+              <a:p>
+                <a:r>
+                  <a:rPr lang="en-US">
+                    <a:noFill/>
+                  </a:rPr>
+                  <a:t> </a:t>
+                </a:r>
+              </a:p>
+            </p:txBody>
+          </p:sp>
+        </mc:Fallback>
+      </mc:AlternateContent>
+      <mc:AlternateContent xmlns:mc="http://schemas.openxmlformats.org/markup-compatibility/2006">
+        <mc:Choice xmlns:a14="http://schemas.microsoft.com/office/drawing/2010/main" Requires="a14">
+          <p:sp>
+            <p:nvSpPr>
+              <p:cNvPr id="12" name="TextBox 11">
+                <a:extLst>
+                  <a:ext uri="{FF2B5EF4-FFF2-40B4-BE49-F238E27FC236}">
+                    <a16:creationId xmlns:a16="http://schemas.microsoft.com/office/drawing/2014/main" id="{35F036DE-819C-42AC-B125-99E0951CB582}"/>
+                  </a:ext>
+                </a:extLst>
+              </p:cNvPr>
+              <p:cNvSpPr txBox="1"/>
+              <p:nvPr/>
+            </p:nvSpPr>
+            <p:spPr>
+              <a:xfrm>
+                <a:off x="2027471" y="2999065"/>
+                <a:ext cx="286552" cy="307777"/>
+              </a:xfrm>
+              <a:prstGeom prst="rect">
+                <a:avLst/>
+              </a:prstGeom>
+              <a:noFill/>
+            </p:spPr>
+            <p:txBody>
+              <a:bodyPr wrap="none" rtlCol="0">
+                <a:spAutoFit/>
+              </a:bodyPr>
+              <a:lstStyle/>
+              <a:p>
+                <a14:m>
+                  <m:oMathPara xmlns:m="http://schemas.openxmlformats.org/officeDocument/2006/math">
+                    <m:oMathParaPr>
+                      <m:jc m:val="centerGroup"/>
+                    </m:oMathParaPr>
+                    <m:oMath xmlns:m="http://schemas.openxmlformats.org/officeDocument/2006/math">
+                      <m:r>
+                        <a:rPr lang="en-US" sz="1400" b="0" i="1" smtClean="0">
+                          <a:latin typeface="Cambria Math" panose="02040503050406030204" pitchFamily="18" charset="0"/>
+                        </a:rPr>
+                        <m:t>𝑙</m:t>
+                      </m:r>
+                    </m:oMath>
+                  </m:oMathPara>
+                </a14:m>
+                <a:endParaRPr lang="en-US" sz="1400" dirty="0"/>
+              </a:p>
+            </p:txBody>
+          </p:sp>
+        </mc:Choice>
+        <mc:Fallback>
+          <p:sp>
+            <p:nvSpPr>
+              <p:cNvPr id="12" name="TextBox 11">
+                <a:extLst>
+                  <a:ext uri="{FF2B5EF4-FFF2-40B4-BE49-F238E27FC236}">
+                    <a16:creationId xmlns:a16="http://schemas.microsoft.com/office/drawing/2014/main" id="{35F036DE-819C-42AC-B125-99E0951CB582}"/>
+                  </a:ext>
+                </a:extLst>
+              </p:cNvPr>
+              <p:cNvSpPr txBox="1">
+                <a:spLocks noRot="1" noChangeAspect="1" noMove="1" noResize="1" noEditPoints="1" noAdjustHandles="1" noChangeArrowheads="1" noChangeShapeType="1" noTextEdit="1"/>
+              </p:cNvSpPr>
+              <p:nvPr/>
+            </p:nvSpPr>
+            <p:spPr>
+              <a:xfrm>
+                <a:off x="2027471" y="2999065"/>
+                <a:ext cx="286552" cy="307777"/>
+              </a:xfrm>
+              <a:prstGeom prst="rect">
+                <a:avLst/>
+              </a:prstGeom>
+              <a:blipFill>
+                <a:blip r:embed="rId3"/>
+                <a:stretch>
+                  <a:fillRect/>
+                </a:stretch>
+              </a:blipFill>
+            </p:spPr>
+            <p:txBody>
+              <a:bodyPr/>
+              <a:lstStyle/>
+              <a:p>
+                <a:r>
+                  <a:rPr lang="en-US">
+                    <a:noFill/>
+                  </a:rPr>
+                  <a:t> </a:t>
+                </a:r>
+              </a:p>
+            </p:txBody>
+          </p:sp>
+        </mc:Fallback>
+      </mc:AlternateContent>
+      <mc:AlternateContent xmlns:mc="http://schemas.openxmlformats.org/markup-compatibility/2006">
+        <mc:Choice xmlns:a14="http://schemas.microsoft.com/office/drawing/2010/main" Requires="a14">
+          <p:sp>
+            <p:nvSpPr>
+              <p:cNvPr id="13" name="TextBox 12">
+                <a:extLst>
+                  <a:ext uri="{FF2B5EF4-FFF2-40B4-BE49-F238E27FC236}">
+                    <a16:creationId xmlns:a16="http://schemas.microsoft.com/office/drawing/2014/main" id="{9DE86EE2-66D4-4F1D-AA76-8A6158ACF78B}"/>
+                  </a:ext>
+                </a:extLst>
+              </p:cNvPr>
+              <p:cNvSpPr txBox="1"/>
+              <p:nvPr/>
+            </p:nvSpPr>
+            <p:spPr>
+              <a:xfrm>
+                <a:off x="2681680" y="2499582"/>
+                <a:ext cx="299633" cy="307777"/>
+              </a:xfrm>
+              <a:prstGeom prst="rect">
+                <a:avLst/>
+              </a:prstGeom>
+              <a:noFill/>
+            </p:spPr>
+            <p:txBody>
+              <a:bodyPr wrap="none" rtlCol="0">
+                <a:spAutoFit/>
+              </a:bodyPr>
+              <a:lstStyle/>
+              <a:p>
+                <a14:m>
+                  <m:oMathPara xmlns:m="http://schemas.openxmlformats.org/officeDocument/2006/math">
+                    <m:oMathParaPr>
+                      <m:jc m:val="centerGroup"/>
+                    </m:oMathParaPr>
+                    <m:oMath xmlns:m="http://schemas.openxmlformats.org/officeDocument/2006/math">
+                      <m:r>
+                        <a:rPr lang="en-US" sz="1400" b="0" i="1" smtClean="0">
+                          <a:latin typeface="Cambria Math" panose="02040503050406030204" pitchFamily="18" charset="0"/>
+                        </a:rPr>
+                        <m:t>𝑡</m:t>
+                      </m:r>
+                    </m:oMath>
+                  </m:oMathPara>
+                </a14:m>
+                <a:endParaRPr lang="en-US" sz="1400" dirty="0"/>
+              </a:p>
+            </p:txBody>
+          </p:sp>
+        </mc:Choice>
+        <mc:Fallback>
+          <p:sp>
+            <p:nvSpPr>
+              <p:cNvPr id="13" name="TextBox 12">
+                <a:extLst>
+                  <a:ext uri="{FF2B5EF4-FFF2-40B4-BE49-F238E27FC236}">
+                    <a16:creationId xmlns:a16="http://schemas.microsoft.com/office/drawing/2014/main" id="{9DE86EE2-66D4-4F1D-AA76-8A6158ACF78B}"/>
+                  </a:ext>
+                </a:extLst>
+              </p:cNvPr>
+              <p:cNvSpPr txBox="1">
+                <a:spLocks noRot="1" noChangeAspect="1" noMove="1" noResize="1" noEditPoints="1" noAdjustHandles="1" noChangeArrowheads="1" noChangeShapeType="1" noTextEdit="1"/>
+              </p:cNvSpPr>
+              <p:nvPr/>
+            </p:nvSpPr>
+            <p:spPr>
+              <a:xfrm>
+                <a:off x="2681680" y="2499582"/>
+                <a:ext cx="299633" cy="307777"/>
+              </a:xfrm>
+              <a:prstGeom prst="rect">
+                <a:avLst/>
+              </a:prstGeom>
+              <a:blipFill>
+                <a:blip r:embed="rId4"/>
+                <a:stretch>
+                  <a:fillRect/>
+                </a:stretch>
+              </a:blipFill>
+            </p:spPr>
+            <p:txBody>
+              <a:bodyPr/>
+              <a:lstStyle/>
+              <a:p>
+                <a:r>
+                  <a:rPr lang="en-US">
+                    <a:noFill/>
+                  </a:rPr>
+                  <a:t> </a:t>
+                </a:r>
+              </a:p>
+            </p:txBody>
+          </p:sp>
+        </mc:Fallback>
+      </mc:AlternateContent>
+      <mc:AlternateContent xmlns:mc="http://schemas.openxmlformats.org/markup-compatibility/2006">
+        <mc:Choice xmlns:a14="http://schemas.microsoft.com/office/drawing/2010/main" Requires="a14">
+          <p:sp>
+            <p:nvSpPr>
+              <p:cNvPr id="14" name="TextBox 13">
+                <a:extLst>
+                  <a:ext uri="{FF2B5EF4-FFF2-40B4-BE49-F238E27FC236}">
+                    <a16:creationId xmlns:a16="http://schemas.microsoft.com/office/drawing/2014/main" id="{81AF0BB7-3A13-4D62-8DD1-37D49CBCF64A}"/>
+                  </a:ext>
+                </a:extLst>
+              </p:cNvPr>
+              <p:cNvSpPr txBox="1"/>
+              <p:nvPr/>
+            </p:nvSpPr>
+            <p:spPr>
+              <a:xfrm>
+                <a:off x="2667637" y="3306840"/>
+                <a:ext cx="324897" cy="307777"/>
+              </a:xfrm>
+              <a:prstGeom prst="rect">
+                <a:avLst/>
+              </a:prstGeom>
+              <a:noFill/>
+            </p:spPr>
+            <p:txBody>
+              <a:bodyPr wrap="none" rtlCol="0">
+                <a:spAutoFit/>
+              </a:bodyPr>
+              <a:lstStyle/>
+              <a:p>
+                <a14:m>
+                  <m:oMathPara xmlns:m="http://schemas.openxmlformats.org/officeDocument/2006/math">
+                    <m:oMathParaPr>
+                      <m:jc m:val="centerGroup"/>
+                    </m:oMathParaPr>
+                    <m:oMath xmlns:m="http://schemas.openxmlformats.org/officeDocument/2006/math">
+                      <m:r>
+                        <a:rPr lang="en-US" sz="1400" b="0" i="1" smtClean="0">
+                          <a:latin typeface="Cambria Math" panose="02040503050406030204" pitchFamily="18" charset="0"/>
+                        </a:rPr>
+                        <m:t>𝑏</m:t>
+                      </m:r>
+                    </m:oMath>
+                  </m:oMathPara>
+                </a14:m>
+                <a:endParaRPr lang="en-US" sz="1400" dirty="0"/>
+              </a:p>
+            </p:txBody>
+          </p:sp>
+        </mc:Choice>
+        <mc:Fallback>
+          <p:sp>
+            <p:nvSpPr>
+              <p:cNvPr id="14" name="TextBox 13">
+                <a:extLst>
+                  <a:ext uri="{FF2B5EF4-FFF2-40B4-BE49-F238E27FC236}">
+                    <a16:creationId xmlns:a16="http://schemas.microsoft.com/office/drawing/2014/main" id="{81AF0BB7-3A13-4D62-8DD1-37D49CBCF64A}"/>
+                  </a:ext>
+                </a:extLst>
+              </p:cNvPr>
+              <p:cNvSpPr txBox="1">
+                <a:spLocks noRot="1" noChangeAspect="1" noMove="1" noResize="1" noEditPoints="1" noAdjustHandles="1" noChangeArrowheads="1" noChangeShapeType="1" noTextEdit="1"/>
+              </p:cNvSpPr>
+              <p:nvPr/>
+            </p:nvSpPr>
+            <p:spPr>
+              <a:xfrm>
+                <a:off x="2667637" y="3306840"/>
+                <a:ext cx="324897" cy="307777"/>
+              </a:xfrm>
+              <a:prstGeom prst="rect">
+                <a:avLst/>
+              </a:prstGeom>
+              <a:blipFill>
+                <a:blip r:embed="rId5"/>
+                <a:stretch>
+                  <a:fillRect/>
+                </a:stretch>
+              </a:blipFill>
+            </p:spPr>
+            <p:txBody>
+              <a:bodyPr/>
+              <a:lstStyle/>
+              <a:p>
+                <a:r>
+                  <a:rPr lang="en-US">
+                    <a:noFill/>
+                  </a:rPr>
+                  <a:t> </a:t>
+                </a:r>
+              </a:p>
+            </p:txBody>
+          </p:sp>
+        </mc:Fallback>
+      </mc:AlternateContent>
+      <mc:AlternateContent xmlns:mc="http://schemas.openxmlformats.org/markup-compatibility/2006">
+        <mc:Choice xmlns:a14="http://schemas.microsoft.com/office/drawing/2010/main" Requires="a14">
+          <p:sp>
+            <p:nvSpPr>
+              <p:cNvPr id="15" name="TextBox 14">
+                <a:extLst>
+                  <a:ext uri="{FF2B5EF4-FFF2-40B4-BE49-F238E27FC236}">
+                    <a16:creationId xmlns:a16="http://schemas.microsoft.com/office/drawing/2014/main" id="{14A72158-C227-45C1-B015-5D65B27CB601}"/>
+                  </a:ext>
+                </a:extLst>
+              </p:cNvPr>
+              <p:cNvSpPr txBox="1"/>
+              <p:nvPr/>
+            </p:nvSpPr>
+            <p:spPr>
+              <a:xfrm>
+                <a:off x="3485706" y="2903210"/>
+                <a:ext cx="328936" cy="307777"/>
+              </a:xfrm>
+              <a:prstGeom prst="rect">
+                <a:avLst/>
+              </a:prstGeom>
+              <a:noFill/>
+            </p:spPr>
+            <p:txBody>
+              <a:bodyPr wrap="none" rtlCol="0">
+                <a:spAutoFit/>
+              </a:bodyPr>
+              <a:lstStyle/>
+              <a:p>
+                <a14:m>
+                  <m:oMathPara xmlns:m="http://schemas.openxmlformats.org/officeDocument/2006/math">
+                    <m:oMathParaPr>
+                      <m:jc m:val="centerGroup"/>
+                    </m:oMathParaPr>
+                    <m:oMath xmlns:m="http://schemas.openxmlformats.org/officeDocument/2006/math">
+                      <m:r>
+                        <a:rPr lang="en-US" sz="1400" b="1" i="1" smtClean="0">
+                          <a:latin typeface="Cambria Math" panose="02040503050406030204" pitchFamily="18" charset="0"/>
+                        </a:rPr>
+                        <m:t>𝒙</m:t>
+                      </m:r>
+                    </m:oMath>
+                  </m:oMathPara>
+                </a14:m>
+                <a:endParaRPr lang="en-US" sz="1400" b="1" dirty="0"/>
+              </a:p>
+            </p:txBody>
+          </p:sp>
+        </mc:Choice>
+        <mc:Fallback>
+          <p:sp>
+            <p:nvSpPr>
+              <p:cNvPr id="15" name="TextBox 14">
+                <a:extLst>
+                  <a:ext uri="{FF2B5EF4-FFF2-40B4-BE49-F238E27FC236}">
+                    <a16:creationId xmlns:a16="http://schemas.microsoft.com/office/drawing/2014/main" id="{14A72158-C227-45C1-B015-5D65B27CB601}"/>
+                  </a:ext>
+                </a:extLst>
+              </p:cNvPr>
+              <p:cNvSpPr txBox="1">
+                <a:spLocks noRot="1" noChangeAspect="1" noMove="1" noResize="1" noEditPoints="1" noAdjustHandles="1" noChangeArrowheads="1" noChangeShapeType="1" noTextEdit="1"/>
+              </p:cNvSpPr>
+              <p:nvPr/>
+            </p:nvSpPr>
+            <p:spPr>
+              <a:xfrm>
+                <a:off x="3485706" y="2903210"/>
+                <a:ext cx="328936" cy="307777"/>
+              </a:xfrm>
+              <a:prstGeom prst="rect">
+                <a:avLst/>
+              </a:prstGeom>
+              <a:blipFill>
+                <a:blip r:embed="rId6"/>
+                <a:stretch>
+                  <a:fillRect/>
+                </a:stretch>
+              </a:blipFill>
+            </p:spPr>
+            <p:txBody>
+              <a:bodyPr/>
+              <a:lstStyle/>
+              <a:p>
+                <a:r>
+                  <a:rPr lang="en-US">
+                    <a:noFill/>
+                  </a:rPr>
+                  <a:t> </a:t>
+                </a:r>
+              </a:p>
+            </p:txBody>
+          </p:sp>
+        </mc:Fallback>
+      </mc:AlternateContent>
+      <mc:AlternateContent xmlns:mc="http://schemas.openxmlformats.org/markup-compatibility/2006">
+        <mc:Choice xmlns:a14="http://schemas.microsoft.com/office/drawing/2010/main" Requires="a14">
+          <p:sp>
+            <p:nvSpPr>
+              <p:cNvPr id="16" name="TextBox 15">
+                <a:extLst>
+                  <a:ext uri="{FF2B5EF4-FFF2-40B4-BE49-F238E27FC236}">
+                    <a16:creationId xmlns:a16="http://schemas.microsoft.com/office/drawing/2014/main" id="{B0B14B08-F008-4F40-82F7-583F9FA5F9D5}"/>
+                  </a:ext>
+                </a:extLst>
+              </p:cNvPr>
+              <p:cNvSpPr txBox="1"/>
+              <p:nvPr/>
+            </p:nvSpPr>
+            <p:spPr>
+              <a:xfrm>
+                <a:off x="2578962" y="2076019"/>
+                <a:ext cx="332142" cy="307777"/>
+              </a:xfrm>
+              <a:prstGeom prst="rect">
+                <a:avLst/>
+              </a:prstGeom>
+              <a:noFill/>
+            </p:spPr>
+            <p:txBody>
+              <a:bodyPr wrap="none" rtlCol="0">
+                <a:spAutoFit/>
+              </a:bodyPr>
+              <a:lstStyle/>
+              <a:p>
+                <a14:m>
+                  <m:oMathPara xmlns:m="http://schemas.openxmlformats.org/officeDocument/2006/math">
+                    <m:oMathParaPr>
+                      <m:jc m:val="centerGroup"/>
+                    </m:oMathParaPr>
+                    <m:oMath xmlns:m="http://schemas.openxmlformats.org/officeDocument/2006/math">
+                      <m:r>
+                        <a:rPr lang="en-US" sz="1400" b="1" i="1" smtClean="0">
+                          <a:latin typeface="Cambria Math" panose="02040503050406030204" pitchFamily="18" charset="0"/>
+                        </a:rPr>
+                        <m:t>𝒚</m:t>
+                      </m:r>
+                    </m:oMath>
+                  </m:oMathPara>
+                </a14:m>
+                <a:endParaRPr lang="en-US" sz="1400" b="1" dirty="0"/>
+              </a:p>
+            </p:txBody>
+          </p:sp>
+        </mc:Choice>
+        <mc:Fallback>
+          <p:sp>
+            <p:nvSpPr>
+              <p:cNvPr id="16" name="TextBox 15">
+                <a:extLst>
+                  <a:ext uri="{FF2B5EF4-FFF2-40B4-BE49-F238E27FC236}">
+                    <a16:creationId xmlns:a16="http://schemas.microsoft.com/office/drawing/2014/main" id="{B0B14B08-F008-4F40-82F7-583F9FA5F9D5}"/>
+                  </a:ext>
+                </a:extLst>
+              </p:cNvPr>
+              <p:cNvSpPr txBox="1">
+                <a:spLocks noRot="1" noChangeAspect="1" noMove="1" noResize="1" noEditPoints="1" noAdjustHandles="1" noChangeArrowheads="1" noChangeShapeType="1" noTextEdit="1"/>
+              </p:cNvSpPr>
+              <p:nvPr/>
+            </p:nvSpPr>
+            <p:spPr>
+              <a:xfrm>
+                <a:off x="2578962" y="2076019"/>
+                <a:ext cx="332142" cy="307777"/>
+              </a:xfrm>
+              <a:prstGeom prst="rect">
+                <a:avLst/>
+              </a:prstGeom>
+              <a:blipFill>
+                <a:blip r:embed="rId7"/>
+                <a:stretch>
+                  <a:fillRect b="-2000"/>
+                </a:stretch>
+              </a:blipFill>
+            </p:spPr>
+            <p:txBody>
+              <a:bodyPr/>
+              <a:lstStyle/>
+              <a:p>
+                <a:r>
+                  <a:rPr lang="en-US">
+                    <a:noFill/>
+                  </a:rPr>
+                  <a:t> </a:t>
+                </a:r>
+              </a:p>
+            </p:txBody>
+          </p:sp>
+        </mc:Fallback>
+      </mc:AlternateContent>
+      <p:grpSp>
+        <p:nvGrpSpPr>
+          <p:cNvPr id="18" name="Group 17">
+            <a:extLst>
+              <a:ext uri="{FF2B5EF4-FFF2-40B4-BE49-F238E27FC236}">
+                <a16:creationId xmlns:a16="http://schemas.microsoft.com/office/drawing/2014/main" id="{4680E8EA-B0D3-4482-B619-824353917FE3}"/>
+              </a:ext>
+            </a:extLst>
+          </p:cNvPr>
+          <p:cNvGrpSpPr/>
+          <p:nvPr/>
+        </p:nvGrpSpPr>
+        <p:grpSpPr>
+          <a:xfrm>
+            <a:off x="4397229" y="2383796"/>
+            <a:ext cx="1610687" cy="1419811"/>
+            <a:chOff x="2000774" y="2902237"/>
+            <a:chExt cx="1023457" cy="902171"/>
+          </a:xfrm>
+        </p:grpSpPr>
+        <p:cxnSp>
+          <p:nvCxnSpPr>
+            <p:cNvPr id="19" name="Straight Arrow Connector 18">
+              <a:extLst>
+                <a:ext uri="{FF2B5EF4-FFF2-40B4-BE49-F238E27FC236}">
+                  <a16:creationId xmlns:a16="http://schemas.microsoft.com/office/drawing/2014/main" id="{F0B1FAD1-D524-493B-8B52-4A67C2977763}"/>
+                </a:ext>
+              </a:extLst>
+            </p:cNvPr>
+            <p:cNvCxnSpPr/>
+            <p:nvPr/>
+          </p:nvCxnSpPr>
+          <p:spPr>
+            <a:xfrm>
+              <a:off x="2000774" y="3326235"/>
+              <a:ext cx="1023457" cy="0"/>
+            </a:xfrm>
+            <a:prstGeom prst="straightConnector1">
+              <a:avLst/>
+            </a:prstGeom>
+            <a:ln w="12700">
+              <a:solidFill>
+                <a:schemeClr val="bg2">
+                  <a:lumMod val="75000"/>
+                </a:schemeClr>
+              </a:solidFill>
+              <a:headEnd type="none" w="med" len="med"/>
+              <a:tailEnd type="triangle" w="med" len="med"/>
+            </a:ln>
+          </p:spPr>
+          <p:style>
+            <a:lnRef idx="1">
+              <a:schemeClr val="dk1"/>
+            </a:lnRef>
+            <a:fillRef idx="0">
+              <a:schemeClr val="dk1"/>
+            </a:fillRef>
+            <a:effectRef idx="0">
+              <a:schemeClr val="dk1"/>
+            </a:effectRef>
+            <a:fontRef idx="minor">
+              <a:schemeClr val="tx1"/>
+            </a:fontRef>
+          </p:style>
+        </p:cxnSp>
+        <p:cxnSp>
+          <p:nvCxnSpPr>
+            <p:cNvPr id="20" name="Straight Arrow Connector 19">
+              <a:extLst>
+                <a:ext uri="{FF2B5EF4-FFF2-40B4-BE49-F238E27FC236}">
+                  <a16:creationId xmlns:a16="http://schemas.microsoft.com/office/drawing/2014/main" id="{A7E2396F-AA0C-4719-A2DF-7CD3313D78CB}"/>
+                </a:ext>
+              </a:extLst>
+            </p:cNvPr>
+            <p:cNvCxnSpPr>
+              <a:cxnSpLocks/>
+            </p:cNvCxnSpPr>
+            <p:nvPr/>
+          </p:nvCxnSpPr>
+          <p:spPr>
+            <a:xfrm flipV="1">
+              <a:off x="2516697" y="2902237"/>
+              <a:ext cx="0" cy="902171"/>
+            </a:xfrm>
+            <a:prstGeom prst="straightConnector1">
+              <a:avLst/>
+            </a:prstGeom>
+            <a:ln w="12700">
+              <a:solidFill>
+                <a:schemeClr val="bg2">
+                  <a:lumMod val="75000"/>
+                </a:schemeClr>
+              </a:solidFill>
+              <a:headEnd type="none" w="med" len="med"/>
+              <a:tailEnd type="triangle" w="med" len="med"/>
+            </a:ln>
+          </p:spPr>
+          <p:style>
+            <a:lnRef idx="1">
+              <a:schemeClr val="dk1"/>
+            </a:lnRef>
+            <a:fillRef idx="0">
+              <a:schemeClr val="dk1"/>
+            </a:fillRef>
+            <a:effectRef idx="0">
+              <a:schemeClr val="dk1"/>
+            </a:effectRef>
+            <a:fontRef idx="minor">
+              <a:schemeClr val="tx1"/>
+            </a:fontRef>
+          </p:style>
+        </p:cxnSp>
+      </p:grpSp>
+      <p:sp>
+        <p:nvSpPr>
+          <p:cNvPr id="21" name="Rectangle 20">
+            <a:extLst>
+              <a:ext uri="{FF2B5EF4-FFF2-40B4-BE49-F238E27FC236}">
+                <a16:creationId xmlns:a16="http://schemas.microsoft.com/office/drawing/2014/main" id="{37A3B228-E29B-4892-A8D9-A73457395274}"/>
+              </a:ext>
+            </a:extLst>
+          </p:cNvPr>
+          <p:cNvSpPr/>
+          <p:nvPr/>
+        </p:nvSpPr>
+        <p:spPr>
+          <a:xfrm>
+            <a:off x="4930928" y="2770046"/>
+            <a:ext cx="563762" cy="562053"/>
+          </a:xfrm>
+          <a:prstGeom prst="rect">
+            <a:avLst/>
+          </a:prstGeom>
+          <a:solidFill>
+            <a:srgbClr val="000000">
+              <a:alpha val="3137"/>
+            </a:srgbClr>
+          </a:solidFill>
+        </p:spPr>
+        <p:style>
+          <a:lnRef idx="2">
+            <a:schemeClr val="dk1"/>
+          </a:lnRef>
+          <a:fillRef idx="1">
+            <a:schemeClr val="lt1"/>
+          </a:fillRef>
+          <a:effectRef idx="0">
+            <a:schemeClr val="dk1"/>
+          </a:effectRef>
+          <a:fontRef idx="minor">
+            <a:schemeClr val="dk1"/>
+          </a:fontRef>
+        </p:style>
+        <p:txBody>
+          <a:bodyPr rtlCol="0" anchor="ctr"/>
+          <a:lstStyle/>
+          <a:p>
+            <a:pPr algn="ctr"/>
+            <a:endParaRPr lang="en-US"/>
+          </a:p>
+        </p:txBody>
+      </p:sp>
+      <mc:AlternateContent xmlns:mc="http://schemas.openxmlformats.org/markup-compatibility/2006">
+        <mc:Choice xmlns:a14="http://schemas.microsoft.com/office/drawing/2010/main" Requires="a14">
+          <p:sp>
+            <p:nvSpPr>
+              <p:cNvPr id="22" name="TextBox 21">
+                <a:extLst>
+                  <a:ext uri="{FF2B5EF4-FFF2-40B4-BE49-F238E27FC236}">
+                    <a16:creationId xmlns:a16="http://schemas.microsoft.com/office/drawing/2014/main" id="{474805F2-3AEC-4A5E-A143-D49F4A7C78FF}"/>
+                  </a:ext>
+                </a:extLst>
+              </p:cNvPr>
+              <p:cNvSpPr txBox="1"/>
+              <p:nvPr/>
+            </p:nvSpPr>
+            <p:spPr>
+              <a:xfrm>
+                <a:off x="5470992" y="2996284"/>
+                <a:ext cx="324128" cy="307777"/>
+              </a:xfrm>
+              <a:prstGeom prst="rect">
+                <a:avLst/>
+              </a:prstGeom>
+              <a:noFill/>
+            </p:spPr>
+            <p:txBody>
+              <a:bodyPr wrap="none" rtlCol="0">
+                <a:spAutoFit/>
+              </a:bodyPr>
+              <a:lstStyle/>
+              <a:p>
+                <a14:m>
+                  <m:oMathPara xmlns:m="http://schemas.openxmlformats.org/officeDocument/2006/math">
+                    <m:oMathParaPr>
+                      <m:jc m:val="centerGroup"/>
+                    </m:oMathParaPr>
+                    <m:oMath xmlns:m="http://schemas.openxmlformats.org/officeDocument/2006/math">
+                      <m:r>
+                        <a:rPr lang="en-US" sz="1400" b="0" i="1" smtClean="0">
+                          <a:latin typeface="Cambria Math" panose="02040503050406030204" pitchFamily="18" charset="0"/>
+                        </a:rPr>
+                        <m:t>1</m:t>
+                      </m:r>
+                    </m:oMath>
+                  </m:oMathPara>
+                </a14:m>
+                <a:endParaRPr lang="en-US" sz="1400" dirty="0"/>
+              </a:p>
+            </p:txBody>
+          </p:sp>
+        </mc:Choice>
+        <mc:Fallback>
+          <p:sp>
+            <p:nvSpPr>
+              <p:cNvPr id="22" name="TextBox 21">
+                <a:extLst>
+                  <a:ext uri="{FF2B5EF4-FFF2-40B4-BE49-F238E27FC236}">
+                    <a16:creationId xmlns:a16="http://schemas.microsoft.com/office/drawing/2014/main" id="{474805F2-3AEC-4A5E-A143-D49F4A7C78FF}"/>
+                  </a:ext>
+                </a:extLst>
+              </p:cNvPr>
+              <p:cNvSpPr txBox="1">
+                <a:spLocks noRot="1" noChangeAspect="1" noMove="1" noResize="1" noEditPoints="1" noAdjustHandles="1" noChangeArrowheads="1" noChangeShapeType="1" noTextEdit="1"/>
+              </p:cNvSpPr>
+              <p:nvPr/>
+            </p:nvSpPr>
+            <p:spPr>
+              <a:xfrm>
+                <a:off x="5470992" y="2996284"/>
+                <a:ext cx="324128" cy="307777"/>
+              </a:xfrm>
+              <a:prstGeom prst="rect">
+                <a:avLst/>
+              </a:prstGeom>
+              <a:blipFill>
+                <a:blip r:embed="rId8"/>
+                <a:stretch>
+                  <a:fillRect/>
+                </a:stretch>
+              </a:blipFill>
+            </p:spPr>
+            <p:txBody>
+              <a:bodyPr/>
+              <a:lstStyle/>
+              <a:p>
+                <a:r>
+                  <a:rPr lang="en-US">
+                    <a:noFill/>
+                  </a:rPr>
+                  <a:t> </a:t>
+                </a:r>
+              </a:p>
+            </p:txBody>
+          </p:sp>
+        </mc:Fallback>
+      </mc:AlternateContent>
+      <mc:AlternateContent xmlns:mc="http://schemas.openxmlformats.org/markup-compatibility/2006">
+        <mc:Choice xmlns:a14="http://schemas.microsoft.com/office/drawing/2010/main" Requires="a14">
+          <p:sp>
+            <p:nvSpPr>
+              <p:cNvPr id="23" name="TextBox 22">
+                <a:extLst>
+                  <a:ext uri="{FF2B5EF4-FFF2-40B4-BE49-F238E27FC236}">
+                    <a16:creationId xmlns:a16="http://schemas.microsoft.com/office/drawing/2014/main" id="{B92AAEA8-B80E-4D5E-80E4-02F49AB04101}"/>
+                  </a:ext>
+                </a:extLst>
+              </p:cNvPr>
+              <p:cNvSpPr txBox="1"/>
+              <p:nvPr/>
+            </p:nvSpPr>
+            <p:spPr>
+              <a:xfrm>
+                <a:off x="4495233" y="2993038"/>
+                <a:ext cx="458780" cy="307777"/>
+              </a:xfrm>
+              <a:prstGeom prst="rect">
+                <a:avLst/>
+              </a:prstGeom>
+              <a:noFill/>
+            </p:spPr>
+            <p:txBody>
+              <a:bodyPr wrap="none" rtlCol="0">
+                <a:spAutoFit/>
+              </a:bodyPr>
+              <a:lstStyle/>
+              <a:p>
+                <a14:m>
+                  <m:oMathPara xmlns:m="http://schemas.openxmlformats.org/officeDocument/2006/math">
+                    <m:oMathParaPr>
+                      <m:jc m:val="centerGroup"/>
+                    </m:oMathParaPr>
+                    <m:oMath xmlns:m="http://schemas.openxmlformats.org/officeDocument/2006/math">
+                      <m:r>
+                        <a:rPr lang="en-US" sz="1400" b="0" i="1" smtClean="0">
+                          <a:latin typeface="Cambria Math" panose="02040503050406030204" pitchFamily="18" charset="0"/>
+                        </a:rPr>
+                        <m:t>−1</m:t>
+                      </m:r>
+                    </m:oMath>
+                  </m:oMathPara>
+                </a14:m>
+                <a:endParaRPr lang="en-US" sz="1400" dirty="0"/>
+              </a:p>
+            </p:txBody>
+          </p:sp>
+        </mc:Choice>
+        <mc:Fallback>
+          <p:sp>
+            <p:nvSpPr>
+              <p:cNvPr id="23" name="TextBox 22">
+                <a:extLst>
+                  <a:ext uri="{FF2B5EF4-FFF2-40B4-BE49-F238E27FC236}">
+                    <a16:creationId xmlns:a16="http://schemas.microsoft.com/office/drawing/2014/main" id="{B92AAEA8-B80E-4D5E-80E4-02F49AB04101}"/>
+                  </a:ext>
+                </a:extLst>
+              </p:cNvPr>
+              <p:cNvSpPr txBox="1">
+                <a:spLocks noRot="1" noChangeAspect="1" noMove="1" noResize="1" noEditPoints="1" noAdjustHandles="1" noChangeArrowheads="1" noChangeShapeType="1" noTextEdit="1"/>
+              </p:cNvSpPr>
+              <p:nvPr/>
+            </p:nvSpPr>
+            <p:spPr>
+              <a:xfrm>
+                <a:off x="4495233" y="2993038"/>
+                <a:ext cx="458780" cy="307777"/>
+              </a:xfrm>
+              <a:prstGeom prst="rect">
+                <a:avLst/>
+              </a:prstGeom>
+              <a:blipFill>
+                <a:blip r:embed="rId9"/>
+                <a:stretch>
+                  <a:fillRect/>
+                </a:stretch>
+              </a:blipFill>
+            </p:spPr>
+            <p:txBody>
+              <a:bodyPr/>
+              <a:lstStyle/>
+              <a:p>
+                <a:r>
+                  <a:rPr lang="en-US">
+                    <a:noFill/>
+                  </a:rPr>
+                  <a:t> </a:t>
+                </a:r>
+              </a:p>
+            </p:txBody>
+          </p:sp>
+        </mc:Fallback>
+      </mc:AlternateContent>
+      <mc:AlternateContent xmlns:mc="http://schemas.openxmlformats.org/markup-compatibility/2006">
+        <mc:Choice xmlns:a14="http://schemas.microsoft.com/office/drawing/2010/main" Requires="a14">
+          <p:sp>
+            <p:nvSpPr>
+              <p:cNvPr id="24" name="TextBox 23">
+                <a:extLst>
+                  <a:ext uri="{FF2B5EF4-FFF2-40B4-BE49-F238E27FC236}">
+                    <a16:creationId xmlns:a16="http://schemas.microsoft.com/office/drawing/2014/main" id="{8D120266-EA88-49A4-A4B3-0EAA627D1C71}"/>
+                  </a:ext>
+                </a:extLst>
+              </p:cNvPr>
+              <p:cNvSpPr txBox="1"/>
+              <p:nvPr/>
+            </p:nvSpPr>
+            <p:spPr>
+              <a:xfrm>
+                <a:off x="5141933" y="2493555"/>
+                <a:ext cx="324127" cy="307777"/>
+              </a:xfrm>
+              <a:prstGeom prst="rect">
+                <a:avLst/>
+              </a:prstGeom>
+              <a:noFill/>
+            </p:spPr>
+            <p:txBody>
+              <a:bodyPr wrap="none" rtlCol="0">
+                <a:spAutoFit/>
+              </a:bodyPr>
+              <a:lstStyle/>
+              <a:p>
+                <a14:m>
+                  <m:oMathPara xmlns:m="http://schemas.openxmlformats.org/officeDocument/2006/math">
+                    <m:oMathParaPr>
+                      <m:jc m:val="centerGroup"/>
+                    </m:oMathParaPr>
+                    <m:oMath xmlns:m="http://schemas.openxmlformats.org/officeDocument/2006/math">
+                      <m:r>
+                        <a:rPr lang="en-US" sz="1400" b="0" i="1" smtClean="0">
+                          <a:latin typeface="Cambria Math" panose="02040503050406030204" pitchFamily="18" charset="0"/>
+                        </a:rPr>
+                        <m:t>1</m:t>
+                      </m:r>
+                    </m:oMath>
+                  </m:oMathPara>
+                </a14:m>
+                <a:endParaRPr lang="en-US" sz="1400" dirty="0"/>
+              </a:p>
+            </p:txBody>
+          </p:sp>
+        </mc:Choice>
+        <mc:Fallback>
+          <p:sp>
+            <p:nvSpPr>
+              <p:cNvPr id="24" name="TextBox 23">
+                <a:extLst>
+                  <a:ext uri="{FF2B5EF4-FFF2-40B4-BE49-F238E27FC236}">
+                    <a16:creationId xmlns:a16="http://schemas.microsoft.com/office/drawing/2014/main" id="{8D120266-EA88-49A4-A4B3-0EAA627D1C71}"/>
+                  </a:ext>
+                </a:extLst>
+              </p:cNvPr>
+              <p:cNvSpPr txBox="1">
+                <a:spLocks noRot="1" noChangeAspect="1" noMove="1" noResize="1" noEditPoints="1" noAdjustHandles="1" noChangeArrowheads="1" noChangeShapeType="1" noTextEdit="1"/>
+              </p:cNvSpPr>
+              <p:nvPr/>
+            </p:nvSpPr>
+            <p:spPr>
+              <a:xfrm>
+                <a:off x="5141933" y="2493555"/>
+                <a:ext cx="324127" cy="307777"/>
+              </a:xfrm>
+              <a:prstGeom prst="rect">
+                <a:avLst/>
+              </a:prstGeom>
+              <a:blipFill>
+                <a:blip r:embed="rId10"/>
+                <a:stretch>
+                  <a:fillRect/>
+                </a:stretch>
+              </a:blipFill>
+            </p:spPr>
+            <p:txBody>
+              <a:bodyPr/>
+              <a:lstStyle/>
+              <a:p>
+                <a:r>
+                  <a:rPr lang="en-US">
+                    <a:noFill/>
+                  </a:rPr>
+                  <a:t> </a:t>
+                </a:r>
+              </a:p>
+            </p:txBody>
+          </p:sp>
+        </mc:Fallback>
+      </mc:AlternateContent>
+      <mc:AlternateContent xmlns:mc="http://schemas.openxmlformats.org/markup-compatibility/2006">
+        <mc:Choice xmlns:a14="http://schemas.microsoft.com/office/drawing/2010/main" Requires="a14">
+          <p:sp>
+            <p:nvSpPr>
+              <p:cNvPr id="25" name="TextBox 24">
+                <a:extLst>
+                  <a:ext uri="{FF2B5EF4-FFF2-40B4-BE49-F238E27FC236}">
+                    <a16:creationId xmlns:a16="http://schemas.microsoft.com/office/drawing/2014/main" id="{CA973CD0-FA5B-442E-9193-50DCDC672A86}"/>
+                  </a:ext>
+                </a:extLst>
+              </p:cNvPr>
+              <p:cNvSpPr txBox="1"/>
+              <p:nvPr/>
+            </p:nvSpPr>
+            <p:spPr>
+              <a:xfrm>
+                <a:off x="5135399" y="3300813"/>
+                <a:ext cx="458780" cy="307777"/>
+              </a:xfrm>
+              <a:prstGeom prst="rect">
+                <a:avLst/>
+              </a:prstGeom>
+              <a:noFill/>
+            </p:spPr>
+            <p:txBody>
+              <a:bodyPr wrap="none" rtlCol="0">
+                <a:spAutoFit/>
+              </a:bodyPr>
+              <a:lstStyle/>
+              <a:p>
+                <a14:m>
+                  <m:oMathPara xmlns:m="http://schemas.openxmlformats.org/officeDocument/2006/math">
+                    <m:oMathParaPr>
+                      <m:jc m:val="centerGroup"/>
+                    </m:oMathParaPr>
+                    <m:oMath xmlns:m="http://schemas.openxmlformats.org/officeDocument/2006/math">
+                      <m:r>
+                        <a:rPr lang="en-US" sz="1400" b="0" i="1" smtClean="0">
+                          <a:latin typeface="Cambria Math" panose="02040503050406030204" pitchFamily="18" charset="0"/>
+                        </a:rPr>
+                        <m:t>−1</m:t>
+                      </m:r>
+                    </m:oMath>
+                  </m:oMathPara>
+                </a14:m>
+                <a:endParaRPr lang="en-US" sz="1400" dirty="0"/>
+              </a:p>
+            </p:txBody>
+          </p:sp>
+        </mc:Choice>
+        <mc:Fallback>
+          <p:sp>
+            <p:nvSpPr>
+              <p:cNvPr id="25" name="TextBox 24">
+                <a:extLst>
+                  <a:ext uri="{FF2B5EF4-FFF2-40B4-BE49-F238E27FC236}">
+                    <a16:creationId xmlns:a16="http://schemas.microsoft.com/office/drawing/2014/main" id="{CA973CD0-FA5B-442E-9193-50DCDC672A86}"/>
+                  </a:ext>
+                </a:extLst>
+              </p:cNvPr>
+              <p:cNvSpPr txBox="1">
+                <a:spLocks noRot="1" noChangeAspect="1" noMove="1" noResize="1" noEditPoints="1" noAdjustHandles="1" noChangeArrowheads="1" noChangeShapeType="1" noTextEdit="1"/>
+              </p:cNvSpPr>
+              <p:nvPr/>
+            </p:nvSpPr>
+            <p:spPr>
+              <a:xfrm>
+                <a:off x="5135399" y="3300813"/>
+                <a:ext cx="458780" cy="307777"/>
+              </a:xfrm>
+              <a:prstGeom prst="rect">
+                <a:avLst/>
+              </a:prstGeom>
+              <a:blipFill>
+                <a:blip r:embed="rId11"/>
+                <a:stretch>
+                  <a:fillRect/>
+                </a:stretch>
+              </a:blipFill>
+            </p:spPr>
+            <p:txBody>
+              <a:bodyPr/>
+              <a:lstStyle/>
+              <a:p>
+                <a:r>
+                  <a:rPr lang="en-US">
+                    <a:noFill/>
+                  </a:rPr>
+                  <a:t> </a:t>
+                </a:r>
+              </a:p>
+            </p:txBody>
+          </p:sp>
+        </mc:Fallback>
+      </mc:AlternateContent>
+      <mc:AlternateContent xmlns:mc="http://schemas.openxmlformats.org/markup-compatibility/2006">
+        <mc:Choice xmlns:a14="http://schemas.microsoft.com/office/drawing/2010/main" Requires="a14">
+          <p:sp>
+            <p:nvSpPr>
+              <p:cNvPr id="26" name="TextBox 25">
+                <a:extLst>
+                  <a:ext uri="{FF2B5EF4-FFF2-40B4-BE49-F238E27FC236}">
+                    <a16:creationId xmlns:a16="http://schemas.microsoft.com/office/drawing/2014/main" id="{13AACC8F-1DF5-4330-A428-5B47D51C038C}"/>
+                  </a:ext>
+                </a:extLst>
+              </p:cNvPr>
+              <p:cNvSpPr txBox="1"/>
+              <p:nvPr/>
+            </p:nvSpPr>
+            <p:spPr>
+              <a:xfrm>
+                <a:off x="5953468" y="2897183"/>
+                <a:ext cx="328936" cy="307777"/>
+              </a:xfrm>
+              <a:prstGeom prst="rect">
+                <a:avLst/>
+              </a:prstGeom>
+              <a:noFill/>
+            </p:spPr>
+            <p:txBody>
+              <a:bodyPr wrap="none" rtlCol="0">
+                <a:spAutoFit/>
+              </a:bodyPr>
+              <a:lstStyle/>
+              <a:p>
+                <a14:m>
+                  <m:oMathPara xmlns:m="http://schemas.openxmlformats.org/officeDocument/2006/math">
+                    <m:oMathParaPr>
+                      <m:jc m:val="centerGroup"/>
+                    </m:oMathParaPr>
+                    <m:oMath xmlns:m="http://schemas.openxmlformats.org/officeDocument/2006/math">
+                      <m:r>
+                        <a:rPr lang="en-US" sz="1400" b="1" i="1" smtClean="0">
+                          <a:latin typeface="Cambria Math" panose="02040503050406030204" pitchFamily="18" charset="0"/>
+                        </a:rPr>
+                        <m:t>𝒙</m:t>
+                      </m:r>
+                    </m:oMath>
+                  </m:oMathPara>
+                </a14:m>
+                <a:endParaRPr lang="en-US" sz="1400" b="1" dirty="0"/>
+              </a:p>
+            </p:txBody>
+          </p:sp>
+        </mc:Choice>
+        <mc:Fallback>
+          <p:sp>
+            <p:nvSpPr>
+              <p:cNvPr id="26" name="TextBox 25">
+                <a:extLst>
+                  <a:ext uri="{FF2B5EF4-FFF2-40B4-BE49-F238E27FC236}">
+                    <a16:creationId xmlns:a16="http://schemas.microsoft.com/office/drawing/2014/main" id="{13AACC8F-1DF5-4330-A428-5B47D51C038C}"/>
+                  </a:ext>
+                </a:extLst>
+              </p:cNvPr>
+              <p:cNvSpPr txBox="1">
+                <a:spLocks noRot="1" noChangeAspect="1" noMove="1" noResize="1" noEditPoints="1" noAdjustHandles="1" noChangeArrowheads="1" noChangeShapeType="1" noTextEdit="1"/>
+              </p:cNvSpPr>
+              <p:nvPr/>
+            </p:nvSpPr>
+            <p:spPr>
+              <a:xfrm>
+                <a:off x="5953468" y="2897183"/>
+                <a:ext cx="328936" cy="307777"/>
+              </a:xfrm>
+              <a:prstGeom prst="rect">
+                <a:avLst/>
+              </a:prstGeom>
+              <a:blipFill>
+                <a:blip r:embed="rId6"/>
+                <a:stretch>
+                  <a:fillRect/>
+                </a:stretch>
+              </a:blipFill>
+            </p:spPr>
+            <p:txBody>
+              <a:bodyPr/>
+              <a:lstStyle/>
+              <a:p>
+                <a:r>
+                  <a:rPr lang="en-US">
+                    <a:noFill/>
+                  </a:rPr>
+                  <a:t> </a:t>
+                </a:r>
+              </a:p>
+            </p:txBody>
+          </p:sp>
+        </mc:Fallback>
+      </mc:AlternateContent>
+      <mc:AlternateContent xmlns:mc="http://schemas.openxmlformats.org/markup-compatibility/2006">
+        <mc:Choice xmlns:a14="http://schemas.microsoft.com/office/drawing/2010/main" Requires="a14">
+          <p:sp>
+            <p:nvSpPr>
+              <p:cNvPr id="27" name="TextBox 26">
+                <a:extLst>
+                  <a:ext uri="{FF2B5EF4-FFF2-40B4-BE49-F238E27FC236}">
+                    <a16:creationId xmlns:a16="http://schemas.microsoft.com/office/drawing/2014/main" id="{A695C4C1-F055-4A05-A015-54F9D5727A5C}"/>
+                  </a:ext>
+                </a:extLst>
+              </p:cNvPr>
+              <p:cNvSpPr txBox="1"/>
+              <p:nvPr/>
+            </p:nvSpPr>
+            <p:spPr>
+              <a:xfrm>
+                <a:off x="5046724" y="2069992"/>
+                <a:ext cx="332142" cy="307777"/>
+              </a:xfrm>
+              <a:prstGeom prst="rect">
+                <a:avLst/>
+              </a:prstGeom>
+              <a:noFill/>
+            </p:spPr>
+            <p:txBody>
+              <a:bodyPr wrap="none" rtlCol="0">
+                <a:spAutoFit/>
+              </a:bodyPr>
+              <a:lstStyle/>
+              <a:p>
+                <a14:m>
+                  <m:oMathPara xmlns:m="http://schemas.openxmlformats.org/officeDocument/2006/math">
+                    <m:oMathParaPr>
+                      <m:jc m:val="centerGroup"/>
+                    </m:oMathParaPr>
+                    <m:oMath xmlns:m="http://schemas.openxmlformats.org/officeDocument/2006/math">
+                      <m:r>
+                        <a:rPr lang="en-US" sz="1400" b="1" i="1" smtClean="0">
+                          <a:latin typeface="Cambria Math" panose="02040503050406030204" pitchFamily="18" charset="0"/>
+                        </a:rPr>
+                        <m:t>𝒚</m:t>
+                      </m:r>
+                    </m:oMath>
+                  </m:oMathPara>
+                </a14:m>
+                <a:endParaRPr lang="en-US" sz="1400" b="1" dirty="0"/>
+              </a:p>
+            </p:txBody>
+          </p:sp>
+        </mc:Choice>
+        <mc:Fallback>
+          <p:sp>
+            <p:nvSpPr>
+              <p:cNvPr id="27" name="TextBox 26">
+                <a:extLst>
+                  <a:ext uri="{FF2B5EF4-FFF2-40B4-BE49-F238E27FC236}">
+                    <a16:creationId xmlns:a16="http://schemas.microsoft.com/office/drawing/2014/main" id="{A695C4C1-F055-4A05-A015-54F9D5727A5C}"/>
+                  </a:ext>
+                </a:extLst>
+              </p:cNvPr>
+              <p:cNvSpPr txBox="1">
+                <a:spLocks noRot="1" noChangeAspect="1" noMove="1" noResize="1" noEditPoints="1" noAdjustHandles="1" noChangeArrowheads="1" noChangeShapeType="1" noTextEdit="1"/>
+              </p:cNvSpPr>
+              <p:nvPr/>
+            </p:nvSpPr>
+            <p:spPr>
+              <a:xfrm>
+                <a:off x="5046724" y="2069992"/>
+                <a:ext cx="332142" cy="307777"/>
+              </a:xfrm>
+              <a:prstGeom prst="rect">
+                <a:avLst/>
+              </a:prstGeom>
+              <a:blipFill>
+                <a:blip r:embed="rId12"/>
+                <a:stretch>
+                  <a:fillRect b="-2000"/>
+                </a:stretch>
+              </a:blipFill>
+            </p:spPr>
+            <p:txBody>
+              <a:bodyPr/>
+              <a:lstStyle/>
+              <a:p>
+                <a:r>
+                  <a:rPr lang="en-US">
+                    <a:noFill/>
+                  </a:rPr>
+                  <a:t> </a:t>
+                </a:r>
+              </a:p>
+            </p:txBody>
+          </p:sp>
+        </mc:Fallback>
+      </mc:AlternateContent>
+      <mc:AlternateContent xmlns:mc="http://schemas.openxmlformats.org/markup-compatibility/2006">
+        <mc:Choice xmlns:a14="http://schemas.microsoft.com/office/drawing/2010/main" Requires="a14">
+          <p:sp>
+            <p:nvSpPr>
+              <p:cNvPr id="28" name="TextBox 27">
+                <a:extLst>
+                  <a:ext uri="{FF2B5EF4-FFF2-40B4-BE49-F238E27FC236}">
+                    <a16:creationId xmlns:a16="http://schemas.microsoft.com/office/drawing/2014/main" id="{FEE9A6C6-76A1-42FB-88A0-65E8D7418901}"/>
+                  </a:ext>
+                </a:extLst>
+              </p:cNvPr>
+              <p:cNvSpPr txBox="1"/>
+              <p:nvPr/>
+            </p:nvSpPr>
+            <p:spPr>
+              <a:xfrm>
+                <a:off x="3855428" y="2825286"/>
+                <a:ext cx="380232" cy="461665"/>
+              </a:xfrm>
+              <a:prstGeom prst="rect">
+                <a:avLst/>
+              </a:prstGeom>
+              <a:noFill/>
+            </p:spPr>
+            <p:txBody>
+              <a:bodyPr wrap="square" rtlCol="0">
+                <a:spAutoFit/>
+              </a:bodyPr>
+              <a:lstStyle/>
+              <a:p>
+                <a14:m>
+                  <m:oMathPara xmlns:m="http://schemas.openxmlformats.org/officeDocument/2006/math">
+                    <m:oMathParaPr>
+                      <m:jc m:val="centerGroup"/>
+                    </m:oMathParaPr>
+                    <m:oMath xmlns:m="http://schemas.openxmlformats.org/officeDocument/2006/math">
+                      <m:r>
+                        <a:rPr lang="en-US" sz="2400" b="0" i="0" smtClean="0">
+                          <a:solidFill>
+                            <a:schemeClr val="bg2">
+                              <a:lumMod val="50000"/>
+                            </a:schemeClr>
+                          </a:solidFill>
+                          <a:latin typeface="Cambria Math" panose="02040503050406030204" pitchFamily="18" charset="0"/>
+                        </a:rPr>
+                        <m:t>⇒</m:t>
+                      </m:r>
+                    </m:oMath>
+                  </m:oMathPara>
+                </a14:m>
+                <a:endParaRPr lang="en-US" sz="2400" dirty="0">
+                  <a:solidFill>
+                    <a:schemeClr val="bg2">
+                      <a:lumMod val="50000"/>
+                    </a:schemeClr>
+                  </a:solidFill>
+                </a:endParaRPr>
+              </a:p>
+            </p:txBody>
+          </p:sp>
+        </mc:Choice>
+        <mc:Fallback>
+          <p:sp>
+            <p:nvSpPr>
+              <p:cNvPr id="28" name="TextBox 27">
+                <a:extLst>
+                  <a:ext uri="{FF2B5EF4-FFF2-40B4-BE49-F238E27FC236}">
+                    <a16:creationId xmlns:a16="http://schemas.microsoft.com/office/drawing/2014/main" id="{FEE9A6C6-76A1-42FB-88A0-65E8D7418901}"/>
+                  </a:ext>
+                </a:extLst>
+              </p:cNvPr>
+              <p:cNvSpPr txBox="1">
+                <a:spLocks noRot="1" noChangeAspect="1" noMove="1" noResize="1" noEditPoints="1" noAdjustHandles="1" noChangeArrowheads="1" noChangeShapeType="1" noTextEdit="1"/>
+              </p:cNvSpPr>
+              <p:nvPr/>
+            </p:nvSpPr>
+            <p:spPr>
+              <a:xfrm>
+                <a:off x="3855428" y="2825286"/>
+                <a:ext cx="380232" cy="461665"/>
+              </a:xfrm>
+              <a:prstGeom prst="rect">
+                <a:avLst/>
+              </a:prstGeom>
+              <a:blipFill>
+                <a:blip r:embed="rId13"/>
+                <a:stretch>
+                  <a:fillRect r="-14286"/>
+                </a:stretch>
+              </a:blipFill>
+            </p:spPr>
+            <p:txBody>
+              <a:bodyPr/>
+              <a:lstStyle/>
+              <a:p>
+                <a:r>
+                  <a:rPr lang="en-US">
+                    <a:noFill/>
+                  </a:rPr>
+                  <a:t> </a:t>
+                </a:r>
+              </a:p>
+            </p:txBody>
+          </p:sp>
+        </mc:Fallback>
+      </mc:AlternateContent>
+      <p:grpSp>
+        <p:nvGrpSpPr>
+          <p:cNvPr id="29" name="Group 28">
+            <a:extLst>
+              <a:ext uri="{FF2B5EF4-FFF2-40B4-BE49-F238E27FC236}">
+                <a16:creationId xmlns:a16="http://schemas.microsoft.com/office/drawing/2014/main" id="{C0E3BFC0-3962-42B5-890E-9A9B10439D51}"/>
+              </a:ext>
+            </a:extLst>
+          </p:cNvPr>
+          <p:cNvGrpSpPr/>
+          <p:nvPr/>
+        </p:nvGrpSpPr>
+        <p:grpSpPr>
+          <a:xfrm>
+            <a:off x="6870280" y="2395065"/>
+            <a:ext cx="1174762" cy="1082182"/>
+            <a:chOff x="2007269" y="2952036"/>
+            <a:chExt cx="746463" cy="687636"/>
+          </a:xfrm>
+        </p:grpSpPr>
+        <p:cxnSp>
+          <p:nvCxnSpPr>
+            <p:cNvPr id="30" name="Straight Arrow Connector 29">
+              <a:extLst>
+                <a:ext uri="{FF2B5EF4-FFF2-40B4-BE49-F238E27FC236}">
+                  <a16:creationId xmlns:a16="http://schemas.microsoft.com/office/drawing/2014/main" id="{A6CF9964-FE01-4724-A7C8-69DAE7234729}"/>
+                </a:ext>
+              </a:extLst>
+            </p:cNvPr>
+            <p:cNvCxnSpPr>
+              <a:cxnSpLocks/>
+            </p:cNvCxnSpPr>
+            <p:nvPr/>
+          </p:nvCxnSpPr>
+          <p:spPr>
+            <a:xfrm>
+              <a:off x="2007269" y="3508532"/>
+              <a:ext cx="746463" cy="0"/>
+            </a:xfrm>
+            <a:prstGeom prst="straightConnector1">
+              <a:avLst/>
+            </a:prstGeom>
+            <a:ln w="12700">
+              <a:solidFill>
+                <a:schemeClr val="bg2">
+                  <a:lumMod val="75000"/>
+                </a:schemeClr>
+              </a:solidFill>
+              <a:headEnd type="none" w="med" len="med"/>
+              <a:tailEnd type="triangle" w="med" len="med"/>
+            </a:ln>
+          </p:spPr>
+          <p:style>
+            <a:lnRef idx="1">
+              <a:schemeClr val="dk1"/>
+            </a:lnRef>
+            <a:fillRef idx="0">
+              <a:schemeClr val="dk1"/>
+            </a:fillRef>
+            <a:effectRef idx="0">
+              <a:schemeClr val="dk1"/>
+            </a:effectRef>
+            <a:fontRef idx="minor">
+              <a:schemeClr val="tx1"/>
+            </a:fontRef>
+          </p:style>
+        </p:cxnSp>
+        <p:cxnSp>
+          <p:nvCxnSpPr>
+            <p:cNvPr id="31" name="Straight Arrow Connector 30">
+              <a:extLst>
+                <a:ext uri="{FF2B5EF4-FFF2-40B4-BE49-F238E27FC236}">
+                  <a16:creationId xmlns:a16="http://schemas.microsoft.com/office/drawing/2014/main" id="{D87F0FB3-F98F-47AE-ABD4-10ECEB1AF887}"/>
+                </a:ext>
+              </a:extLst>
+            </p:cNvPr>
+            <p:cNvCxnSpPr>
+              <a:cxnSpLocks/>
+            </p:cNvCxnSpPr>
+            <p:nvPr/>
+          </p:nvCxnSpPr>
+          <p:spPr>
+            <a:xfrm flipV="1">
+              <a:off x="2122240" y="2952036"/>
+              <a:ext cx="0" cy="687636"/>
+            </a:xfrm>
+            <a:prstGeom prst="straightConnector1">
+              <a:avLst/>
+            </a:prstGeom>
+            <a:ln w="12700">
+              <a:solidFill>
+                <a:schemeClr val="bg2">
+                  <a:lumMod val="75000"/>
+                </a:schemeClr>
+              </a:solidFill>
+              <a:headEnd type="none" w="med" len="med"/>
+              <a:tailEnd type="triangle" w="med" len="med"/>
+            </a:ln>
+          </p:spPr>
+          <p:style>
+            <a:lnRef idx="1">
+              <a:schemeClr val="dk1"/>
+            </a:lnRef>
+            <a:fillRef idx="0">
+              <a:schemeClr val="dk1"/>
+            </a:fillRef>
+            <a:effectRef idx="0">
+              <a:schemeClr val="dk1"/>
+            </a:effectRef>
+            <a:fontRef idx="minor">
+              <a:schemeClr val="tx1"/>
+            </a:fontRef>
+          </p:style>
+        </p:cxnSp>
+      </p:grpSp>
+      <p:sp>
+        <p:nvSpPr>
+          <p:cNvPr id="32" name="Rectangle 31">
+            <a:extLst>
+              <a:ext uri="{FF2B5EF4-FFF2-40B4-BE49-F238E27FC236}">
+                <a16:creationId xmlns:a16="http://schemas.microsoft.com/office/drawing/2014/main" id="{E0A3B280-5879-40BB-A812-22B436BE3BEB}"/>
+              </a:ext>
+            </a:extLst>
+          </p:cNvPr>
+          <p:cNvSpPr/>
+          <p:nvPr/>
+        </p:nvSpPr>
+        <p:spPr>
+          <a:xfrm>
+            <a:off x="7051218" y="2702939"/>
+            <a:ext cx="563762" cy="562053"/>
+          </a:xfrm>
+          <a:prstGeom prst="rect">
+            <a:avLst/>
+          </a:prstGeom>
+          <a:solidFill>
+            <a:srgbClr val="000000">
+              <a:alpha val="3137"/>
+            </a:srgbClr>
+          </a:solidFill>
+        </p:spPr>
+        <p:style>
+          <a:lnRef idx="2">
+            <a:schemeClr val="dk1"/>
+          </a:lnRef>
+          <a:fillRef idx="1">
+            <a:schemeClr val="lt1"/>
+          </a:fillRef>
+          <a:effectRef idx="0">
+            <a:schemeClr val="dk1"/>
+          </a:effectRef>
+          <a:fontRef idx="minor">
+            <a:schemeClr val="dk1"/>
+          </a:fontRef>
+        </p:style>
+        <p:txBody>
+          <a:bodyPr rtlCol="0" anchor="ctr"/>
+          <a:lstStyle/>
+          <a:p>
+            <a:pPr algn="ctr"/>
+            <a:endParaRPr lang="en-US"/>
+          </a:p>
+        </p:txBody>
+      </p:sp>
+      <mc:AlternateContent xmlns:mc="http://schemas.openxmlformats.org/markup-compatibility/2006">
+        <mc:Choice xmlns:a14="http://schemas.microsoft.com/office/drawing/2010/main" Requires="a14">
+          <p:sp>
+            <p:nvSpPr>
+              <p:cNvPr id="33" name="TextBox 32">
+                <a:extLst>
+                  <a:ext uri="{FF2B5EF4-FFF2-40B4-BE49-F238E27FC236}">
+                    <a16:creationId xmlns:a16="http://schemas.microsoft.com/office/drawing/2014/main" id="{E33E43D4-CC1C-4C0D-9E1C-F19F2C79A5A3}"/>
+                  </a:ext>
+                </a:extLst>
+              </p:cNvPr>
+              <p:cNvSpPr txBox="1"/>
+              <p:nvPr/>
+            </p:nvSpPr>
+            <p:spPr>
+              <a:xfrm>
+                <a:off x="7444305" y="3282385"/>
+                <a:ext cx="324128" cy="307777"/>
+              </a:xfrm>
+              <a:prstGeom prst="rect">
+                <a:avLst/>
+              </a:prstGeom>
+              <a:noFill/>
+            </p:spPr>
+            <p:txBody>
+              <a:bodyPr wrap="none" rtlCol="0">
+                <a:spAutoFit/>
+              </a:bodyPr>
+              <a:lstStyle/>
+              <a:p>
+                <a14:m>
+                  <m:oMathPara xmlns:m="http://schemas.openxmlformats.org/officeDocument/2006/math">
+                    <m:oMathParaPr>
+                      <m:jc m:val="centerGroup"/>
+                    </m:oMathParaPr>
+                    <m:oMath xmlns:m="http://schemas.openxmlformats.org/officeDocument/2006/math">
+                      <m:r>
+                        <a:rPr lang="en-US" sz="1400" b="0" i="1" smtClean="0">
+                          <a:latin typeface="Cambria Math" panose="02040503050406030204" pitchFamily="18" charset="0"/>
+                        </a:rPr>
+                        <m:t>1</m:t>
+                      </m:r>
+                    </m:oMath>
+                  </m:oMathPara>
+                </a14:m>
+                <a:endParaRPr lang="en-US" sz="1400" dirty="0"/>
+              </a:p>
+            </p:txBody>
+          </p:sp>
+        </mc:Choice>
+        <mc:Fallback>
+          <p:sp>
+            <p:nvSpPr>
+              <p:cNvPr id="33" name="TextBox 32">
+                <a:extLst>
+                  <a:ext uri="{FF2B5EF4-FFF2-40B4-BE49-F238E27FC236}">
+                    <a16:creationId xmlns:a16="http://schemas.microsoft.com/office/drawing/2014/main" id="{E33E43D4-CC1C-4C0D-9E1C-F19F2C79A5A3}"/>
+                  </a:ext>
+                </a:extLst>
+              </p:cNvPr>
+              <p:cNvSpPr txBox="1">
+                <a:spLocks noRot="1" noChangeAspect="1" noMove="1" noResize="1" noEditPoints="1" noAdjustHandles="1" noChangeArrowheads="1" noChangeShapeType="1" noTextEdit="1"/>
+              </p:cNvSpPr>
+              <p:nvPr/>
+            </p:nvSpPr>
+            <p:spPr>
+              <a:xfrm>
+                <a:off x="7444305" y="3282385"/>
+                <a:ext cx="324128" cy="307777"/>
+              </a:xfrm>
+              <a:prstGeom prst="rect">
+                <a:avLst/>
+              </a:prstGeom>
+              <a:blipFill>
+                <a:blip r:embed="rId14"/>
+                <a:stretch>
+                  <a:fillRect/>
+                </a:stretch>
+              </a:blipFill>
+            </p:spPr>
+            <p:txBody>
+              <a:bodyPr/>
+              <a:lstStyle/>
+              <a:p>
+                <a:r>
+                  <a:rPr lang="en-US">
+                    <a:noFill/>
+                  </a:rPr>
+                  <a:t> </a:t>
+                </a:r>
+              </a:p>
+            </p:txBody>
+          </p:sp>
+        </mc:Fallback>
+      </mc:AlternateContent>
+      <mc:AlternateContent xmlns:mc="http://schemas.openxmlformats.org/markup-compatibility/2006">
+        <mc:Choice xmlns:a14="http://schemas.microsoft.com/office/drawing/2010/main" Requires="a14">
+          <p:sp>
+            <p:nvSpPr>
+              <p:cNvPr id="35" name="TextBox 34">
+                <a:extLst>
+                  <a:ext uri="{FF2B5EF4-FFF2-40B4-BE49-F238E27FC236}">
+                    <a16:creationId xmlns:a16="http://schemas.microsoft.com/office/drawing/2014/main" id="{BF8E12AD-3F58-4DB6-AF05-0B286C35ED8D}"/>
+                  </a:ext>
+                </a:extLst>
+              </p:cNvPr>
+              <p:cNvSpPr txBox="1"/>
+              <p:nvPr/>
+            </p:nvSpPr>
+            <p:spPr>
+              <a:xfrm>
+                <a:off x="6781183" y="2562407"/>
+                <a:ext cx="276695" cy="307777"/>
+              </a:xfrm>
+              <a:prstGeom prst="rect">
+                <a:avLst/>
+              </a:prstGeom>
+              <a:noFill/>
+            </p:spPr>
+            <p:txBody>
+              <a:bodyPr wrap="square" rtlCol="0">
+                <a:spAutoFit/>
+              </a:bodyPr>
+              <a:lstStyle/>
+              <a:p>
+                <a14:m>
+                  <m:oMathPara xmlns:m="http://schemas.openxmlformats.org/officeDocument/2006/math">
+                    <m:oMathParaPr>
+                      <m:jc m:val="centerGroup"/>
+                    </m:oMathParaPr>
+                    <m:oMath xmlns:m="http://schemas.openxmlformats.org/officeDocument/2006/math">
+                      <m:r>
+                        <a:rPr lang="en-US" sz="1400" b="0" i="1" smtClean="0">
+                          <a:latin typeface="Cambria Math" panose="02040503050406030204" pitchFamily="18" charset="0"/>
+                        </a:rPr>
+                        <m:t>1</m:t>
+                      </m:r>
+                    </m:oMath>
+                  </m:oMathPara>
+                </a14:m>
+                <a:endParaRPr lang="en-US" sz="1400" dirty="0"/>
+              </a:p>
+            </p:txBody>
+          </p:sp>
+        </mc:Choice>
+        <mc:Fallback>
+          <p:sp>
+            <p:nvSpPr>
+              <p:cNvPr id="35" name="TextBox 34">
+                <a:extLst>
+                  <a:ext uri="{FF2B5EF4-FFF2-40B4-BE49-F238E27FC236}">
+                    <a16:creationId xmlns:a16="http://schemas.microsoft.com/office/drawing/2014/main" id="{BF8E12AD-3F58-4DB6-AF05-0B286C35ED8D}"/>
+                  </a:ext>
+                </a:extLst>
+              </p:cNvPr>
+              <p:cNvSpPr txBox="1">
+                <a:spLocks noRot="1" noChangeAspect="1" noMove="1" noResize="1" noEditPoints="1" noAdjustHandles="1" noChangeArrowheads="1" noChangeShapeType="1" noTextEdit="1"/>
+              </p:cNvSpPr>
+              <p:nvPr/>
+            </p:nvSpPr>
+            <p:spPr>
+              <a:xfrm>
+                <a:off x="6781183" y="2562407"/>
+                <a:ext cx="276695" cy="307777"/>
+              </a:xfrm>
+              <a:prstGeom prst="rect">
+                <a:avLst/>
+              </a:prstGeom>
+              <a:blipFill>
+                <a:blip r:embed="rId15"/>
+                <a:stretch>
+                  <a:fillRect/>
+                </a:stretch>
+              </a:blipFill>
+            </p:spPr>
+            <p:txBody>
+              <a:bodyPr/>
+              <a:lstStyle/>
+              <a:p>
+                <a:r>
+                  <a:rPr lang="en-US">
+                    <a:noFill/>
+                  </a:rPr>
+                  <a:t> </a:t>
+                </a:r>
+              </a:p>
+            </p:txBody>
+          </p:sp>
+        </mc:Fallback>
+      </mc:AlternateContent>
+      <mc:AlternateContent xmlns:mc="http://schemas.openxmlformats.org/markup-compatibility/2006">
+        <mc:Choice xmlns:a14="http://schemas.microsoft.com/office/drawing/2010/main" Requires="a14">
+          <p:sp>
+            <p:nvSpPr>
+              <p:cNvPr id="37" name="TextBox 36">
+                <a:extLst>
+                  <a:ext uri="{FF2B5EF4-FFF2-40B4-BE49-F238E27FC236}">
+                    <a16:creationId xmlns:a16="http://schemas.microsoft.com/office/drawing/2014/main" id="{4E0233FB-5B5F-4827-81EA-EB11C5B99FF3}"/>
+                  </a:ext>
+                </a:extLst>
+              </p:cNvPr>
+              <p:cNvSpPr txBox="1"/>
+              <p:nvPr/>
+            </p:nvSpPr>
+            <p:spPr>
+              <a:xfrm>
+                <a:off x="7978381" y="3121080"/>
+                <a:ext cx="328936" cy="307777"/>
+              </a:xfrm>
+              <a:prstGeom prst="rect">
+                <a:avLst/>
+              </a:prstGeom>
+              <a:noFill/>
+            </p:spPr>
+            <p:txBody>
+              <a:bodyPr wrap="none" rtlCol="0">
+                <a:spAutoFit/>
+              </a:bodyPr>
+              <a:lstStyle/>
+              <a:p>
+                <a14:m>
+                  <m:oMathPara xmlns:m="http://schemas.openxmlformats.org/officeDocument/2006/math">
+                    <m:oMathParaPr>
+                      <m:jc m:val="centerGroup"/>
+                    </m:oMathParaPr>
+                    <m:oMath xmlns:m="http://schemas.openxmlformats.org/officeDocument/2006/math">
+                      <m:r>
+                        <a:rPr lang="en-US" sz="1400" b="1" i="1" smtClean="0">
+                          <a:latin typeface="Cambria Math" panose="02040503050406030204" pitchFamily="18" charset="0"/>
+                        </a:rPr>
+                        <m:t>𝒙</m:t>
+                      </m:r>
+                    </m:oMath>
+                  </m:oMathPara>
+                </a14:m>
+                <a:endParaRPr lang="en-US" sz="1400" b="1" dirty="0"/>
+              </a:p>
+            </p:txBody>
+          </p:sp>
+        </mc:Choice>
+        <mc:Fallback>
+          <p:sp>
+            <p:nvSpPr>
+              <p:cNvPr id="37" name="TextBox 36">
+                <a:extLst>
+                  <a:ext uri="{FF2B5EF4-FFF2-40B4-BE49-F238E27FC236}">
+                    <a16:creationId xmlns:a16="http://schemas.microsoft.com/office/drawing/2014/main" id="{4E0233FB-5B5F-4827-81EA-EB11C5B99FF3}"/>
+                  </a:ext>
+                </a:extLst>
+              </p:cNvPr>
+              <p:cNvSpPr txBox="1">
+                <a:spLocks noRot="1" noChangeAspect="1" noMove="1" noResize="1" noEditPoints="1" noAdjustHandles="1" noChangeArrowheads="1" noChangeShapeType="1" noTextEdit="1"/>
+              </p:cNvSpPr>
+              <p:nvPr/>
+            </p:nvSpPr>
+            <p:spPr>
+              <a:xfrm>
+                <a:off x="7978381" y="3121080"/>
+                <a:ext cx="328936" cy="307777"/>
+              </a:xfrm>
+              <a:prstGeom prst="rect">
+                <a:avLst/>
+              </a:prstGeom>
+              <a:blipFill>
+                <a:blip r:embed="rId16"/>
+                <a:stretch>
+                  <a:fillRect/>
+                </a:stretch>
+              </a:blipFill>
+            </p:spPr>
+            <p:txBody>
+              <a:bodyPr/>
+              <a:lstStyle/>
+              <a:p>
+                <a:r>
+                  <a:rPr lang="en-US">
+                    <a:noFill/>
+                  </a:rPr>
+                  <a:t> </a:t>
+                </a:r>
+              </a:p>
+            </p:txBody>
+          </p:sp>
+        </mc:Fallback>
+      </mc:AlternateContent>
+      <mc:AlternateContent xmlns:mc="http://schemas.openxmlformats.org/markup-compatibility/2006">
+        <mc:Choice xmlns:a14="http://schemas.microsoft.com/office/drawing/2010/main" Requires="a14">
+          <p:sp>
+            <p:nvSpPr>
+              <p:cNvPr id="38" name="TextBox 37">
+                <a:extLst>
+                  <a:ext uri="{FF2B5EF4-FFF2-40B4-BE49-F238E27FC236}">
+                    <a16:creationId xmlns:a16="http://schemas.microsoft.com/office/drawing/2014/main" id="{547EB363-C0B9-47B8-89CD-D83E1E06032B}"/>
+                  </a:ext>
+                </a:extLst>
+              </p:cNvPr>
+              <p:cNvSpPr txBox="1"/>
+              <p:nvPr/>
+            </p:nvSpPr>
+            <p:spPr>
+              <a:xfrm>
+                <a:off x="6891807" y="2069992"/>
+                <a:ext cx="332142" cy="307777"/>
+              </a:xfrm>
+              <a:prstGeom prst="rect">
+                <a:avLst/>
+              </a:prstGeom>
+              <a:noFill/>
+            </p:spPr>
+            <p:txBody>
+              <a:bodyPr wrap="none" rtlCol="0">
+                <a:spAutoFit/>
+              </a:bodyPr>
+              <a:lstStyle/>
+              <a:p>
+                <a14:m>
+                  <m:oMathPara xmlns:m="http://schemas.openxmlformats.org/officeDocument/2006/math">
+                    <m:oMathParaPr>
+                      <m:jc m:val="centerGroup"/>
+                    </m:oMathParaPr>
+                    <m:oMath xmlns:m="http://schemas.openxmlformats.org/officeDocument/2006/math">
+                      <m:r>
+                        <a:rPr lang="en-US" sz="1400" b="1" i="1" smtClean="0">
+                          <a:latin typeface="Cambria Math" panose="02040503050406030204" pitchFamily="18" charset="0"/>
+                        </a:rPr>
+                        <m:t>𝒚</m:t>
+                      </m:r>
+                    </m:oMath>
+                  </m:oMathPara>
+                </a14:m>
+                <a:endParaRPr lang="en-US" sz="1400" b="1" dirty="0"/>
+              </a:p>
+            </p:txBody>
+          </p:sp>
+        </mc:Choice>
+        <mc:Fallback>
+          <p:sp>
+            <p:nvSpPr>
+              <p:cNvPr id="38" name="TextBox 37">
+                <a:extLst>
+                  <a:ext uri="{FF2B5EF4-FFF2-40B4-BE49-F238E27FC236}">
+                    <a16:creationId xmlns:a16="http://schemas.microsoft.com/office/drawing/2014/main" id="{547EB363-C0B9-47B8-89CD-D83E1E06032B}"/>
+                  </a:ext>
+                </a:extLst>
+              </p:cNvPr>
+              <p:cNvSpPr txBox="1">
+                <a:spLocks noRot="1" noChangeAspect="1" noMove="1" noResize="1" noEditPoints="1" noAdjustHandles="1" noChangeArrowheads="1" noChangeShapeType="1" noTextEdit="1"/>
+              </p:cNvSpPr>
+              <p:nvPr/>
+            </p:nvSpPr>
+            <p:spPr>
+              <a:xfrm>
+                <a:off x="6891807" y="2069992"/>
+                <a:ext cx="332142" cy="307777"/>
+              </a:xfrm>
+              <a:prstGeom prst="rect">
+                <a:avLst/>
+              </a:prstGeom>
+              <a:blipFill>
+                <a:blip r:embed="rId12"/>
+                <a:stretch>
+                  <a:fillRect b="-2000"/>
+                </a:stretch>
+              </a:blipFill>
+            </p:spPr>
+            <p:txBody>
+              <a:bodyPr/>
+              <a:lstStyle/>
+              <a:p>
+                <a:r>
+                  <a:rPr lang="en-US">
+                    <a:noFill/>
+                  </a:rPr>
+                  <a:t> </a:t>
+                </a:r>
+              </a:p>
+            </p:txBody>
+          </p:sp>
+        </mc:Fallback>
+      </mc:AlternateContent>
+      <mc:AlternateContent xmlns:mc="http://schemas.openxmlformats.org/markup-compatibility/2006">
+        <mc:Choice xmlns:a14="http://schemas.microsoft.com/office/drawing/2010/main" Requires="a14">
+          <p:sp>
+            <p:nvSpPr>
+              <p:cNvPr id="39" name="TextBox 38">
+                <a:extLst>
+                  <a:ext uri="{FF2B5EF4-FFF2-40B4-BE49-F238E27FC236}">
+                    <a16:creationId xmlns:a16="http://schemas.microsoft.com/office/drawing/2014/main" id="{5A8126C1-7B0C-4133-8F04-C7C17F408595}"/>
+                  </a:ext>
+                </a:extLst>
+              </p:cNvPr>
+              <p:cNvSpPr txBox="1"/>
+              <p:nvPr/>
+            </p:nvSpPr>
+            <p:spPr>
+              <a:xfrm>
+                <a:off x="6318257" y="2825286"/>
+                <a:ext cx="380232" cy="461665"/>
+              </a:xfrm>
+              <a:prstGeom prst="rect">
+                <a:avLst/>
+              </a:prstGeom>
+              <a:noFill/>
+            </p:spPr>
+            <p:txBody>
+              <a:bodyPr wrap="square" rtlCol="0">
+                <a:spAutoFit/>
+              </a:bodyPr>
+              <a:lstStyle/>
+              <a:p>
+                <a14:m>
+                  <m:oMathPara xmlns:m="http://schemas.openxmlformats.org/officeDocument/2006/math">
+                    <m:oMathParaPr>
+                      <m:jc m:val="centerGroup"/>
+                    </m:oMathParaPr>
+                    <m:oMath xmlns:m="http://schemas.openxmlformats.org/officeDocument/2006/math">
+                      <m:r>
+                        <a:rPr lang="en-US" sz="2400" b="0" i="0" smtClean="0">
+                          <a:solidFill>
+                            <a:schemeClr val="bg2">
+                              <a:lumMod val="50000"/>
+                            </a:schemeClr>
+                          </a:solidFill>
+                          <a:latin typeface="Cambria Math" panose="02040503050406030204" pitchFamily="18" charset="0"/>
+                        </a:rPr>
+                        <m:t>⇒</m:t>
+                      </m:r>
+                    </m:oMath>
+                  </m:oMathPara>
+                </a14:m>
+                <a:endParaRPr lang="en-US" sz="2400" dirty="0">
+                  <a:solidFill>
+                    <a:schemeClr val="bg2">
+                      <a:lumMod val="50000"/>
+                    </a:schemeClr>
+                  </a:solidFill>
+                </a:endParaRPr>
+              </a:p>
+            </p:txBody>
+          </p:sp>
+        </mc:Choice>
+        <mc:Fallback>
+          <p:sp>
+            <p:nvSpPr>
+              <p:cNvPr id="39" name="TextBox 38">
+                <a:extLst>
+                  <a:ext uri="{FF2B5EF4-FFF2-40B4-BE49-F238E27FC236}">
+                    <a16:creationId xmlns:a16="http://schemas.microsoft.com/office/drawing/2014/main" id="{5A8126C1-7B0C-4133-8F04-C7C17F408595}"/>
+                  </a:ext>
+                </a:extLst>
+              </p:cNvPr>
+              <p:cNvSpPr txBox="1">
+                <a:spLocks noRot="1" noChangeAspect="1" noMove="1" noResize="1" noEditPoints="1" noAdjustHandles="1" noChangeArrowheads="1" noChangeShapeType="1" noTextEdit="1"/>
+              </p:cNvSpPr>
+              <p:nvPr/>
+            </p:nvSpPr>
+            <p:spPr>
+              <a:xfrm>
+                <a:off x="6318257" y="2825286"/>
+                <a:ext cx="380232" cy="461665"/>
+              </a:xfrm>
+              <a:prstGeom prst="rect">
+                <a:avLst/>
+              </a:prstGeom>
+              <a:blipFill>
+                <a:blip r:embed="rId17"/>
+                <a:stretch>
+                  <a:fillRect r="-14286"/>
+                </a:stretch>
+              </a:blipFill>
+            </p:spPr>
+            <p:txBody>
+              <a:bodyPr/>
+              <a:lstStyle/>
+              <a:p>
+                <a:r>
+                  <a:rPr lang="en-US">
+                    <a:noFill/>
+                  </a:rPr>
+                  <a:t> </a:t>
+                </a:r>
+              </a:p>
+            </p:txBody>
+          </p:sp>
+        </mc:Fallback>
+      </mc:AlternateContent>
+      <p:sp>
+        <p:nvSpPr>
+          <p:cNvPr id="44" name="TextBox 43">
+            <a:extLst>
+              <a:ext uri="{FF2B5EF4-FFF2-40B4-BE49-F238E27FC236}">
+                <a16:creationId xmlns:a16="http://schemas.microsoft.com/office/drawing/2014/main" id="{643DBE0B-EE35-4069-8A45-D1E0F1CB783D}"/>
+              </a:ext>
+            </a:extLst>
+          </p:cNvPr>
+          <p:cNvSpPr txBox="1"/>
+          <p:nvPr/>
+        </p:nvSpPr>
+        <p:spPr>
+          <a:xfrm>
+            <a:off x="2241402" y="1770243"/>
+            <a:ext cx="994888" cy="338554"/>
+          </a:xfrm>
+          <a:prstGeom prst="rect">
+            <a:avLst/>
+          </a:prstGeom>
+          <a:noFill/>
+        </p:spPr>
+        <p:txBody>
+          <a:bodyPr wrap="none" rtlCol="0">
+            <a:spAutoFit/>
+          </a:bodyPr>
+          <a:lstStyle/>
+          <a:p>
+            <a:r>
+              <a:rPr lang="en-US" sz="1600" dirty="0"/>
+              <a:t>Eye space</a:t>
+            </a:r>
+          </a:p>
+        </p:txBody>
+      </p:sp>
+      <p:sp>
+        <p:nvSpPr>
+          <p:cNvPr id="45" name="TextBox 44">
+            <a:extLst>
+              <a:ext uri="{FF2B5EF4-FFF2-40B4-BE49-F238E27FC236}">
+                <a16:creationId xmlns:a16="http://schemas.microsoft.com/office/drawing/2014/main" id="{9C46AADB-E065-4FDE-B891-C27EDB23D5F8}"/>
+              </a:ext>
+            </a:extLst>
+          </p:cNvPr>
+          <p:cNvSpPr txBox="1"/>
+          <p:nvPr/>
+        </p:nvSpPr>
+        <p:spPr>
+          <a:xfrm>
+            <a:off x="4645621" y="1735452"/>
+            <a:ext cx="1074333" cy="338554"/>
+          </a:xfrm>
+          <a:prstGeom prst="rect">
+            <a:avLst/>
+          </a:prstGeom>
+          <a:noFill/>
+        </p:spPr>
+        <p:txBody>
+          <a:bodyPr wrap="none" rtlCol="0">
+            <a:spAutoFit/>
+          </a:bodyPr>
+          <a:lstStyle/>
+          <a:p>
+            <a:r>
+              <a:rPr lang="en-US" sz="1600" dirty="0"/>
+              <a:t>NDC space</a:t>
+            </a:r>
+          </a:p>
+        </p:txBody>
+      </p:sp>
+      <p:sp>
+        <p:nvSpPr>
+          <p:cNvPr id="46" name="TextBox 45">
+            <a:extLst>
+              <a:ext uri="{FF2B5EF4-FFF2-40B4-BE49-F238E27FC236}">
+                <a16:creationId xmlns:a16="http://schemas.microsoft.com/office/drawing/2014/main" id="{A3E13634-881D-4F4D-9FD9-8DC7752E645E}"/>
+              </a:ext>
+            </a:extLst>
+          </p:cNvPr>
+          <p:cNvSpPr txBox="1"/>
+          <p:nvPr/>
+        </p:nvSpPr>
+        <p:spPr>
+          <a:xfrm>
+            <a:off x="6540647" y="1731438"/>
+            <a:ext cx="1733167" cy="338554"/>
+          </a:xfrm>
+          <a:prstGeom prst="rect">
+            <a:avLst/>
+          </a:prstGeom>
+          <a:noFill/>
+        </p:spPr>
+        <p:txBody>
+          <a:bodyPr wrap="none" rtlCol="0">
+            <a:spAutoFit/>
+          </a:bodyPr>
+          <a:lstStyle/>
+          <a:p>
+            <a:r>
+              <a:rPr lang="en-US" sz="1600" dirty="0"/>
+              <a:t>Texture coordinate</a:t>
+            </a:r>
+          </a:p>
+        </p:txBody>
+      </p:sp>
+    </p:spTree>
+    <p:extLst>
+      <p:ext uri="{BB962C8B-B14F-4D97-AF65-F5344CB8AC3E}">
+        <p14:creationId xmlns:p14="http://schemas.microsoft.com/office/powerpoint/2010/main" val="2624187137"/>
+      </p:ext>
+    </p:extLst>
+  </p:cSld>
+  <p:clrMapOvr>
+    <a:masterClrMapping/>
+  </p:clrMapOvr>
+</p:sld>
+</file>
+
 <file path=ppt/theme/theme1.xml><?xml version="1.0" encoding="utf-8"?>
 <a:theme xmlns:a="http://schemas.openxmlformats.org/drawingml/2006/main" name="Office Theme">
   <a:themeElements>

</xml_diff>